<commit_message>
Created figures and added them to presentation, expanded Implementation, and started writing Results section
</commit_message>
<xml_diff>
--- a/Presentation/maloneys_HS2017.pptx
+++ b/Presentation/maloneys_HS2017.pptx
@@ -5,10 +5,18 @@
     <p:sldMasterId id="2147483648" r:id="rId1"/>
   </p:sldMasterIdLst>
   <p:notesMasterIdLst>
-    <p:notesMasterId r:id="rId3"/>
+    <p:notesMasterId r:id="rId11"/>
   </p:notesMasterIdLst>
   <p:sldIdLst>
     <p:sldId id="256" r:id="rId2"/>
+    <p:sldId id="260" r:id="rId3"/>
+    <p:sldId id="257" r:id="rId4"/>
+    <p:sldId id="258" r:id="rId5"/>
+    <p:sldId id="259" r:id="rId6"/>
+    <p:sldId id="261" r:id="rId7"/>
+    <p:sldId id="264" r:id="rId8"/>
+    <p:sldId id="262" r:id="rId9"/>
+    <p:sldId id="263" r:id="rId10"/>
   </p:sldIdLst>
   <p:sldSz cx="9144000" cy="6858000" type="screen4x3"/>
   <p:notesSz cx="7099300" cy="10234613"/>
@@ -248,7 +256,7 @@
           <a:p>
             <a:fld id="{BCDB334D-D17F-49C4-91DD-37BB7E818209}" type="datetimeFigureOut">
               <a:rPr lang="de-CH" smtClean="0"/>
-              <a:t>14.12.2017</a:t>
+              <a:t>17.12.2017</a:t>
             </a:fld>
             <a:endParaRPr lang="de-CH"/>
           </a:p>
@@ -3867,26 +3875,33 @@
           <a:p>
             <a:r>
               <a:rPr lang="en-US" b="1" dirty="0"/>
-              <a:t>Seminar in Fluid Dynamics for </a:t>
+              <a:t>Samuel </a:t>
             </a:r>
             <a:r>
               <a:rPr lang="en-US" b="1" dirty="0" smtClean="0"/>
-              <a:t>CSE by </a:t>
+              <a:t>Maloney, </a:t>
             </a:r>
             <a:r>
               <a:rPr lang="en-US" b="1" dirty="0" smtClean="0"/>
-              <a:t>Samuel Maloney</a:t>
-            </a:r>
-            <a:endParaRPr lang="en-US" b="1" dirty="0"/>
+              <a:t>Seminar </a:t>
+            </a:r>
+            <a:r>
+              <a:rPr lang="en-US" b="1" dirty="0"/>
+              <a:t>in Fluid Dynamics for </a:t>
+            </a:r>
+            <a:r>
+              <a:rPr lang="en-US" b="1" dirty="0" smtClean="0"/>
+              <a:t>CSE</a:t>
+            </a:r>
           </a:p>
           <a:p>
             <a:r>
               <a:rPr lang="en-US" dirty="0" smtClean="0"/>
-              <a:t>Supervisor: </a:t>
+              <a:t>Supervisor</a:t>
             </a:r>
             <a:r>
               <a:rPr lang="en-US" dirty="0" smtClean="0"/>
-              <a:t>Daniel </a:t>
+              <a:t>: Daniel </a:t>
             </a:r>
             <a:r>
               <a:rPr lang="en-US" dirty="0" err="1" smtClean="0"/>
@@ -3897,19 +3912,7 @@
           <a:p>
             <a:r>
               <a:rPr lang="en-US" dirty="0" smtClean="0"/>
-              <a:t>Prof</a:t>
-            </a:r>
-            <a:r>
-              <a:rPr lang="en-US" dirty="0" smtClean="0"/>
-              <a:t>essor:</a:t>
-            </a:r>
-            <a:r>
-              <a:rPr lang="en-US" dirty="0" smtClean="0"/>
-              <a:t> </a:t>
-            </a:r>
-            <a:r>
-              <a:rPr lang="en-US" dirty="0" smtClean="0"/>
-              <a:t>Patrick Jenny</a:t>
+              <a:t>Professor: Patrick Jenny</a:t>
             </a:r>
             <a:endParaRPr lang="de-CH" dirty="0"/>
           </a:p>
@@ -4027,6 +4030,3285 @@
       </p:par>
     </p:tnLst>
   </p:timing>
+</p:sld>
+</file>
+
+<file path=ppt/slides/slide2.xml><?xml version="1.0" encoding="utf-8"?>
+<p:sld xmlns:a="http://schemas.openxmlformats.org/drawingml/2006/main" xmlns:r="http://schemas.openxmlformats.org/officeDocument/2006/relationships" xmlns:p="http://schemas.openxmlformats.org/presentationml/2006/main">
+  <p:cSld>
+    <p:spTree>
+      <p:nvGrpSpPr>
+        <p:cNvPr id="1" name=""/>
+        <p:cNvGrpSpPr/>
+        <p:nvPr/>
+      </p:nvGrpSpPr>
+      <p:grpSpPr>
+        <a:xfrm>
+          <a:off x="0" y="0"/>
+          <a:ext cx="0" cy="0"/>
+          <a:chOff x="0" y="0"/>
+          <a:chExt cx="0" cy="0"/>
+        </a:xfrm>
+      </p:grpSpPr>
+      <p:pic>
+        <p:nvPicPr>
+          <p:cNvPr id="8" name="Content Placeholder 7" descr="Screen Clipping"/>
+          <p:cNvPicPr>
+            <a:picLocks noGrp="1" noChangeAspect="1"/>
+          </p:cNvPicPr>
+          <p:nvPr>
+            <p:ph idx="1"/>
+          </p:nvPr>
+        </p:nvPicPr>
+        <p:blipFill>
+          <a:blip r:embed="rId2">
+            <a:extLst>
+              <a:ext uri="{28A0092B-C50C-407E-A947-70E740481C1C}">
+                <a14:useLocalDpi xmlns:a14="http://schemas.microsoft.com/office/drawing/2010/main" val="0"/>
+              </a:ext>
+            </a:extLst>
+          </a:blip>
+          <a:stretch>
+            <a:fillRect/>
+          </a:stretch>
+        </p:blipFill>
+        <p:spPr>
+          <a:xfrm>
+            <a:off x="323850" y="3856191"/>
+            <a:ext cx="8496300" cy="1495348"/>
+          </a:xfrm>
+        </p:spPr>
+      </p:pic>
+      <p:sp>
+        <p:nvSpPr>
+          <p:cNvPr id="3" name="Date Placeholder 2"/>
+          <p:cNvSpPr>
+            <a:spLocks noGrp="1"/>
+          </p:cNvSpPr>
+          <p:nvPr>
+            <p:ph type="dt" sz="half" idx="10"/>
+          </p:nvPr>
+        </p:nvSpPr>
+        <p:spPr/>
+        <p:txBody>
+          <a:bodyPr/>
+          <a:lstStyle/>
+          <a:p>
+            <a:r>
+              <a:rPr lang="de-DE" smtClean="0"/>
+              <a:t>21.12.2017</a:t>
+            </a:r>
+            <a:endParaRPr lang="de-DE"/>
+          </a:p>
+        </p:txBody>
+      </p:sp>
+      <p:sp>
+        <p:nvSpPr>
+          <p:cNvPr id="4" name="Footer Placeholder 3"/>
+          <p:cNvSpPr>
+            <a:spLocks noGrp="1"/>
+          </p:cNvSpPr>
+          <p:nvPr>
+            <p:ph type="ftr" sz="quarter" idx="11"/>
+          </p:nvPr>
+        </p:nvSpPr>
+        <p:spPr/>
+        <p:txBody>
+          <a:bodyPr/>
+          <a:lstStyle/>
+          <a:p>
+            <a:r>
+              <a:rPr lang="de-DE" smtClean="0"/>
+              <a:t>Samuel Maloney</a:t>
+            </a:r>
+            <a:endParaRPr lang="de-DE"/>
+          </a:p>
+        </p:txBody>
+      </p:sp>
+      <p:sp>
+        <p:nvSpPr>
+          <p:cNvPr id="5" name="Slide Number Placeholder 4"/>
+          <p:cNvSpPr>
+            <a:spLocks noGrp="1"/>
+          </p:cNvSpPr>
+          <p:nvPr>
+            <p:ph type="sldNum" sz="quarter" idx="12"/>
+          </p:nvPr>
+        </p:nvSpPr>
+        <p:spPr/>
+        <p:txBody>
+          <a:bodyPr/>
+          <a:lstStyle/>
+          <a:p>
+            <a:fld id="{6C6AE60A-B69C-4790-82F7-3882EDF23186}" type="slidenum">
+              <a:rPr lang="de-DE" smtClean="0"/>
+              <a:t>2</a:t>
+            </a:fld>
+            <a:endParaRPr lang="de-DE"/>
+          </a:p>
+        </p:txBody>
+      </p:sp>
+      <p:sp>
+        <p:nvSpPr>
+          <p:cNvPr id="9" name="Title 5"/>
+          <p:cNvSpPr>
+            <a:spLocks noGrp="1"/>
+          </p:cNvSpPr>
+          <p:nvPr>
+            <p:ph type="title"/>
+          </p:nvPr>
+        </p:nvSpPr>
+        <p:spPr>
+          <a:xfrm>
+            <a:off x="323850" y="620714"/>
+            <a:ext cx="8496300" cy="478324"/>
+          </a:xfrm>
+        </p:spPr>
+        <p:txBody>
+          <a:bodyPr/>
+          <a:lstStyle/>
+          <a:p>
+            <a:r>
+              <a:rPr lang="en-US" dirty="0" smtClean="0"/>
+              <a:t>Velocity Profile Comparisons</a:t>
+            </a:r>
+            <a:endParaRPr lang="de-CH" dirty="0"/>
+          </a:p>
+        </p:txBody>
+      </p:sp>
+      <mc:AlternateContent xmlns:mc="http://schemas.openxmlformats.org/markup-compatibility/2006">
+        <mc:Choice xmlns:a14="http://schemas.microsoft.com/office/drawing/2010/main" Requires="a14">
+          <p:sp>
+            <p:nvSpPr>
+              <p:cNvPr id="11" name="Content Placeholder 7"/>
+              <p:cNvSpPr txBox="1">
+                <a:spLocks/>
+              </p:cNvSpPr>
+              <p:nvPr/>
+            </p:nvSpPr>
+            <p:spPr>
+              <a:xfrm>
+                <a:off x="323850" y="1807585"/>
+                <a:ext cx="8496300" cy="1939475"/>
+              </a:xfrm>
+              <a:prstGeom prst="rect">
+                <a:avLst/>
+              </a:prstGeom>
+            </p:spPr>
+            <p:txBody>
+              <a:bodyPr vert="horz" lIns="140400" tIns="0" rIns="144000" bIns="0" rtlCol="0">
+                <a:noAutofit/>
+              </a:bodyPr>
+              <a:lstStyle>
+                <a:lvl1pPr marL="361950" indent="-361950" algn="l" defTabSz="914400" rtl="0" eaLnBrk="1" latinLnBrk="0" hangingPunct="1">
+                  <a:lnSpc>
+                    <a:spcPct val="100000"/>
+                  </a:lnSpc>
+                  <a:spcBef>
+                    <a:spcPts val="500"/>
+                  </a:spcBef>
+                  <a:buClr>
+                    <a:schemeClr val="tx2"/>
+                  </a:buClr>
+                  <a:buFont typeface="Wingdings" pitchFamily="2" charset="2"/>
+                  <a:buChar char="§"/>
+                  <a:defRPr sz="2400" kern="1200">
+                    <a:solidFill>
+                      <a:schemeClr val="tx1"/>
+                    </a:solidFill>
+                    <a:latin typeface="+mn-lt"/>
+                    <a:ea typeface="+mn-ea"/>
+                    <a:cs typeface="+mn-cs"/>
+                  </a:defRPr>
+                </a:lvl1pPr>
+                <a:lvl2pPr marL="627063" indent="-265113" algn="l" defTabSz="914400" rtl="0" eaLnBrk="1" latinLnBrk="0" hangingPunct="1">
+                  <a:lnSpc>
+                    <a:spcPct val="100000"/>
+                  </a:lnSpc>
+                  <a:spcBef>
+                    <a:spcPts val="400"/>
+                  </a:spcBef>
+                  <a:buClr>
+                    <a:schemeClr val="tx2"/>
+                  </a:buClr>
+                  <a:buFont typeface="Wingdings" pitchFamily="2" charset="2"/>
+                  <a:buChar char="§"/>
+                  <a:defRPr sz="2000" kern="1200">
+                    <a:solidFill>
+                      <a:schemeClr val="tx1"/>
+                    </a:solidFill>
+                    <a:latin typeface="+mn-lt"/>
+                    <a:ea typeface="+mn-ea"/>
+                    <a:cs typeface="+mn-cs"/>
+                  </a:defRPr>
+                </a:lvl2pPr>
+                <a:lvl3pPr marL="893763" indent="-266700" algn="l" defTabSz="914400" rtl="0" eaLnBrk="1" latinLnBrk="0" hangingPunct="1">
+                  <a:lnSpc>
+                    <a:spcPct val="100000"/>
+                  </a:lnSpc>
+                  <a:spcBef>
+                    <a:spcPts val="400"/>
+                  </a:spcBef>
+                  <a:buClr>
+                    <a:schemeClr val="tx2"/>
+                  </a:buClr>
+                  <a:buFont typeface="Wingdings" pitchFamily="2" charset="2"/>
+                  <a:buChar char="§"/>
+                  <a:defRPr sz="1800" kern="1200">
+                    <a:solidFill>
+                      <a:schemeClr val="tx1"/>
+                    </a:solidFill>
+                    <a:latin typeface="+mn-lt"/>
+                    <a:ea typeface="+mn-ea"/>
+                    <a:cs typeface="+mn-cs"/>
+                  </a:defRPr>
+                </a:lvl3pPr>
+                <a:lvl4pPr marL="1077913" indent="-177800" algn="l" defTabSz="914400" rtl="0" eaLnBrk="1" latinLnBrk="0" hangingPunct="1">
+                  <a:lnSpc>
+                    <a:spcPct val="100000"/>
+                  </a:lnSpc>
+                  <a:spcBef>
+                    <a:spcPts val="400"/>
+                  </a:spcBef>
+                  <a:buClr>
+                    <a:schemeClr val="tx2"/>
+                  </a:buClr>
+                  <a:buFont typeface="Wingdings" pitchFamily="2" charset="2"/>
+                  <a:buChar char="§"/>
+                  <a:defRPr sz="1600" kern="1200">
+                    <a:solidFill>
+                      <a:schemeClr val="tx1"/>
+                    </a:solidFill>
+                    <a:latin typeface="+mn-lt"/>
+                    <a:ea typeface="+mn-ea"/>
+                    <a:cs typeface="+mn-cs"/>
+                  </a:defRPr>
+                </a:lvl4pPr>
+                <a:lvl5pPr marL="1262063" indent="-184150" algn="l" defTabSz="914400" rtl="0" eaLnBrk="1" latinLnBrk="0" hangingPunct="1">
+                  <a:lnSpc>
+                    <a:spcPct val="100000"/>
+                  </a:lnSpc>
+                  <a:spcBef>
+                    <a:spcPts val="400"/>
+                  </a:spcBef>
+                  <a:buClr>
+                    <a:schemeClr val="tx2"/>
+                  </a:buClr>
+                  <a:buFont typeface="Wingdings" pitchFamily="2" charset="2"/>
+                  <a:buChar char="§"/>
+                  <a:defRPr sz="1400" kern="1200">
+                    <a:solidFill>
+                      <a:schemeClr val="tx1"/>
+                    </a:solidFill>
+                    <a:latin typeface="+mn-lt"/>
+                    <a:ea typeface="+mn-ea"/>
+                    <a:cs typeface="+mn-cs"/>
+                  </a:defRPr>
+                </a:lvl5pPr>
+                <a:lvl6pPr marL="2514600" indent="-228600" algn="l" defTabSz="914400" rtl="0" eaLnBrk="1" latinLnBrk="0" hangingPunct="1">
+                  <a:spcBef>
+                    <a:spcPct val="20000"/>
+                  </a:spcBef>
+                  <a:buFont typeface="Arial" pitchFamily="34" charset="0"/>
+                  <a:buChar char="•"/>
+                  <a:defRPr sz="2000" kern="1200">
+                    <a:solidFill>
+                      <a:schemeClr val="tx1"/>
+                    </a:solidFill>
+                    <a:latin typeface="+mn-lt"/>
+                    <a:ea typeface="+mn-ea"/>
+                    <a:cs typeface="+mn-cs"/>
+                  </a:defRPr>
+                </a:lvl6pPr>
+                <a:lvl7pPr marL="2971800" indent="-228600" algn="l" defTabSz="914400" rtl="0" eaLnBrk="1" latinLnBrk="0" hangingPunct="1">
+                  <a:spcBef>
+                    <a:spcPct val="20000"/>
+                  </a:spcBef>
+                  <a:buFont typeface="Arial" pitchFamily="34" charset="0"/>
+                  <a:buChar char="•"/>
+                  <a:defRPr sz="2000" kern="1200">
+                    <a:solidFill>
+                      <a:schemeClr val="tx1"/>
+                    </a:solidFill>
+                    <a:latin typeface="+mn-lt"/>
+                    <a:ea typeface="+mn-ea"/>
+                    <a:cs typeface="+mn-cs"/>
+                  </a:defRPr>
+                </a:lvl7pPr>
+                <a:lvl8pPr marL="3429000" indent="-228600" algn="l" defTabSz="914400" rtl="0" eaLnBrk="1" latinLnBrk="0" hangingPunct="1">
+                  <a:spcBef>
+                    <a:spcPct val="20000"/>
+                  </a:spcBef>
+                  <a:buFont typeface="Arial" pitchFamily="34" charset="0"/>
+                  <a:buChar char="•"/>
+                  <a:defRPr sz="2000" kern="1200">
+                    <a:solidFill>
+                      <a:schemeClr val="tx1"/>
+                    </a:solidFill>
+                    <a:latin typeface="+mn-lt"/>
+                    <a:ea typeface="+mn-ea"/>
+                    <a:cs typeface="+mn-cs"/>
+                  </a:defRPr>
+                </a:lvl8pPr>
+                <a:lvl9pPr marL="3886200" indent="-228600" algn="l" defTabSz="914400" rtl="0" eaLnBrk="1" latinLnBrk="0" hangingPunct="1">
+                  <a:spcBef>
+                    <a:spcPct val="20000"/>
+                  </a:spcBef>
+                  <a:buFont typeface="Arial" pitchFamily="34" charset="0"/>
+                  <a:buChar char="•"/>
+                  <a:defRPr sz="2000" kern="1200">
+                    <a:solidFill>
+                      <a:schemeClr val="tx1"/>
+                    </a:solidFill>
+                    <a:latin typeface="+mn-lt"/>
+                    <a:ea typeface="+mn-ea"/>
+                    <a:cs typeface="+mn-cs"/>
+                  </a:defRPr>
+                </a:lvl9pPr>
+              </a:lstStyle>
+              <a:p>
+                <a:r>
+                  <a:rPr lang="en-US" dirty="0" smtClean="0"/>
+                  <a:t>Line profiles of the </a:t>
+                </a:r>
+                <a14:m>
+                  <m:oMath xmlns:m="http://schemas.openxmlformats.org/officeDocument/2006/math">
+                    <m:sSub>
+                      <m:sSubPr>
+                        <m:ctrlPr>
+                          <a:rPr lang="en-US" b="0" i="1" smtClean="0">
+                            <a:latin typeface="Cambria Math" panose="02040503050406030204" pitchFamily="18" charset="0"/>
+                          </a:rPr>
+                        </m:ctrlPr>
+                      </m:sSubPr>
+                      <m:e>
+                        <m:d>
+                          <m:dPr>
+                            <m:begChr m:val="|"/>
+                            <m:endChr m:val="|"/>
+                            <m:ctrlPr>
+                              <a:rPr lang="en-US" b="0" i="1" smtClean="0">
+                                <a:latin typeface="Cambria Math" panose="02040503050406030204" pitchFamily="18" charset="0"/>
+                              </a:rPr>
+                            </m:ctrlPr>
+                          </m:dPr>
+                          <m:e>
+                            <m:acc>
+                              <m:accPr>
+                                <m:chr m:val="̅"/>
+                                <m:ctrlPr>
+                                  <a:rPr lang="en-US" b="0" i="1" smtClean="0">
+                                    <a:latin typeface="Cambria Math" panose="02040503050406030204" pitchFamily="18" charset="0"/>
+                                  </a:rPr>
+                                </m:ctrlPr>
+                              </m:accPr>
+                              <m:e>
+                                <m:r>
+                                  <a:rPr lang="en-US" b="0" i="1" smtClean="0">
+                                    <a:latin typeface="Cambria Math" panose="02040503050406030204" pitchFamily="18" charset="0"/>
+                                  </a:rPr>
+                                  <m:t>𝑢</m:t>
+                                </m:r>
+                              </m:e>
+                            </m:acc>
+                          </m:e>
+                        </m:d>
+                      </m:e>
+                      <m:sub>
+                        <m:r>
+                          <m:rPr>
+                            <m:sty m:val="p"/>
+                          </m:rPr>
+                          <a:rPr lang="en-US" b="0" i="0" smtClean="0">
+                            <a:latin typeface="Cambria Math" panose="02040503050406030204" pitchFamily="18" charset="0"/>
+                          </a:rPr>
+                          <m:t>mean</m:t>
+                        </m:r>
+                      </m:sub>
+                    </m:sSub>
+                  </m:oMath>
+                </a14:m>
+                <a:r>
+                  <a:rPr lang="en-US" dirty="0" smtClean="0"/>
+                  <a:t> field used for comparison</a:t>
+                </a:r>
+              </a:p>
+              <a:p>
+                <a:r>
+                  <a:rPr lang="en-US" dirty="0" smtClean="0"/>
+                  <a:t>A baseline “DNS” simulation was run, using the same grid</a:t>
+                </a:r>
+              </a:p>
+              <a:p>
+                <a:r>
+                  <a:rPr lang="en-US" dirty="0" smtClean="0"/>
+                  <a:t>Location of profile was chosen as the minimum of the recirculation vortex in the baseline simulation </a:t>
+                </a:r>
+                <a:endParaRPr lang="en-US" dirty="0" smtClean="0"/>
+              </a:p>
+            </p:txBody>
+          </p:sp>
+        </mc:Choice>
+        <mc:Fallback>
+          <p:sp>
+            <p:nvSpPr>
+              <p:cNvPr id="11" name="Content Placeholder 7"/>
+              <p:cNvSpPr txBox="1">
+                <a:spLocks noRot="1" noChangeAspect="1" noMove="1" noResize="1" noEditPoints="1" noAdjustHandles="1" noChangeArrowheads="1" noChangeShapeType="1" noTextEdit="1"/>
+              </p:cNvSpPr>
+              <p:nvPr/>
+            </p:nvSpPr>
+            <p:spPr>
+              <a:xfrm>
+                <a:off x="323850" y="1807585"/>
+                <a:ext cx="8496300" cy="1939475"/>
+              </a:xfrm>
+              <a:prstGeom prst="rect">
+                <a:avLst/>
+              </a:prstGeom>
+              <a:blipFill>
+                <a:blip r:embed="rId3"/>
+                <a:stretch>
+                  <a:fillRect l="-359" t="-4717"/>
+                </a:stretch>
+              </a:blipFill>
+            </p:spPr>
+            <p:txBody>
+              <a:bodyPr/>
+              <a:lstStyle/>
+              <a:p>
+                <a:r>
+                  <a:rPr lang="de-CH">
+                    <a:noFill/>
+                  </a:rPr>
+                  <a:t> </a:t>
+                </a:r>
+              </a:p>
+            </p:txBody>
+          </p:sp>
+        </mc:Fallback>
+      </mc:AlternateContent>
+      <mc:AlternateContent xmlns:mc="http://schemas.openxmlformats.org/markup-compatibility/2006">
+        <mc:Choice xmlns:a14="http://schemas.microsoft.com/office/drawing/2010/main" Requires="a14">
+          <p:sp>
+            <p:nvSpPr>
+              <p:cNvPr id="12" name="TextBox 11"/>
+              <p:cNvSpPr txBox="1"/>
+              <p:nvPr/>
+            </p:nvSpPr>
+            <p:spPr>
+              <a:xfrm>
+                <a:off x="791307" y="5364054"/>
+                <a:ext cx="1600695" cy="369332"/>
+              </a:xfrm>
+              <a:prstGeom prst="rect">
+                <a:avLst/>
+              </a:prstGeom>
+              <a:noFill/>
+            </p:spPr>
+            <p:txBody>
+              <a:bodyPr wrap="none" rtlCol="0">
+                <a:spAutoFit/>
+              </a:bodyPr>
+              <a:lstStyle/>
+              <a:p>
+                <a14:m>
+                  <m:oMathPara xmlns:m="http://schemas.openxmlformats.org/officeDocument/2006/math">
+                    <m:oMathParaPr>
+                      <m:jc m:val="centerGroup"/>
+                    </m:oMathParaPr>
+                    <m:oMath xmlns:m="http://schemas.openxmlformats.org/officeDocument/2006/math">
+                      <m:r>
+                        <a:rPr lang="en-US" b="0" i="1" smtClean="0">
+                          <a:latin typeface="Cambria Math" panose="02040503050406030204" pitchFamily="18" charset="0"/>
+                        </a:rPr>
+                        <m:t>𝑥</m:t>
+                      </m:r>
+                      <m:r>
+                        <a:rPr lang="en-US" b="0" i="1" smtClean="0">
+                          <a:latin typeface="Cambria Math" panose="02040503050406030204" pitchFamily="18" charset="0"/>
+                        </a:rPr>
+                        <m:t>=28.6 </m:t>
+                      </m:r>
+                      <m:r>
+                        <m:rPr>
+                          <m:sty m:val="p"/>
+                        </m:rPr>
+                        <a:rPr lang="en-US" b="0" i="0" smtClean="0">
+                          <a:latin typeface="Cambria Math" panose="02040503050406030204" pitchFamily="18" charset="0"/>
+                        </a:rPr>
+                        <m:t>mm</m:t>
+                      </m:r>
+                    </m:oMath>
+                  </m:oMathPara>
+                </a14:m>
+                <a:endParaRPr lang="de-CH" dirty="0"/>
+              </a:p>
+            </p:txBody>
+          </p:sp>
+        </mc:Choice>
+        <mc:Fallback>
+          <p:sp>
+            <p:nvSpPr>
+              <p:cNvPr id="12" name="TextBox 11"/>
+              <p:cNvSpPr txBox="1">
+                <a:spLocks noRot="1" noChangeAspect="1" noMove="1" noResize="1" noEditPoints="1" noAdjustHandles="1" noChangeArrowheads="1" noChangeShapeType="1" noTextEdit="1"/>
+              </p:cNvSpPr>
+              <p:nvPr/>
+            </p:nvSpPr>
+            <p:spPr>
+              <a:xfrm>
+                <a:off x="791307" y="5364054"/>
+                <a:ext cx="1600695" cy="369332"/>
+              </a:xfrm>
+              <a:prstGeom prst="rect">
+                <a:avLst/>
+              </a:prstGeom>
+              <a:blipFill>
+                <a:blip r:embed="rId4"/>
+                <a:stretch>
+                  <a:fillRect/>
+                </a:stretch>
+              </a:blipFill>
+            </p:spPr>
+            <p:txBody>
+              <a:bodyPr/>
+              <a:lstStyle/>
+              <a:p>
+                <a:r>
+                  <a:rPr lang="de-CH">
+                    <a:noFill/>
+                  </a:rPr>
+                  <a:t> </a:t>
+                </a:r>
+              </a:p>
+            </p:txBody>
+          </p:sp>
+        </mc:Fallback>
+      </mc:AlternateContent>
+    </p:spTree>
+    <p:extLst>
+      <p:ext uri="{BB962C8B-B14F-4D97-AF65-F5344CB8AC3E}">
+        <p14:creationId xmlns:p14="http://schemas.microsoft.com/office/powerpoint/2010/main" val="3374278993"/>
+      </p:ext>
+    </p:extLst>
+  </p:cSld>
+  <p:clrMapOvr>
+    <a:masterClrMapping/>
+  </p:clrMapOvr>
+  <p:transition>
+    <p:fade/>
+  </p:transition>
+</p:sld>
+</file>
+
+<file path=ppt/slides/slide3.xml><?xml version="1.0" encoding="utf-8"?>
+<p:sld xmlns:a="http://schemas.openxmlformats.org/drawingml/2006/main" xmlns:r="http://schemas.openxmlformats.org/officeDocument/2006/relationships" xmlns:p="http://schemas.openxmlformats.org/presentationml/2006/main">
+  <p:cSld>
+    <p:spTree>
+      <p:nvGrpSpPr>
+        <p:cNvPr id="1" name=""/>
+        <p:cNvGrpSpPr/>
+        <p:nvPr/>
+      </p:nvGrpSpPr>
+      <p:grpSpPr>
+        <a:xfrm>
+          <a:off x="0" y="0"/>
+          <a:ext cx="0" cy="0"/>
+          <a:chOff x="0" y="0"/>
+          <a:chExt cx="0" cy="0"/>
+        </a:xfrm>
+      </p:grpSpPr>
+      <p:sp>
+        <p:nvSpPr>
+          <p:cNvPr id="3" name="Date Placeholder 2"/>
+          <p:cNvSpPr>
+            <a:spLocks noGrp="1"/>
+          </p:cNvSpPr>
+          <p:nvPr>
+            <p:ph type="dt" sz="half" idx="10"/>
+          </p:nvPr>
+        </p:nvSpPr>
+        <p:spPr/>
+        <p:txBody>
+          <a:bodyPr/>
+          <a:lstStyle/>
+          <a:p>
+            <a:r>
+              <a:rPr lang="de-DE" smtClean="0"/>
+              <a:t>21.12.2017</a:t>
+            </a:r>
+            <a:endParaRPr lang="de-DE"/>
+          </a:p>
+        </p:txBody>
+      </p:sp>
+      <p:sp>
+        <p:nvSpPr>
+          <p:cNvPr id="4" name="Footer Placeholder 3"/>
+          <p:cNvSpPr>
+            <a:spLocks noGrp="1"/>
+          </p:cNvSpPr>
+          <p:nvPr>
+            <p:ph type="ftr" sz="quarter" idx="11"/>
+          </p:nvPr>
+        </p:nvSpPr>
+        <p:spPr/>
+        <p:txBody>
+          <a:bodyPr/>
+          <a:lstStyle/>
+          <a:p>
+            <a:r>
+              <a:rPr lang="de-DE" smtClean="0"/>
+              <a:t>Samuel Maloney</a:t>
+            </a:r>
+            <a:endParaRPr lang="de-DE"/>
+          </a:p>
+        </p:txBody>
+      </p:sp>
+      <p:sp>
+        <p:nvSpPr>
+          <p:cNvPr id="5" name="Slide Number Placeholder 4"/>
+          <p:cNvSpPr>
+            <a:spLocks noGrp="1"/>
+          </p:cNvSpPr>
+          <p:nvPr>
+            <p:ph type="sldNum" sz="quarter" idx="12"/>
+          </p:nvPr>
+        </p:nvSpPr>
+        <p:spPr/>
+        <p:txBody>
+          <a:bodyPr/>
+          <a:lstStyle/>
+          <a:p>
+            <a:fld id="{6C6AE60A-B69C-4790-82F7-3882EDF23186}" type="slidenum">
+              <a:rPr lang="de-DE" smtClean="0"/>
+              <a:t>3</a:t>
+            </a:fld>
+            <a:endParaRPr lang="de-DE"/>
+          </a:p>
+        </p:txBody>
+      </p:sp>
+      <mc:AlternateContent xmlns:mc="http://schemas.openxmlformats.org/markup-compatibility/2006">
+        <mc:Choice xmlns:a14="http://schemas.microsoft.com/office/drawing/2010/main" Requires="a14">
+          <p:sp>
+            <p:nvSpPr>
+              <p:cNvPr id="6" name="Title 5"/>
+              <p:cNvSpPr>
+                <a:spLocks noGrp="1"/>
+              </p:cNvSpPr>
+              <p:nvPr>
+                <p:ph type="title"/>
+              </p:nvPr>
+            </p:nvSpPr>
+            <p:spPr>
+              <a:xfrm>
+                <a:off x="323850" y="620714"/>
+                <a:ext cx="8496300" cy="812432"/>
+              </a:xfrm>
+            </p:spPr>
+            <p:txBody>
+              <a:bodyPr/>
+              <a:lstStyle/>
+              <a:p>
+                <a:pPr/>
+                <a:r>
+                  <a:rPr lang="en-US" dirty="0" smtClean="0"/>
+                  <a:t>Base TLES Method</a:t>
+                </a:r>
+                <a:r>
+                  <a:rPr lang="en-US" dirty="0"/>
+                  <a:t/>
+                </a:r>
+                <a:br>
+                  <a:rPr lang="en-US" dirty="0"/>
+                </a:br>
+                <a14:m>
+                  <m:oMathPara xmlns:m="http://schemas.openxmlformats.org/officeDocument/2006/math">
+                    <m:oMathParaPr>
+                      <m:jc m:val="left"/>
+                    </m:oMathParaPr>
+                    <m:oMath xmlns:m="http://schemas.openxmlformats.org/officeDocument/2006/math">
+                      <m:r>
+                        <a:rPr lang="en-US" sz="2000" b="1" i="0" smtClean="0">
+                          <a:latin typeface="Cambria Math" panose="02040503050406030204" pitchFamily="18" charset="0"/>
+                        </a:rPr>
+                        <m:t>𝚫</m:t>
+                      </m:r>
+                      <m:r>
+                        <a:rPr lang="en-US" sz="2000" b="1" i="0" smtClean="0">
+                          <a:latin typeface="Cambria Math" panose="02040503050406030204" pitchFamily="18" charset="0"/>
+                        </a:rPr>
+                        <m:t>𝐭</m:t>
+                      </m:r>
+                      <m:r>
+                        <a:rPr lang="en-US" sz="2000" b="1" i="0" smtClean="0">
+                          <a:latin typeface="Cambria Math" panose="02040503050406030204" pitchFamily="18" charset="0"/>
+                        </a:rPr>
+                        <m:t>=</m:t>
+                      </m:r>
+                      <m:r>
+                        <a:rPr lang="en-US" sz="2000" b="1" i="0" smtClean="0">
+                          <a:latin typeface="Cambria Math" panose="02040503050406030204" pitchFamily="18" charset="0"/>
+                        </a:rPr>
+                        <m:t>𝟏</m:t>
+                      </m:r>
+                      <m:sSup>
+                        <m:sSupPr>
+                          <m:ctrlPr>
+                            <a:rPr lang="en-US" sz="2000" b="1" i="0" smtClean="0">
+                              <a:latin typeface="Cambria Math" panose="02040503050406030204" pitchFamily="18" charset="0"/>
+                            </a:rPr>
+                          </m:ctrlPr>
+                        </m:sSupPr>
+                        <m:e>
+                          <m:r>
+                            <a:rPr lang="en-US" sz="2000" b="1" i="0" smtClean="0">
+                              <a:latin typeface="Cambria Math" panose="02040503050406030204" pitchFamily="18" charset="0"/>
+                            </a:rPr>
+                            <m:t>𝟎</m:t>
+                          </m:r>
+                        </m:e>
+                        <m:sup>
+                          <m:r>
+                            <a:rPr lang="en-US" sz="2000" b="1" i="0" smtClean="0">
+                              <a:latin typeface="Cambria Math" panose="02040503050406030204" pitchFamily="18" charset="0"/>
+                            </a:rPr>
+                            <m:t>−</m:t>
+                          </m:r>
+                          <m:r>
+                            <a:rPr lang="en-US" sz="2000" b="1" i="0" smtClean="0">
+                              <a:latin typeface="Cambria Math" panose="02040503050406030204" pitchFamily="18" charset="0"/>
+                            </a:rPr>
+                            <m:t>𝟔</m:t>
+                          </m:r>
+                        </m:sup>
+                      </m:sSup>
+                      <m:r>
+                        <a:rPr lang="en-US" sz="2000" b="1" i="0" smtClean="0">
+                          <a:latin typeface="Cambria Math" panose="02040503050406030204" pitchFamily="18" charset="0"/>
+                        </a:rPr>
+                        <m:t>,</m:t>
+                      </m:r>
+                      <m:sSub>
+                        <m:sSubPr>
+                          <m:ctrlPr>
+                            <a:rPr lang="en-US" sz="2000" i="1">
+                              <a:latin typeface="Cambria Math" panose="02040503050406030204" pitchFamily="18" charset="0"/>
+                            </a:rPr>
+                          </m:ctrlPr>
+                        </m:sSubPr>
+                        <m:e>
+                          <m:r>
+                            <a:rPr lang="en-US" sz="2000" i="1">
+                              <a:latin typeface="Cambria Math" panose="02040503050406030204" pitchFamily="18" charset="0"/>
+                            </a:rPr>
+                            <m:t>𝒕</m:t>
+                          </m:r>
+                        </m:e>
+                        <m:sub>
+                          <m:r>
+                            <a:rPr lang="en-US" sz="2000">
+                              <a:latin typeface="Cambria Math" panose="02040503050406030204" pitchFamily="18" charset="0"/>
+                            </a:rPr>
+                            <m:t>𝐟𝐢𝐧𝐚𝐥</m:t>
+                          </m:r>
+                        </m:sub>
+                      </m:sSub>
+                      <m:r>
+                        <a:rPr lang="en-US" sz="2000" i="1">
+                          <a:latin typeface="Cambria Math" panose="02040503050406030204" pitchFamily="18" charset="0"/>
+                        </a:rPr>
+                        <m:t>=</m:t>
+                      </m:r>
+                      <m:r>
+                        <a:rPr lang="en-US" sz="2000" i="1">
+                          <a:latin typeface="Cambria Math" panose="02040503050406030204" pitchFamily="18" charset="0"/>
+                        </a:rPr>
+                        <m:t>𝟎</m:t>
+                      </m:r>
+                      <m:r>
+                        <a:rPr lang="en-US" sz="2000" i="1">
+                          <a:latin typeface="Cambria Math" panose="02040503050406030204" pitchFamily="18" charset="0"/>
+                        </a:rPr>
+                        <m:t>.</m:t>
+                      </m:r>
+                      <m:r>
+                        <a:rPr lang="en-US" sz="2000" i="1">
+                          <a:latin typeface="Cambria Math" panose="02040503050406030204" pitchFamily="18" charset="0"/>
+                        </a:rPr>
+                        <m:t>𝟏</m:t>
+                      </m:r>
+                    </m:oMath>
+                  </m:oMathPara>
+                </a14:m>
+                <a:endParaRPr lang="de-CH" dirty="0"/>
+              </a:p>
+            </p:txBody>
+          </p:sp>
+        </mc:Choice>
+        <mc:Fallback>
+          <p:sp>
+            <p:nvSpPr>
+              <p:cNvPr id="6" name="Title 5"/>
+              <p:cNvSpPr>
+                <a:spLocks noGrp="1" noRot="1" noChangeAspect="1" noMove="1" noResize="1" noEditPoints="1" noAdjustHandles="1" noChangeArrowheads="1" noChangeShapeType="1" noTextEdit="1"/>
+              </p:cNvSpPr>
+              <p:nvPr>
+                <p:ph type="title"/>
+              </p:nvPr>
+            </p:nvSpPr>
+            <p:spPr>
+              <a:xfrm>
+                <a:off x="323850" y="620714"/>
+                <a:ext cx="8496300" cy="812432"/>
+              </a:xfrm>
+              <a:blipFill>
+                <a:blip r:embed="rId2"/>
+                <a:stretch>
+                  <a:fillRect l="-861" t="-4511" b="-9023"/>
+                </a:stretch>
+              </a:blipFill>
+            </p:spPr>
+            <p:txBody>
+              <a:bodyPr/>
+              <a:lstStyle/>
+              <a:p>
+                <a:r>
+                  <a:rPr lang="de-CH">
+                    <a:noFill/>
+                  </a:rPr>
+                  <a:t> </a:t>
+                </a:r>
+              </a:p>
+            </p:txBody>
+          </p:sp>
+        </mc:Fallback>
+      </mc:AlternateContent>
+      <p:pic>
+        <p:nvPicPr>
+          <p:cNvPr id="10" name="Content Placeholder 9" descr="Screen Clipping"/>
+          <p:cNvPicPr>
+            <a:picLocks noGrp="1" noChangeAspect="1"/>
+          </p:cNvPicPr>
+          <p:nvPr>
+            <p:ph idx="1"/>
+          </p:nvPr>
+        </p:nvPicPr>
+        <p:blipFill rotWithShape="1">
+          <a:blip r:embed="rId3">
+            <a:extLst>
+              <a:ext uri="{28A0092B-C50C-407E-A947-70E740481C1C}">
+                <a14:useLocalDpi xmlns:a14="http://schemas.microsoft.com/office/drawing/2010/main" val="0"/>
+              </a:ext>
+            </a:extLst>
+          </a:blip>
+          <a:srcRect b="426"/>
+          <a:stretch/>
+        </p:blipFill>
+        <p:spPr>
+          <a:xfrm>
+            <a:off x="1321913" y="1652953"/>
+            <a:ext cx="6500175" cy="4563209"/>
+          </a:xfrm>
+        </p:spPr>
+      </p:pic>
+    </p:spTree>
+    <p:extLst>
+      <p:ext uri="{BB962C8B-B14F-4D97-AF65-F5344CB8AC3E}">
+        <p14:creationId xmlns:p14="http://schemas.microsoft.com/office/powerpoint/2010/main" val="1663886977"/>
+      </p:ext>
+    </p:extLst>
+  </p:cSld>
+  <p:clrMapOvr>
+    <a:masterClrMapping/>
+  </p:clrMapOvr>
+  <p:transition>
+    <p:fade/>
+  </p:transition>
+</p:sld>
+</file>
+
+<file path=ppt/slides/slide4.xml><?xml version="1.0" encoding="utf-8"?>
+<p:sld xmlns:a="http://schemas.openxmlformats.org/drawingml/2006/main" xmlns:r="http://schemas.openxmlformats.org/officeDocument/2006/relationships" xmlns:p="http://schemas.openxmlformats.org/presentationml/2006/main">
+  <p:cSld>
+    <p:spTree>
+      <p:nvGrpSpPr>
+        <p:cNvPr id="1" name=""/>
+        <p:cNvGrpSpPr/>
+        <p:nvPr/>
+      </p:nvGrpSpPr>
+      <p:grpSpPr>
+        <a:xfrm>
+          <a:off x="0" y="0"/>
+          <a:ext cx="0" cy="0"/>
+          <a:chOff x="0" y="0"/>
+          <a:chExt cx="0" cy="0"/>
+        </a:xfrm>
+      </p:grpSpPr>
+      <p:sp>
+        <p:nvSpPr>
+          <p:cNvPr id="3" name="Date Placeholder 2"/>
+          <p:cNvSpPr>
+            <a:spLocks noGrp="1"/>
+          </p:cNvSpPr>
+          <p:nvPr>
+            <p:ph type="dt" sz="half" idx="10"/>
+          </p:nvPr>
+        </p:nvSpPr>
+        <p:spPr/>
+        <p:txBody>
+          <a:bodyPr/>
+          <a:lstStyle/>
+          <a:p>
+            <a:r>
+              <a:rPr lang="de-DE" smtClean="0"/>
+              <a:t>21.12.2017</a:t>
+            </a:r>
+            <a:endParaRPr lang="de-DE"/>
+          </a:p>
+        </p:txBody>
+      </p:sp>
+      <p:sp>
+        <p:nvSpPr>
+          <p:cNvPr id="4" name="Footer Placeholder 3"/>
+          <p:cNvSpPr>
+            <a:spLocks noGrp="1"/>
+          </p:cNvSpPr>
+          <p:nvPr>
+            <p:ph type="ftr" sz="quarter" idx="11"/>
+          </p:nvPr>
+        </p:nvSpPr>
+        <p:spPr/>
+        <p:txBody>
+          <a:bodyPr/>
+          <a:lstStyle/>
+          <a:p>
+            <a:r>
+              <a:rPr lang="de-DE" smtClean="0"/>
+              <a:t>Samuel Maloney</a:t>
+            </a:r>
+            <a:endParaRPr lang="de-DE"/>
+          </a:p>
+        </p:txBody>
+      </p:sp>
+      <p:sp>
+        <p:nvSpPr>
+          <p:cNvPr id="5" name="Slide Number Placeholder 4"/>
+          <p:cNvSpPr>
+            <a:spLocks noGrp="1"/>
+          </p:cNvSpPr>
+          <p:nvPr>
+            <p:ph type="sldNum" sz="quarter" idx="12"/>
+          </p:nvPr>
+        </p:nvSpPr>
+        <p:spPr/>
+        <p:txBody>
+          <a:bodyPr/>
+          <a:lstStyle/>
+          <a:p>
+            <a:fld id="{6C6AE60A-B69C-4790-82F7-3882EDF23186}" type="slidenum">
+              <a:rPr lang="de-DE" smtClean="0"/>
+              <a:t>4</a:t>
+            </a:fld>
+            <a:endParaRPr lang="de-DE"/>
+          </a:p>
+        </p:txBody>
+      </p:sp>
+      <p:pic>
+        <p:nvPicPr>
+          <p:cNvPr id="8" name="Content Placeholder 7" descr="Screen Clipping"/>
+          <p:cNvPicPr>
+            <a:picLocks noGrp="1" noChangeAspect="1"/>
+          </p:cNvPicPr>
+          <p:nvPr>
+            <p:ph idx="1"/>
+          </p:nvPr>
+        </p:nvPicPr>
+        <p:blipFill>
+          <a:blip r:embed="rId2">
+            <a:extLst>
+              <a:ext uri="{28A0092B-C50C-407E-A947-70E740481C1C}">
+                <a14:useLocalDpi xmlns:a14="http://schemas.microsoft.com/office/drawing/2010/main" val="0"/>
+              </a:ext>
+            </a:extLst>
+          </a:blip>
+          <a:stretch>
+            <a:fillRect/>
+          </a:stretch>
+        </p:blipFill>
+        <p:spPr>
+          <a:xfrm>
+            <a:off x="1298097" y="1627336"/>
+            <a:ext cx="6547807" cy="4606778"/>
+          </a:xfrm>
+        </p:spPr>
+      </p:pic>
+      <mc:AlternateContent xmlns:mc="http://schemas.openxmlformats.org/markup-compatibility/2006">
+        <mc:Choice xmlns:a14="http://schemas.microsoft.com/office/drawing/2010/main" Requires="a14">
+          <p:sp>
+            <p:nvSpPr>
+              <p:cNvPr id="13" name="Title 5"/>
+              <p:cNvSpPr txBox="1">
+                <a:spLocks/>
+              </p:cNvSpPr>
+              <p:nvPr/>
+            </p:nvSpPr>
+            <p:spPr>
+              <a:xfrm>
+                <a:off x="323850" y="620714"/>
+                <a:ext cx="8496300" cy="812432"/>
+              </a:xfrm>
+              <a:prstGeom prst="rect">
+                <a:avLst/>
+              </a:prstGeom>
+              <a:solidFill>
+                <a:schemeClr val="bg1"/>
+              </a:solidFill>
+            </p:spPr>
+            <p:txBody>
+              <a:bodyPr vert="horz" lIns="140400" tIns="0" rIns="144000" bIns="0" rtlCol="0" anchor="b" anchorCtr="0">
+                <a:noAutofit/>
+              </a:bodyPr>
+              <a:lstStyle>
+                <a:lvl1pPr algn="l" defTabSz="914400" rtl="0" eaLnBrk="1" latinLnBrk="0" hangingPunct="1">
+                  <a:lnSpc>
+                    <a:spcPct val="100000"/>
+                  </a:lnSpc>
+                  <a:spcBef>
+                    <a:spcPct val="0"/>
+                  </a:spcBef>
+                  <a:buNone/>
+                  <a:defRPr sz="2800" b="1" kern="1200">
+                    <a:solidFill>
+                      <a:schemeClr val="tx1"/>
+                    </a:solidFill>
+                    <a:latin typeface="+mj-lt"/>
+                    <a:ea typeface="+mj-ea"/>
+                    <a:cs typeface="+mj-cs"/>
+                  </a:defRPr>
+                </a:lvl1pPr>
+              </a:lstStyle>
+              <a:p>
+                <a:pPr/>
+                <a:r>
+                  <a:rPr lang="en-US" dirty="0" smtClean="0"/>
+                  <a:t>TLES with Divergence Cleaning</a:t>
+                </a:r>
+                <a:r>
+                  <a:rPr lang="en-US" dirty="0"/>
+                  <a:t/>
+                </a:r>
+                <a:br>
+                  <a:rPr lang="en-US" dirty="0"/>
+                </a:br>
+                <a14:m>
+                  <m:oMathPara xmlns:m="http://schemas.openxmlformats.org/officeDocument/2006/math">
+                    <m:oMathParaPr>
+                      <m:jc m:val="left"/>
+                    </m:oMathParaPr>
+                    <m:oMath xmlns:m="http://schemas.openxmlformats.org/officeDocument/2006/math">
+                      <m:r>
+                        <a:rPr lang="en-US" sz="2000" smtClean="0">
+                          <a:latin typeface="Cambria Math" panose="02040503050406030204" pitchFamily="18" charset="0"/>
+                        </a:rPr>
+                        <m:t>𝚫</m:t>
+                      </m:r>
+                      <m:r>
+                        <a:rPr lang="en-US" sz="2000" smtClean="0">
+                          <a:latin typeface="Cambria Math" panose="02040503050406030204" pitchFamily="18" charset="0"/>
+                        </a:rPr>
+                        <m:t>𝐭</m:t>
+                      </m:r>
+                      <m:r>
+                        <a:rPr lang="en-US" sz="2000" smtClean="0">
+                          <a:latin typeface="Cambria Math" panose="02040503050406030204" pitchFamily="18" charset="0"/>
+                        </a:rPr>
+                        <m:t>=</m:t>
+                      </m:r>
+                      <m:r>
+                        <a:rPr lang="en-US" sz="2000" smtClean="0">
+                          <a:latin typeface="Cambria Math" panose="02040503050406030204" pitchFamily="18" charset="0"/>
+                        </a:rPr>
+                        <m:t>𝟏</m:t>
+                      </m:r>
+                      <m:sSup>
+                        <m:sSupPr>
+                          <m:ctrlPr>
+                            <a:rPr lang="en-US" sz="2000" smtClean="0">
+                              <a:latin typeface="Cambria Math" panose="02040503050406030204" pitchFamily="18" charset="0"/>
+                            </a:rPr>
+                          </m:ctrlPr>
+                        </m:sSupPr>
+                        <m:e>
+                          <m:r>
+                            <a:rPr lang="en-US" sz="2000" smtClean="0">
+                              <a:latin typeface="Cambria Math" panose="02040503050406030204" pitchFamily="18" charset="0"/>
+                            </a:rPr>
+                            <m:t>𝟎</m:t>
+                          </m:r>
+                        </m:e>
+                        <m:sup>
+                          <m:r>
+                            <a:rPr lang="en-US" sz="2000" smtClean="0">
+                              <a:latin typeface="Cambria Math" panose="02040503050406030204" pitchFamily="18" charset="0"/>
+                            </a:rPr>
+                            <m:t>−</m:t>
+                          </m:r>
+                          <m:r>
+                            <a:rPr lang="en-US" sz="2000" smtClean="0">
+                              <a:latin typeface="Cambria Math" panose="02040503050406030204" pitchFamily="18" charset="0"/>
+                            </a:rPr>
+                            <m:t>𝟔</m:t>
+                          </m:r>
+                        </m:sup>
+                      </m:sSup>
+                      <m:r>
+                        <a:rPr lang="en-US" sz="2000" smtClean="0">
+                          <a:latin typeface="Cambria Math" panose="02040503050406030204" pitchFamily="18" charset="0"/>
+                        </a:rPr>
+                        <m:t>,</m:t>
+                      </m:r>
+                      <m:sSub>
+                        <m:sSubPr>
+                          <m:ctrlPr>
+                            <a:rPr lang="en-US" sz="2000" i="1">
+                              <a:latin typeface="Cambria Math" panose="02040503050406030204" pitchFamily="18" charset="0"/>
+                            </a:rPr>
+                          </m:ctrlPr>
+                        </m:sSubPr>
+                        <m:e>
+                          <m:r>
+                            <a:rPr lang="en-US" sz="2000" i="1">
+                              <a:latin typeface="Cambria Math" panose="02040503050406030204" pitchFamily="18" charset="0"/>
+                            </a:rPr>
+                            <m:t>𝒕</m:t>
+                          </m:r>
+                        </m:e>
+                        <m:sub>
+                          <m:r>
+                            <a:rPr lang="en-US" sz="2000">
+                              <a:latin typeface="Cambria Math" panose="02040503050406030204" pitchFamily="18" charset="0"/>
+                            </a:rPr>
+                            <m:t>𝐟𝐢𝐧𝐚𝐥</m:t>
+                          </m:r>
+                        </m:sub>
+                      </m:sSub>
+                      <m:r>
+                        <a:rPr lang="en-US" sz="2000" i="1">
+                          <a:latin typeface="Cambria Math" panose="02040503050406030204" pitchFamily="18" charset="0"/>
+                        </a:rPr>
+                        <m:t>=</m:t>
+                      </m:r>
+                      <m:r>
+                        <a:rPr lang="en-US" sz="2000" i="1">
+                          <a:latin typeface="Cambria Math" panose="02040503050406030204" pitchFamily="18" charset="0"/>
+                        </a:rPr>
+                        <m:t>𝟎</m:t>
+                      </m:r>
+                      <m:r>
+                        <a:rPr lang="en-US" sz="2000" i="1">
+                          <a:latin typeface="Cambria Math" panose="02040503050406030204" pitchFamily="18" charset="0"/>
+                        </a:rPr>
+                        <m:t>.</m:t>
+                      </m:r>
+                      <m:r>
+                        <a:rPr lang="en-US" sz="2000" i="1">
+                          <a:latin typeface="Cambria Math" panose="02040503050406030204" pitchFamily="18" charset="0"/>
+                        </a:rPr>
+                        <m:t>𝟏</m:t>
+                      </m:r>
+                    </m:oMath>
+                  </m:oMathPara>
+                </a14:m>
+                <a:endParaRPr lang="de-CH" dirty="0"/>
+              </a:p>
+            </p:txBody>
+          </p:sp>
+        </mc:Choice>
+        <mc:Fallback>
+          <p:sp>
+            <p:nvSpPr>
+              <p:cNvPr id="13" name="Title 5"/>
+              <p:cNvSpPr txBox="1">
+                <a:spLocks noRot="1" noChangeAspect="1" noMove="1" noResize="1" noEditPoints="1" noAdjustHandles="1" noChangeArrowheads="1" noChangeShapeType="1" noTextEdit="1"/>
+              </p:cNvSpPr>
+              <p:nvPr/>
+            </p:nvSpPr>
+            <p:spPr>
+              <a:xfrm>
+                <a:off x="323850" y="620714"/>
+                <a:ext cx="8496300" cy="812432"/>
+              </a:xfrm>
+              <a:prstGeom prst="rect">
+                <a:avLst/>
+              </a:prstGeom>
+              <a:blipFill>
+                <a:blip r:embed="rId3"/>
+                <a:stretch>
+                  <a:fillRect l="-861" t="-4511" b="-9023"/>
+                </a:stretch>
+              </a:blipFill>
+            </p:spPr>
+            <p:txBody>
+              <a:bodyPr/>
+              <a:lstStyle/>
+              <a:p>
+                <a:r>
+                  <a:rPr lang="de-CH">
+                    <a:noFill/>
+                  </a:rPr>
+                  <a:t> </a:t>
+                </a:r>
+              </a:p>
+            </p:txBody>
+          </p:sp>
+        </mc:Fallback>
+      </mc:AlternateContent>
+    </p:spTree>
+    <p:extLst>
+      <p:ext uri="{BB962C8B-B14F-4D97-AF65-F5344CB8AC3E}">
+        <p14:creationId xmlns:p14="http://schemas.microsoft.com/office/powerpoint/2010/main" val="175526039"/>
+      </p:ext>
+    </p:extLst>
+  </p:cSld>
+  <p:clrMapOvr>
+    <a:masterClrMapping/>
+  </p:clrMapOvr>
+  <p:transition>
+    <p:fade/>
+  </p:transition>
+</p:sld>
+</file>
+
+<file path=ppt/slides/slide5.xml><?xml version="1.0" encoding="utf-8"?>
+<p:sld xmlns:a="http://schemas.openxmlformats.org/drawingml/2006/main" xmlns:r="http://schemas.openxmlformats.org/officeDocument/2006/relationships" xmlns:p="http://schemas.openxmlformats.org/presentationml/2006/main">
+  <p:cSld>
+    <p:spTree>
+      <p:nvGrpSpPr>
+        <p:cNvPr id="1" name=""/>
+        <p:cNvGrpSpPr/>
+        <p:nvPr/>
+      </p:nvGrpSpPr>
+      <p:grpSpPr>
+        <a:xfrm>
+          <a:off x="0" y="0"/>
+          <a:ext cx="0" cy="0"/>
+          <a:chOff x="0" y="0"/>
+          <a:chExt cx="0" cy="0"/>
+        </a:xfrm>
+      </p:grpSpPr>
+      <p:sp>
+        <p:nvSpPr>
+          <p:cNvPr id="3" name="Date Placeholder 2"/>
+          <p:cNvSpPr>
+            <a:spLocks noGrp="1"/>
+          </p:cNvSpPr>
+          <p:nvPr>
+            <p:ph type="dt" sz="half" idx="10"/>
+          </p:nvPr>
+        </p:nvSpPr>
+        <p:spPr/>
+        <p:txBody>
+          <a:bodyPr/>
+          <a:lstStyle/>
+          <a:p>
+            <a:r>
+              <a:rPr lang="de-DE" smtClean="0"/>
+              <a:t>21.12.2017</a:t>
+            </a:r>
+            <a:endParaRPr lang="de-DE"/>
+          </a:p>
+        </p:txBody>
+      </p:sp>
+      <p:sp>
+        <p:nvSpPr>
+          <p:cNvPr id="4" name="Footer Placeholder 3"/>
+          <p:cNvSpPr>
+            <a:spLocks noGrp="1"/>
+          </p:cNvSpPr>
+          <p:nvPr>
+            <p:ph type="ftr" sz="quarter" idx="11"/>
+          </p:nvPr>
+        </p:nvSpPr>
+        <p:spPr/>
+        <p:txBody>
+          <a:bodyPr/>
+          <a:lstStyle/>
+          <a:p>
+            <a:r>
+              <a:rPr lang="de-DE" smtClean="0"/>
+              <a:t>Samuel Maloney</a:t>
+            </a:r>
+            <a:endParaRPr lang="de-DE"/>
+          </a:p>
+        </p:txBody>
+      </p:sp>
+      <p:sp>
+        <p:nvSpPr>
+          <p:cNvPr id="5" name="Slide Number Placeholder 4"/>
+          <p:cNvSpPr>
+            <a:spLocks noGrp="1"/>
+          </p:cNvSpPr>
+          <p:nvPr>
+            <p:ph type="sldNum" sz="quarter" idx="12"/>
+          </p:nvPr>
+        </p:nvSpPr>
+        <p:spPr/>
+        <p:txBody>
+          <a:bodyPr/>
+          <a:lstStyle/>
+          <a:p>
+            <a:fld id="{6C6AE60A-B69C-4790-82F7-3882EDF23186}" type="slidenum">
+              <a:rPr lang="de-DE" smtClean="0"/>
+              <a:t>5</a:t>
+            </a:fld>
+            <a:endParaRPr lang="de-DE"/>
+          </a:p>
+        </p:txBody>
+      </p:sp>
+      <p:sp>
+        <p:nvSpPr>
+          <p:cNvPr id="11" name="Title 5"/>
+          <p:cNvSpPr>
+            <a:spLocks noGrp="1"/>
+          </p:cNvSpPr>
+          <p:nvPr>
+            <p:ph type="title"/>
+          </p:nvPr>
+        </p:nvSpPr>
+        <p:spPr>
+          <a:xfrm>
+            <a:off x="323850" y="620714"/>
+            <a:ext cx="8496300" cy="478324"/>
+          </a:xfrm>
+        </p:spPr>
+        <p:txBody>
+          <a:bodyPr/>
+          <a:lstStyle/>
+          <a:p>
+            <a:r>
+              <a:rPr lang="en-US" dirty="0" smtClean="0"/>
+              <a:t>TLES with Regularization</a:t>
+            </a:r>
+            <a:endParaRPr lang="de-CH" dirty="0"/>
+          </a:p>
+        </p:txBody>
+      </p:sp>
+      <p:pic>
+        <p:nvPicPr>
+          <p:cNvPr id="6" name="Content Placeholder 5" descr="Screen Clipping"/>
+          <p:cNvPicPr>
+            <a:picLocks noGrp="1" noChangeAspect="1"/>
+          </p:cNvPicPr>
+          <p:nvPr>
+            <p:ph idx="1"/>
+          </p:nvPr>
+        </p:nvPicPr>
+        <p:blipFill>
+          <a:blip r:embed="rId2">
+            <a:extLst>
+              <a:ext uri="{28A0092B-C50C-407E-A947-70E740481C1C}">
+                <a14:useLocalDpi xmlns:a14="http://schemas.microsoft.com/office/drawing/2010/main" val="0"/>
+              </a:ext>
+            </a:extLst>
+          </a:blip>
+          <a:stretch>
+            <a:fillRect/>
+          </a:stretch>
+        </p:blipFill>
+        <p:spPr>
+          <a:xfrm>
+            <a:off x="1335576" y="1673013"/>
+            <a:ext cx="6472848" cy="4561100"/>
+          </a:xfrm>
+        </p:spPr>
+      </p:pic>
+      <mc:AlternateContent xmlns:mc="http://schemas.openxmlformats.org/markup-compatibility/2006">
+        <mc:Choice xmlns:a14="http://schemas.microsoft.com/office/drawing/2010/main" Requires="a14">
+          <p:sp>
+            <p:nvSpPr>
+              <p:cNvPr id="9" name="Title 5"/>
+              <p:cNvSpPr txBox="1">
+                <a:spLocks/>
+              </p:cNvSpPr>
+              <p:nvPr/>
+            </p:nvSpPr>
+            <p:spPr>
+              <a:xfrm>
+                <a:off x="323850" y="620714"/>
+                <a:ext cx="8496300" cy="812432"/>
+              </a:xfrm>
+              <a:prstGeom prst="rect">
+                <a:avLst/>
+              </a:prstGeom>
+              <a:solidFill>
+                <a:schemeClr val="bg1"/>
+              </a:solidFill>
+            </p:spPr>
+            <p:txBody>
+              <a:bodyPr vert="horz" lIns="140400" tIns="0" rIns="144000" bIns="0" rtlCol="0" anchor="b" anchorCtr="0">
+                <a:noAutofit/>
+              </a:bodyPr>
+              <a:lstStyle>
+                <a:lvl1pPr algn="l" defTabSz="914400" rtl="0" eaLnBrk="1" latinLnBrk="0" hangingPunct="1">
+                  <a:lnSpc>
+                    <a:spcPct val="100000"/>
+                  </a:lnSpc>
+                  <a:spcBef>
+                    <a:spcPct val="0"/>
+                  </a:spcBef>
+                  <a:buNone/>
+                  <a:defRPr sz="2800" b="1" kern="1200">
+                    <a:solidFill>
+                      <a:schemeClr val="tx1"/>
+                    </a:solidFill>
+                    <a:latin typeface="+mj-lt"/>
+                    <a:ea typeface="+mj-ea"/>
+                    <a:cs typeface="+mj-cs"/>
+                  </a:defRPr>
+                </a:lvl1pPr>
+              </a:lstStyle>
+              <a:p>
+                <a:pPr/>
+                <a:r>
+                  <a:rPr lang="en-US" dirty="0" smtClean="0"/>
+                  <a:t>TLES with Regularization</a:t>
+                </a:r>
+                <a:r>
+                  <a:rPr lang="en-US" dirty="0"/>
+                  <a:t/>
+                </a:r>
+                <a:br>
+                  <a:rPr lang="en-US" dirty="0"/>
+                </a:br>
+                <a14:m>
+                  <m:oMathPara xmlns:m="http://schemas.openxmlformats.org/officeDocument/2006/math">
+                    <m:oMathParaPr>
+                      <m:jc m:val="left"/>
+                    </m:oMathParaPr>
+                    <m:oMath xmlns:m="http://schemas.openxmlformats.org/officeDocument/2006/math">
+                      <m:r>
+                        <a:rPr lang="en-US" sz="2000" smtClean="0">
+                          <a:latin typeface="Cambria Math" panose="02040503050406030204" pitchFamily="18" charset="0"/>
+                        </a:rPr>
+                        <m:t>𝚫</m:t>
+                      </m:r>
+                      <m:r>
+                        <a:rPr lang="en-US" sz="2000" smtClean="0">
+                          <a:latin typeface="Cambria Math" panose="02040503050406030204" pitchFamily="18" charset="0"/>
+                        </a:rPr>
+                        <m:t>𝐭</m:t>
+                      </m:r>
+                      <m:r>
+                        <a:rPr lang="en-US" sz="2000" smtClean="0">
+                          <a:latin typeface="Cambria Math" panose="02040503050406030204" pitchFamily="18" charset="0"/>
+                        </a:rPr>
+                        <m:t>=</m:t>
+                      </m:r>
+                      <m:r>
+                        <a:rPr lang="en-US" sz="2000" smtClean="0">
+                          <a:latin typeface="Cambria Math" panose="02040503050406030204" pitchFamily="18" charset="0"/>
+                        </a:rPr>
+                        <m:t>𝟏</m:t>
+                      </m:r>
+                      <m:sSup>
+                        <m:sSupPr>
+                          <m:ctrlPr>
+                            <a:rPr lang="en-US" sz="2000" smtClean="0">
+                              <a:latin typeface="Cambria Math" panose="02040503050406030204" pitchFamily="18" charset="0"/>
+                            </a:rPr>
+                          </m:ctrlPr>
+                        </m:sSupPr>
+                        <m:e>
+                          <m:r>
+                            <a:rPr lang="en-US" sz="2000" smtClean="0">
+                              <a:latin typeface="Cambria Math" panose="02040503050406030204" pitchFamily="18" charset="0"/>
+                            </a:rPr>
+                            <m:t>𝟎</m:t>
+                          </m:r>
+                        </m:e>
+                        <m:sup>
+                          <m:r>
+                            <a:rPr lang="en-US" sz="2000" smtClean="0">
+                              <a:latin typeface="Cambria Math" panose="02040503050406030204" pitchFamily="18" charset="0"/>
+                            </a:rPr>
+                            <m:t>−</m:t>
+                          </m:r>
+                          <m:r>
+                            <a:rPr lang="en-US" sz="2000" smtClean="0">
+                              <a:latin typeface="Cambria Math" panose="02040503050406030204" pitchFamily="18" charset="0"/>
+                            </a:rPr>
+                            <m:t>𝟔</m:t>
+                          </m:r>
+                        </m:sup>
+                      </m:sSup>
+                      <m:r>
+                        <a:rPr lang="en-US" sz="2000" smtClean="0">
+                          <a:latin typeface="Cambria Math" panose="02040503050406030204" pitchFamily="18" charset="0"/>
+                        </a:rPr>
+                        <m:t>,</m:t>
+                      </m:r>
+                      <m:sSub>
+                        <m:sSubPr>
+                          <m:ctrlPr>
+                            <a:rPr lang="en-US" sz="2000" i="1">
+                              <a:latin typeface="Cambria Math" panose="02040503050406030204" pitchFamily="18" charset="0"/>
+                            </a:rPr>
+                          </m:ctrlPr>
+                        </m:sSubPr>
+                        <m:e>
+                          <m:r>
+                            <a:rPr lang="en-US" sz="2000" i="1">
+                              <a:latin typeface="Cambria Math" panose="02040503050406030204" pitchFamily="18" charset="0"/>
+                            </a:rPr>
+                            <m:t>𝒕</m:t>
+                          </m:r>
+                        </m:e>
+                        <m:sub>
+                          <m:r>
+                            <a:rPr lang="en-US" sz="2000">
+                              <a:latin typeface="Cambria Math" panose="02040503050406030204" pitchFamily="18" charset="0"/>
+                            </a:rPr>
+                            <m:t>𝐟𝐢𝐧𝐚𝐥</m:t>
+                          </m:r>
+                          <m:r>
+                            <a:rPr lang="en-US" sz="2000" b="1" i="0" smtClean="0">
+                              <a:latin typeface="Cambria Math" panose="02040503050406030204" pitchFamily="18" charset="0"/>
+                            </a:rPr>
+                            <m:t>,</m:t>
+                          </m:r>
+                          <m:r>
+                            <a:rPr lang="en-US" sz="2000" b="1" i="0" smtClean="0">
+                              <a:latin typeface="Cambria Math" panose="02040503050406030204" pitchFamily="18" charset="0"/>
+                            </a:rPr>
+                            <m:t>𝐃𝐍𝐒</m:t>
+                          </m:r>
+                        </m:sub>
+                      </m:sSub>
+                      <m:r>
+                        <a:rPr lang="en-US" sz="2000" i="1">
+                          <a:latin typeface="Cambria Math" panose="02040503050406030204" pitchFamily="18" charset="0"/>
+                        </a:rPr>
+                        <m:t>=</m:t>
+                      </m:r>
+                      <m:r>
+                        <a:rPr lang="en-US" sz="2000" i="1">
+                          <a:latin typeface="Cambria Math" panose="02040503050406030204" pitchFamily="18" charset="0"/>
+                        </a:rPr>
+                        <m:t>𝟎</m:t>
+                      </m:r>
+                      <m:r>
+                        <a:rPr lang="en-US" sz="2000" i="1">
+                          <a:latin typeface="Cambria Math" panose="02040503050406030204" pitchFamily="18" charset="0"/>
+                        </a:rPr>
+                        <m:t>.</m:t>
+                      </m:r>
+                      <m:r>
+                        <a:rPr lang="en-US" sz="2000" i="1">
+                          <a:latin typeface="Cambria Math" panose="02040503050406030204" pitchFamily="18" charset="0"/>
+                        </a:rPr>
+                        <m:t>𝟏</m:t>
+                      </m:r>
+                      <m:r>
+                        <a:rPr lang="en-US" sz="2000" b="1" i="0" smtClean="0">
+                          <a:latin typeface="Cambria Math" panose="02040503050406030204" pitchFamily="18" charset="0"/>
+                        </a:rPr>
+                        <m:t>,</m:t>
+                      </m:r>
+                      <m:sSub>
+                        <m:sSubPr>
+                          <m:ctrlPr>
+                            <a:rPr lang="en-US" sz="2000" i="1">
+                              <a:latin typeface="Cambria Math" panose="02040503050406030204" pitchFamily="18" charset="0"/>
+                            </a:rPr>
+                          </m:ctrlPr>
+                        </m:sSubPr>
+                        <m:e>
+                          <m:r>
+                            <a:rPr lang="en-US" sz="2000" i="1">
+                              <a:latin typeface="Cambria Math" panose="02040503050406030204" pitchFamily="18" charset="0"/>
+                            </a:rPr>
+                            <m:t>𝒕</m:t>
+                          </m:r>
+                        </m:e>
+                        <m:sub>
+                          <m:r>
+                            <a:rPr lang="en-US" sz="2000">
+                              <a:latin typeface="Cambria Math" panose="02040503050406030204" pitchFamily="18" charset="0"/>
+                            </a:rPr>
+                            <m:t>𝐟𝐢𝐧𝐚𝐥</m:t>
+                          </m:r>
+                          <m:r>
+                            <a:rPr lang="en-US" sz="2000">
+                              <a:latin typeface="Cambria Math" panose="02040503050406030204" pitchFamily="18" charset="0"/>
+                            </a:rPr>
+                            <m:t>,</m:t>
+                          </m:r>
+                          <m:r>
+                            <a:rPr lang="en-US" sz="2000" b="1" i="0" smtClean="0">
+                              <a:latin typeface="Cambria Math" panose="02040503050406030204" pitchFamily="18" charset="0"/>
+                            </a:rPr>
+                            <m:t>𝐫</m:t>
+                          </m:r>
+                          <m:r>
+                            <a:rPr lang="en-US" sz="2000" b="1" i="0" smtClean="0">
+                              <a:latin typeface="Cambria Math" panose="02040503050406030204" pitchFamily="18" charset="0"/>
+                            </a:rPr>
+                            <m:t>=</m:t>
+                          </m:r>
+                          <m:r>
+                            <a:rPr lang="en-US" sz="2000" b="1" i="0" smtClean="0">
+                              <a:latin typeface="Cambria Math" panose="02040503050406030204" pitchFamily="18" charset="0"/>
+                            </a:rPr>
+                            <m:t>𝟑𝟎</m:t>
+                          </m:r>
+                        </m:sub>
+                      </m:sSub>
+                      <m:r>
+                        <a:rPr lang="en-US" sz="2000" i="1">
+                          <a:latin typeface="Cambria Math" panose="02040503050406030204" pitchFamily="18" charset="0"/>
+                        </a:rPr>
+                        <m:t>=</m:t>
+                      </m:r>
+                      <m:r>
+                        <a:rPr lang="en-US" sz="2000" b="1" i="1" smtClean="0">
+                          <a:latin typeface="Cambria Math" panose="02040503050406030204" pitchFamily="18" charset="0"/>
+                        </a:rPr>
+                        <m:t>𝟖</m:t>
+                      </m:r>
+                      <m:r>
+                        <a:rPr lang="en-US" sz="2000" b="1" i="1" smtClean="0">
+                          <a:latin typeface="Cambria Math" panose="02040503050406030204" pitchFamily="18" charset="0"/>
+                        </a:rPr>
+                        <m:t>.</m:t>
+                      </m:r>
+                      <m:r>
+                        <a:rPr lang="en-US" sz="2000" b="1" i="1" smtClean="0">
+                          <a:latin typeface="Cambria Math" panose="02040503050406030204" pitchFamily="18" charset="0"/>
+                        </a:rPr>
+                        <m:t>𝟒</m:t>
+                      </m:r>
+                    </m:oMath>
+                  </m:oMathPara>
+                </a14:m>
+                <a:endParaRPr lang="de-CH" sz="2000" dirty="0"/>
+              </a:p>
+            </p:txBody>
+          </p:sp>
+        </mc:Choice>
+        <mc:Fallback>
+          <p:sp>
+            <p:nvSpPr>
+              <p:cNvPr id="9" name="Title 5"/>
+              <p:cNvSpPr txBox="1">
+                <a:spLocks noRot="1" noChangeAspect="1" noMove="1" noResize="1" noEditPoints="1" noAdjustHandles="1" noChangeArrowheads="1" noChangeShapeType="1" noTextEdit="1"/>
+              </p:cNvSpPr>
+              <p:nvPr/>
+            </p:nvSpPr>
+            <p:spPr>
+              <a:xfrm>
+                <a:off x="323850" y="620714"/>
+                <a:ext cx="8496300" cy="812432"/>
+              </a:xfrm>
+              <a:prstGeom prst="rect">
+                <a:avLst/>
+              </a:prstGeom>
+              <a:blipFill>
+                <a:blip r:embed="rId3"/>
+                <a:stretch>
+                  <a:fillRect l="-861" t="-6767" b="-6767"/>
+                </a:stretch>
+              </a:blipFill>
+            </p:spPr>
+            <p:txBody>
+              <a:bodyPr/>
+              <a:lstStyle/>
+              <a:p>
+                <a:r>
+                  <a:rPr lang="de-CH">
+                    <a:noFill/>
+                  </a:rPr>
+                  <a:t> </a:t>
+                </a:r>
+              </a:p>
+            </p:txBody>
+          </p:sp>
+        </mc:Fallback>
+      </mc:AlternateContent>
+    </p:spTree>
+    <p:extLst>
+      <p:ext uri="{BB962C8B-B14F-4D97-AF65-F5344CB8AC3E}">
+        <p14:creationId xmlns:p14="http://schemas.microsoft.com/office/powerpoint/2010/main" val="1810694525"/>
+      </p:ext>
+    </p:extLst>
+  </p:cSld>
+  <p:clrMapOvr>
+    <a:masterClrMapping/>
+  </p:clrMapOvr>
+  <p:transition>
+    <p:fade/>
+  </p:transition>
+</p:sld>
+</file>
+
+<file path=ppt/slides/slide6.xml><?xml version="1.0" encoding="utf-8"?>
+<p:sld xmlns:a="http://schemas.openxmlformats.org/drawingml/2006/main" xmlns:r="http://schemas.openxmlformats.org/officeDocument/2006/relationships" xmlns:p="http://schemas.openxmlformats.org/presentationml/2006/main">
+  <p:cSld>
+    <p:spTree>
+      <p:nvGrpSpPr>
+        <p:cNvPr id="1" name=""/>
+        <p:cNvGrpSpPr/>
+        <p:nvPr/>
+      </p:nvGrpSpPr>
+      <p:grpSpPr>
+        <a:xfrm>
+          <a:off x="0" y="0"/>
+          <a:ext cx="0" cy="0"/>
+          <a:chOff x="0" y="0"/>
+          <a:chExt cx="0" cy="0"/>
+        </a:xfrm>
+      </p:grpSpPr>
+      <p:sp>
+        <p:nvSpPr>
+          <p:cNvPr id="3" name="Date Placeholder 2"/>
+          <p:cNvSpPr>
+            <a:spLocks noGrp="1"/>
+          </p:cNvSpPr>
+          <p:nvPr>
+            <p:ph type="dt" sz="half" idx="10"/>
+          </p:nvPr>
+        </p:nvSpPr>
+        <p:spPr/>
+        <p:txBody>
+          <a:bodyPr/>
+          <a:lstStyle/>
+          <a:p>
+            <a:r>
+              <a:rPr lang="de-DE" smtClean="0"/>
+              <a:t>21.12.2017</a:t>
+            </a:r>
+            <a:endParaRPr lang="de-DE"/>
+          </a:p>
+        </p:txBody>
+      </p:sp>
+      <p:sp>
+        <p:nvSpPr>
+          <p:cNvPr id="4" name="Footer Placeholder 3"/>
+          <p:cNvSpPr>
+            <a:spLocks noGrp="1"/>
+          </p:cNvSpPr>
+          <p:nvPr>
+            <p:ph type="ftr" sz="quarter" idx="11"/>
+          </p:nvPr>
+        </p:nvSpPr>
+        <p:spPr/>
+        <p:txBody>
+          <a:bodyPr/>
+          <a:lstStyle/>
+          <a:p>
+            <a:r>
+              <a:rPr lang="de-DE" smtClean="0"/>
+              <a:t>Samuel Maloney</a:t>
+            </a:r>
+            <a:endParaRPr lang="de-DE"/>
+          </a:p>
+        </p:txBody>
+      </p:sp>
+      <p:sp>
+        <p:nvSpPr>
+          <p:cNvPr id="5" name="Slide Number Placeholder 4"/>
+          <p:cNvSpPr>
+            <a:spLocks noGrp="1"/>
+          </p:cNvSpPr>
+          <p:nvPr>
+            <p:ph type="sldNum" sz="quarter" idx="12"/>
+          </p:nvPr>
+        </p:nvSpPr>
+        <p:spPr/>
+        <p:txBody>
+          <a:bodyPr/>
+          <a:lstStyle/>
+          <a:p>
+            <a:fld id="{6C6AE60A-B69C-4790-82F7-3882EDF23186}" type="slidenum">
+              <a:rPr lang="de-DE" smtClean="0"/>
+              <a:t>6</a:t>
+            </a:fld>
+            <a:endParaRPr lang="de-DE"/>
+          </a:p>
+        </p:txBody>
+      </p:sp>
+      <p:sp>
+        <p:nvSpPr>
+          <p:cNvPr id="11" name="Title 5"/>
+          <p:cNvSpPr>
+            <a:spLocks noGrp="1"/>
+          </p:cNvSpPr>
+          <p:nvPr>
+            <p:ph type="title"/>
+          </p:nvPr>
+        </p:nvSpPr>
+        <p:spPr>
+          <a:xfrm>
+            <a:off x="323850" y="620714"/>
+            <a:ext cx="8496300" cy="478324"/>
+          </a:xfrm>
+        </p:spPr>
+        <p:txBody>
+          <a:bodyPr/>
+          <a:lstStyle/>
+          <a:p>
+            <a:r>
+              <a:rPr lang="en-US" dirty="0" smtClean="0"/>
+              <a:t>TLES with Regularization</a:t>
+            </a:r>
+            <a:endParaRPr lang="de-CH" dirty="0"/>
+          </a:p>
+        </p:txBody>
+      </p:sp>
+      <mc:AlternateContent xmlns:mc="http://schemas.openxmlformats.org/markup-compatibility/2006">
+        <mc:Choice xmlns:a14="http://schemas.microsoft.com/office/drawing/2010/main" Requires="a14">
+          <p:sp>
+            <p:nvSpPr>
+              <p:cNvPr id="9" name="Title 5"/>
+              <p:cNvSpPr txBox="1">
+                <a:spLocks/>
+              </p:cNvSpPr>
+              <p:nvPr/>
+            </p:nvSpPr>
+            <p:spPr>
+              <a:xfrm>
+                <a:off x="323850" y="620714"/>
+                <a:ext cx="8496300" cy="478324"/>
+              </a:xfrm>
+              <a:prstGeom prst="rect">
+                <a:avLst/>
+              </a:prstGeom>
+              <a:solidFill>
+                <a:schemeClr val="bg1"/>
+              </a:solidFill>
+            </p:spPr>
+            <p:txBody>
+              <a:bodyPr vert="horz" lIns="140400" tIns="0" rIns="144000" bIns="0" rtlCol="0" anchor="b" anchorCtr="0">
+                <a:noAutofit/>
+              </a:bodyPr>
+              <a:lstStyle>
+                <a:lvl1pPr algn="l" defTabSz="914400" rtl="0" eaLnBrk="1" latinLnBrk="0" hangingPunct="1">
+                  <a:lnSpc>
+                    <a:spcPct val="100000"/>
+                  </a:lnSpc>
+                  <a:spcBef>
+                    <a:spcPct val="0"/>
+                  </a:spcBef>
+                  <a:buNone/>
+                  <a:defRPr sz="2800" b="1" kern="1200">
+                    <a:solidFill>
+                      <a:schemeClr val="tx1"/>
+                    </a:solidFill>
+                    <a:latin typeface="+mj-lt"/>
+                    <a:ea typeface="+mj-ea"/>
+                    <a:cs typeface="+mj-cs"/>
+                  </a:defRPr>
+                </a:lvl1pPr>
+              </a:lstStyle>
+              <a:p>
+                <a:pPr/>
+                <a:r>
+                  <a:rPr lang="en-US" dirty="0" smtClean="0"/>
+                  <a:t>Minimum </a:t>
+                </a:r>
+                <a14:m>
+                  <m:oMath xmlns:m="http://schemas.openxmlformats.org/officeDocument/2006/math">
+                    <m:r>
+                      <a:rPr lang="en-US" i="1">
+                        <a:latin typeface="Cambria Math" panose="02040503050406030204" pitchFamily="18" charset="0"/>
+                      </a:rPr>
+                      <m:t>𝝌</m:t>
+                    </m:r>
+                  </m:oMath>
+                </a14:m>
+                <a:r>
+                  <a:rPr lang="en-US" dirty="0" smtClean="0"/>
+                  <a:t> Required for Stabilization</a:t>
+                </a:r>
+              </a:p>
+            </p:txBody>
+          </p:sp>
+        </mc:Choice>
+        <mc:Fallback>
+          <p:sp>
+            <p:nvSpPr>
+              <p:cNvPr id="9" name="Title 5"/>
+              <p:cNvSpPr txBox="1">
+                <a:spLocks noRot="1" noChangeAspect="1" noMove="1" noResize="1" noEditPoints="1" noAdjustHandles="1" noChangeArrowheads="1" noChangeShapeType="1" noTextEdit="1"/>
+              </p:cNvSpPr>
+              <p:nvPr/>
+            </p:nvSpPr>
+            <p:spPr>
+              <a:xfrm>
+                <a:off x="323850" y="620714"/>
+                <a:ext cx="8496300" cy="478324"/>
+              </a:xfrm>
+              <a:prstGeom prst="rect">
+                <a:avLst/>
+              </a:prstGeom>
+              <a:blipFill>
+                <a:blip r:embed="rId2"/>
+                <a:stretch>
+                  <a:fillRect l="-861" t="-12821" b="-46154"/>
+                </a:stretch>
+              </a:blipFill>
+            </p:spPr>
+            <p:txBody>
+              <a:bodyPr/>
+              <a:lstStyle/>
+              <a:p>
+                <a:r>
+                  <a:rPr lang="de-CH">
+                    <a:noFill/>
+                  </a:rPr>
+                  <a:t> </a:t>
+                </a:r>
+              </a:p>
+            </p:txBody>
+          </p:sp>
+        </mc:Fallback>
+      </mc:AlternateContent>
+      <mc:AlternateContent xmlns:mc="http://schemas.openxmlformats.org/markup-compatibility/2006">
+        <mc:Choice xmlns:a14="http://schemas.microsoft.com/office/drawing/2010/main" Requires="a14">
+          <p:sp>
+            <p:nvSpPr>
+              <p:cNvPr id="8" name="Content Placeholder 7"/>
+              <p:cNvSpPr>
+                <a:spLocks noGrp="1"/>
+              </p:cNvSpPr>
+              <p:nvPr>
+                <p:ph idx="1"/>
+              </p:nvPr>
+            </p:nvSpPr>
+            <p:spPr/>
+            <p:txBody>
+              <a:bodyPr/>
+              <a:lstStyle/>
+              <a:p>
+                <a:r>
+                  <a:rPr lang="en-US" dirty="0" smtClean="0"/>
+                  <a:t>Large enough </a:t>
+                </a:r>
+                <a14:m>
+                  <m:oMath xmlns:m="http://schemas.openxmlformats.org/officeDocument/2006/math">
+                    <m:r>
+                      <a:rPr lang="en-US" b="0" i="1" smtClean="0">
+                        <a:latin typeface="Cambria Math" panose="02040503050406030204" pitchFamily="18" charset="0"/>
+                      </a:rPr>
+                      <m:t>𝜒</m:t>
+                    </m:r>
+                  </m:oMath>
+                </a14:m>
+                <a:r>
+                  <a:rPr lang="en-US" dirty="0" smtClean="0"/>
+                  <a:t> could stabilize any tested filter width</a:t>
+                </a:r>
+              </a:p>
+              <a:p>
+                <a:r>
+                  <a:rPr lang="en-US" dirty="0" smtClean="0"/>
+                  <a:t>Can also stabilize larger time steps </a:t>
+                </a:r>
+              </a:p>
+              <a:p>
+                <a:r>
+                  <a:rPr lang="en-US" dirty="0" smtClean="0"/>
+                  <a:t>However, time evolution becomes </a:t>
+                </a:r>
+                <a:r>
+                  <a:rPr lang="en-US" i="1" dirty="0" smtClean="0"/>
+                  <a:t>very</a:t>
+                </a:r>
+                <a:r>
+                  <a:rPr lang="en-US" dirty="0" smtClean="0"/>
+                  <a:t> slow!</a:t>
+                </a:r>
+              </a:p>
+              <a:p>
+                <a:r>
+                  <a:rPr lang="en-US" dirty="0" smtClean="0"/>
+                  <a:t>Desirable to use minimum </a:t>
+                </a:r>
+                <a14:m>
+                  <m:oMath xmlns:m="http://schemas.openxmlformats.org/officeDocument/2006/math">
+                    <m:r>
+                      <a:rPr lang="en-US" i="1">
+                        <a:latin typeface="Cambria Math" panose="02040503050406030204" pitchFamily="18" charset="0"/>
+                      </a:rPr>
+                      <m:t>𝜒</m:t>
+                    </m:r>
+                    <m:r>
+                      <a:rPr lang="en-US" i="1">
+                        <a:latin typeface="Cambria Math" panose="02040503050406030204" pitchFamily="18" charset="0"/>
+                      </a:rPr>
+                      <m:t> </m:t>
+                    </m:r>
+                  </m:oMath>
+                </a14:m>
+                <a:r>
+                  <a:rPr lang="en-US" dirty="0" smtClean="0"/>
+                  <a:t>which achieves stability</a:t>
+                </a:r>
+              </a:p>
+              <a:p>
+                <a:pPr lvl="1"/>
+                <a:r>
+                  <a:rPr lang="en-US" dirty="0" smtClean="0"/>
+                  <a:t>Is there an observable relationship to other parameters </a:t>
+                </a:r>
+                <a14:m>
+                  <m:oMath xmlns:m="http://schemas.openxmlformats.org/officeDocument/2006/math">
+                    <m:r>
+                      <a:rPr lang="en-US" b="0" i="1" smtClean="0">
+                        <a:latin typeface="Cambria Math" panose="02040503050406030204" pitchFamily="18" charset="0"/>
+                      </a:rPr>
+                      <m:t>𝑟</m:t>
+                    </m:r>
+                    <m:r>
+                      <a:rPr lang="en-US" b="0" i="1" smtClean="0">
+                        <a:latin typeface="Cambria Math" panose="02040503050406030204" pitchFamily="18" charset="0"/>
+                      </a:rPr>
+                      <m:t>, </m:t>
+                    </m:r>
+                    <m:acc>
+                      <m:accPr>
+                        <m:chr m:val="̃"/>
+                        <m:ctrlPr>
+                          <a:rPr lang="en-US" b="0" i="1" smtClean="0">
+                            <a:latin typeface="Cambria Math" panose="02040503050406030204" pitchFamily="18" charset="0"/>
+                          </a:rPr>
+                        </m:ctrlPr>
+                      </m:accPr>
+                      <m:e>
+                        <m:r>
+                          <a:rPr lang="en-US" b="0" i="1" smtClean="0">
+                            <a:latin typeface="Cambria Math" panose="02040503050406030204" pitchFamily="18" charset="0"/>
+                          </a:rPr>
+                          <m:t>𝑟</m:t>
+                        </m:r>
+                      </m:e>
+                    </m:acc>
+                    <m:r>
+                      <a:rPr lang="en-US" b="0" i="1" smtClean="0">
+                        <a:latin typeface="Cambria Math" panose="02040503050406030204" pitchFamily="18" charset="0"/>
+                      </a:rPr>
+                      <m:t>, </m:t>
+                    </m:r>
+                    <m:r>
+                      <m:rPr>
+                        <m:sty m:val="p"/>
+                      </m:rPr>
+                      <a:rPr lang="en-US" b="0" i="0" smtClean="0">
+                        <a:latin typeface="Cambria Math" panose="02040503050406030204" pitchFamily="18" charset="0"/>
+                      </a:rPr>
+                      <m:t>Δ</m:t>
+                    </m:r>
+                    <m:r>
+                      <a:rPr lang="en-US" b="0" i="1" smtClean="0">
+                        <a:latin typeface="Cambria Math" panose="02040503050406030204" pitchFamily="18" charset="0"/>
+                      </a:rPr>
+                      <m:t>𝑡</m:t>
+                    </m:r>
+                  </m:oMath>
+                </a14:m>
+                <a:endParaRPr lang="en-US" b="0" dirty="0" smtClean="0"/>
+              </a:p>
+              <a:p>
+                <a:endParaRPr lang="en-US" dirty="0" smtClean="0"/>
+              </a:p>
+              <a:p>
+                <a:r>
+                  <a:rPr lang="en-US" dirty="0" smtClean="0"/>
+                  <a:t>Various parameter sets were checked for stability over the first 100 time steps</a:t>
+                </a:r>
+                <a:endParaRPr lang="en-US" b="0" dirty="0" smtClean="0"/>
+              </a:p>
+            </p:txBody>
+          </p:sp>
+        </mc:Choice>
+        <mc:Fallback>
+          <p:sp>
+            <p:nvSpPr>
+              <p:cNvPr id="8" name="Content Placeholder 7"/>
+              <p:cNvSpPr>
+                <a:spLocks noGrp="1" noRot="1" noChangeAspect="1" noMove="1" noResize="1" noEditPoints="1" noAdjustHandles="1" noChangeArrowheads="1" noChangeShapeType="1" noTextEdit="1"/>
+              </p:cNvSpPr>
+              <p:nvPr>
+                <p:ph idx="1"/>
+              </p:nvPr>
+            </p:nvSpPr>
+            <p:spPr>
+              <a:blipFill>
+                <a:blip r:embed="rId3"/>
+                <a:stretch>
+                  <a:fillRect l="-359" t="-2026" r="-1148"/>
+                </a:stretch>
+              </a:blipFill>
+            </p:spPr>
+            <p:txBody>
+              <a:bodyPr/>
+              <a:lstStyle/>
+              <a:p>
+                <a:r>
+                  <a:rPr lang="de-CH">
+                    <a:noFill/>
+                  </a:rPr>
+                  <a:t> </a:t>
+                </a:r>
+              </a:p>
+            </p:txBody>
+          </p:sp>
+        </mc:Fallback>
+      </mc:AlternateContent>
+    </p:spTree>
+    <p:extLst>
+      <p:ext uri="{BB962C8B-B14F-4D97-AF65-F5344CB8AC3E}">
+        <p14:creationId xmlns:p14="http://schemas.microsoft.com/office/powerpoint/2010/main" val="3107038570"/>
+      </p:ext>
+    </p:extLst>
+  </p:cSld>
+  <p:clrMapOvr>
+    <a:masterClrMapping/>
+  </p:clrMapOvr>
+  <p:transition>
+    <p:fade/>
+  </p:transition>
+</p:sld>
+</file>
+
+<file path=ppt/slides/slide7.xml><?xml version="1.0" encoding="utf-8"?>
+<p:sld xmlns:a="http://schemas.openxmlformats.org/drawingml/2006/main" xmlns:r="http://schemas.openxmlformats.org/officeDocument/2006/relationships" xmlns:p="http://schemas.openxmlformats.org/presentationml/2006/main">
+  <p:cSld>
+    <p:spTree>
+      <p:nvGrpSpPr>
+        <p:cNvPr id="1" name=""/>
+        <p:cNvGrpSpPr/>
+        <p:nvPr/>
+      </p:nvGrpSpPr>
+      <p:grpSpPr>
+        <a:xfrm>
+          <a:off x="0" y="0"/>
+          <a:ext cx="0" cy="0"/>
+          <a:chOff x="0" y="0"/>
+          <a:chExt cx="0" cy="0"/>
+        </a:xfrm>
+      </p:grpSpPr>
+      <p:sp>
+        <p:nvSpPr>
+          <p:cNvPr id="3" name="Date Placeholder 2"/>
+          <p:cNvSpPr>
+            <a:spLocks noGrp="1"/>
+          </p:cNvSpPr>
+          <p:nvPr>
+            <p:ph type="dt" sz="half" idx="10"/>
+          </p:nvPr>
+        </p:nvSpPr>
+        <p:spPr/>
+        <p:txBody>
+          <a:bodyPr/>
+          <a:lstStyle/>
+          <a:p>
+            <a:r>
+              <a:rPr lang="de-DE" smtClean="0"/>
+              <a:t>21.12.2017</a:t>
+            </a:r>
+            <a:endParaRPr lang="de-DE"/>
+          </a:p>
+        </p:txBody>
+      </p:sp>
+      <p:sp>
+        <p:nvSpPr>
+          <p:cNvPr id="4" name="Footer Placeholder 3"/>
+          <p:cNvSpPr>
+            <a:spLocks noGrp="1"/>
+          </p:cNvSpPr>
+          <p:nvPr>
+            <p:ph type="ftr" sz="quarter" idx="11"/>
+          </p:nvPr>
+        </p:nvSpPr>
+        <p:spPr/>
+        <p:txBody>
+          <a:bodyPr/>
+          <a:lstStyle/>
+          <a:p>
+            <a:r>
+              <a:rPr lang="de-DE" smtClean="0"/>
+              <a:t>Samuel Maloney</a:t>
+            </a:r>
+            <a:endParaRPr lang="de-DE"/>
+          </a:p>
+        </p:txBody>
+      </p:sp>
+      <p:sp>
+        <p:nvSpPr>
+          <p:cNvPr id="5" name="Slide Number Placeholder 4"/>
+          <p:cNvSpPr>
+            <a:spLocks noGrp="1"/>
+          </p:cNvSpPr>
+          <p:nvPr>
+            <p:ph type="sldNum" sz="quarter" idx="12"/>
+          </p:nvPr>
+        </p:nvSpPr>
+        <p:spPr/>
+        <p:txBody>
+          <a:bodyPr/>
+          <a:lstStyle/>
+          <a:p>
+            <a:fld id="{6C6AE60A-B69C-4790-82F7-3882EDF23186}" type="slidenum">
+              <a:rPr lang="de-DE" smtClean="0"/>
+              <a:t>7</a:t>
+            </a:fld>
+            <a:endParaRPr lang="de-DE"/>
+          </a:p>
+        </p:txBody>
+      </p:sp>
+      <p:sp>
+        <p:nvSpPr>
+          <p:cNvPr id="11" name="Title 5"/>
+          <p:cNvSpPr>
+            <a:spLocks noGrp="1"/>
+          </p:cNvSpPr>
+          <p:nvPr>
+            <p:ph type="title"/>
+          </p:nvPr>
+        </p:nvSpPr>
+        <p:spPr>
+          <a:xfrm>
+            <a:off x="323850" y="620714"/>
+            <a:ext cx="8496300" cy="478324"/>
+          </a:xfrm>
+        </p:spPr>
+        <p:txBody>
+          <a:bodyPr/>
+          <a:lstStyle/>
+          <a:p>
+            <a:r>
+              <a:rPr lang="en-US" dirty="0" smtClean="0"/>
+              <a:t>TLES with Regularization</a:t>
+            </a:r>
+            <a:endParaRPr lang="de-CH" dirty="0"/>
+          </a:p>
+        </p:txBody>
+      </p:sp>
+      <mc:AlternateContent xmlns:mc="http://schemas.openxmlformats.org/markup-compatibility/2006">
+        <mc:Choice xmlns:a14="http://schemas.microsoft.com/office/drawing/2010/main" Requires="a14">
+          <p:sp>
+            <p:nvSpPr>
+              <p:cNvPr id="9" name="Title 5"/>
+              <p:cNvSpPr txBox="1">
+                <a:spLocks/>
+              </p:cNvSpPr>
+              <p:nvPr/>
+            </p:nvSpPr>
+            <p:spPr>
+              <a:xfrm>
+                <a:off x="323850" y="620714"/>
+                <a:ext cx="8496300" cy="812432"/>
+              </a:xfrm>
+              <a:prstGeom prst="rect">
+                <a:avLst/>
+              </a:prstGeom>
+              <a:solidFill>
+                <a:schemeClr val="bg1"/>
+              </a:solidFill>
+            </p:spPr>
+            <p:txBody>
+              <a:bodyPr vert="horz" lIns="140400" tIns="0" rIns="144000" bIns="0" rtlCol="0" anchor="b" anchorCtr="0">
+                <a:noAutofit/>
+              </a:bodyPr>
+              <a:lstStyle>
+                <a:lvl1pPr algn="l" defTabSz="914400" rtl="0" eaLnBrk="1" latinLnBrk="0" hangingPunct="1">
+                  <a:lnSpc>
+                    <a:spcPct val="100000"/>
+                  </a:lnSpc>
+                  <a:spcBef>
+                    <a:spcPct val="0"/>
+                  </a:spcBef>
+                  <a:buNone/>
+                  <a:defRPr sz="2800" b="1" kern="1200">
+                    <a:solidFill>
+                      <a:schemeClr val="tx1"/>
+                    </a:solidFill>
+                    <a:latin typeface="+mj-lt"/>
+                    <a:ea typeface="+mj-ea"/>
+                    <a:cs typeface="+mj-cs"/>
+                  </a:defRPr>
+                </a:lvl1pPr>
+              </a:lstStyle>
+              <a:p>
+                <a:pPr/>
+                <a:r>
+                  <a:rPr lang="en-US" dirty="0" smtClean="0"/>
+                  <a:t>Minimum </a:t>
+                </a:r>
+                <a14:m>
+                  <m:oMath xmlns:m="http://schemas.openxmlformats.org/officeDocument/2006/math">
+                    <m:r>
+                      <a:rPr lang="en-US" i="1">
+                        <a:latin typeface="Cambria Math" panose="02040503050406030204" pitchFamily="18" charset="0"/>
+                      </a:rPr>
+                      <m:t>𝝌</m:t>
+                    </m:r>
+                  </m:oMath>
+                </a14:m>
+                <a:r>
+                  <a:rPr lang="en-US" dirty="0" smtClean="0"/>
+                  <a:t> Required for Stabilization</a:t>
+                </a:r>
+              </a:p>
+              <a:p>
+                <a:pPr/>
+                <a14:m>
+                  <m:oMathPara xmlns:m="http://schemas.openxmlformats.org/officeDocument/2006/math">
+                    <m:oMathParaPr>
+                      <m:jc m:val="left"/>
+                    </m:oMathParaPr>
+                    <m:oMath xmlns:m="http://schemas.openxmlformats.org/officeDocument/2006/math">
+                      <m:r>
+                        <a:rPr lang="en-US" sz="2000" smtClean="0">
+                          <a:latin typeface="Cambria Math" panose="02040503050406030204" pitchFamily="18" charset="0"/>
+                        </a:rPr>
+                        <m:t>𝚫</m:t>
+                      </m:r>
+                      <m:r>
+                        <a:rPr lang="en-US" sz="2000" smtClean="0">
+                          <a:latin typeface="Cambria Math" panose="02040503050406030204" pitchFamily="18" charset="0"/>
+                        </a:rPr>
+                        <m:t>𝐭</m:t>
+                      </m:r>
+                      <m:r>
+                        <a:rPr lang="en-US" sz="2000" smtClean="0">
+                          <a:latin typeface="Cambria Math" panose="02040503050406030204" pitchFamily="18" charset="0"/>
+                        </a:rPr>
+                        <m:t>=</m:t>
+                      </m:r>
+                      <m:r>
+                        <a:rPr lang="en-US" sz="2000" smtClean="0">
+                          <a:latin typeface="Cambria Math" panose="02040503050406030204" pitchFamily="18" charset="0"/>
+                        </a:rPr>
+                        <m:t>𝟏</m:t>
+                      </m:r>
+                      <m:sSup>
+                        <m:sSupPr>
+                          <m:ctrlPr>
+                            <a:rPr lang="en-US" sz="2000" smtClean="0">
+                              <a:latin typeface="Cambria Math" panose="02040503050406030204" pitchFamily="18" charset="0"/>
+                            </a:rPr>
+                          </m:ctrlPr>
+                        </m:sSupPr>
+                        <m:e>
+                          <m:r>
+                            <a:rPr lang="en-US" sz="2000" smtClean="0">
+                              <a:latin typeface="Cambria Math" panose="02040503050406030204" pitchFamily="18" charset="0"/>
+                            </a:rPr>
+                            <m:t>𝟎</m:t>
+                          </m:r>
+                        </m:e>
+                        <m:sup>
+                          <m:r>
+                            <a:rPr lang="en-US" sz="2000" smtClean="0">
+                              <a:latin typeface="Cambria Math" panose="02040503050406030204" pitchFamily="18" charset="0"/>
+                            </a:rPr>
+                            <m:t>−</m:t>
+                          </m:r>
+                          <m:r>
+                            <a:rPr lang="en-US" sz="2000" b="1" i="0" smtClean="0">
+                              <a:latin typeface="Cambria Math" panose="02040503050406030204" pitchFamily="18" charset="0"/>
+                            </a:rPr>
+                            <m:t>𝟓</m:t>
+                          </m:r>
+                        </m:sup>
+                      </m:sSup>
+                      <m:r>
+                        <a:rPr lang="en-US" sz="2000" smtClean="0">
+                          <a:latin typeface="Cambria Math" panose="02040503050406030204" pitchFamily="18" charset="0"/>
+                        </a:rPr>
+                        <m:t>,</m:t>
+                      </m:r>
+                      <m:r>
+                        <a:rPr lang="en-US" sz="2000" b="1" i="0" smtClean="0">
+                          <a:latin typeface="Cambria Math" panose="02040503050406030204" pitchFamily="18" charset="0"/>
+                        </a:rPr>
+                        <m:t> </m:t>
+                      </m:r>
+                      <m:acc>
+                        <m:accPr>
+                          <m:chr m:val="̃"/>
+                          <m:ctrlPr>
+                            <a:rPr lang="en-US" sz="2000" b="1" i="1" smtClean="0">
+                              <a:latin typeface="Cambria Math" panose="02040503050406030204" pitchFamily="18" charset="0"/>
+                            </a:rPr>
+                          </m:ctrlPr>
+                        </m:accPr>
+                        <m:e>
+                          <m:r>
+                            <a:rPr lang="en-US" sz="2000" b="1" i="1" smtClean="0">
+                              <a:latin typeface="Cambria Math" panose="02040503050406030204" pitchFamily="18" charset="0"/>
+                            </a:rPr>
+                            <m:t>𝒓</m:t>
+                          </m:r>
+                        </m:e>
+                      </m:acc>
+                      <m:r>
+                        <a:rPr lang="en-US" sz="2000" b="1" i="1" smtClean="0">
+                          <a:latin typeface="Cambria Math" panose="02040503050406030204" pitchFamily="18" charset="0"/>
+                        </a:rPr>
+                        <m:t>=</m:t>
+                      </m:r>
+                      <m:r>
+                        <a:rPr lang="en-US" sz="2000" b="1" i="1" smtClean="0">
+                          <a:latin typeface="Cambria Math" panose="02040503050406030204" pitchFamily="18" charset="0"/>
+                        </a:rPr>
+                        <m:t>𝟏𝟎𝟎</m:t>
+                      </m:r>
+                    </m:oMath>
+                  </m:oMathPara>
+                </a14:m>
+                <a:endParaRPr lang="de-CH" sz="2000" dirty="0"/>
+              </a:p>
+            </p:txBody>
+          </p:sp>
+        </mc:Choice>
+        <mc:Fallback>
+          <p:sp>
+            <p:nvSpPr>
+              <p:cNvPr id="9" name="Title 5"/>
+              <p:cNvSpPr txBox="1">
+                <a:spLocks noRot="1" noChangeAspect="1" noMove="1" noResize="1" noEditPoints="1" noAdjustHandles="1" noChangeArrowheads="1" noChangeShapeType="1" noTextEdit="1"/>
+              </p:cNvSpPr>
+              <p:nvPr/>
+            </p:nvSpPr>
+            <p:spPr>
+              <a:xfrm>
+                <a:off x="323850" y="620714"/>
+                <a:ext cx="8496300" cy="812432"/>
+              </a:xfrm>
+              <a:prstGeom prst="rect">
+                <a:avLst/>
+              </a:prstGeom>
+              <a:blipFill>
+                <a:blip r:embed="rId2"/>
+                <a:stretch>
+                  <a:fillRect l="-861" t="-5263" b="-3759"/>
+                </a:stretch>
+              </a:blipFill>
+            </p:spPr>
+            <p:txBody>
+              <a:bodyPr/>
+              <a:lstStyle/>
+              <a:p>
+                <a:r>
+                  <a:rPr lang="de-CH">
+                    <a:noFill/>
+                  </a:rPr>
+                  <a:t> </a:t>
+                </a:r>
+              </a:p>
+            </p:txBody>
+          </p:sp>
+        </mc:Fallback>
+      </mc:AlternateContent>
+      <p:pic>
+        <p:nvPicPr>
+          <p:cNvPr id="7" name="Content Placeholder 6" descr="Screen Clipping"/>
+          <p:cNvPicPr>
+            <a:picLocks noGrp="1" noChangeAspect="1"/>
+          </p:cNvPicPr>
+          <p:nvPr>
+            <p:ph idx="1"/>
+          </p:nvPr>
+        </p:nvPicPr>
+        <p:blipFill>
+          <a:blip r:embed="rId3">
+            <a:extLst>
+              <a:ext uri="{28A0092B-C50C-407E-A947-70E740481C1C}">
+                <a14:useLocalDpi xmlns:a14="http://schemas.microsoft.com/office/drawing/2010/main" val="0"/>
+              </a:ext>
+            </a:extLst>
+          </a:blip>
+          <a:stretch>
+            <a:fillRect/>
+          </a:stretch>
+        </p:blipFill>
+        <p:spPr>
+          <a:xfrm>
+            <a:off x="1591826" y="2024063"/>
+            <a:ext cx="5960348" cy="4210050"/>
+          </a:xfrm>
+        </p:spPr>
+      </p:pic>
+    </p:spTree>
+    <p:extLst>
+      <p:ext uri="{BB962C8B-B14F-4D97-AF65-F5344CB8AC3E}">
+        <p14:creationId xmlns:p14="http://schemas.microsoft.com/office/powerpoint/2010/main" val="4096610612"/>
+      </p:ext>
+    </p:extLst>
+  </p:cSld>
+  <p:clrMapOvr>
+    <a:masterClrMapping/>
+  </p:clrMapOvr>
+  <p:transition>
+    <p:fade/>
+  </p:transition>
+</p:sld>
+</file>
+
+<file path=ppt/slides/slide8.xml><?xml version="1.0" encoding="utf-8"?>
+<p:sld xmlns:a="http://schemas.openxmlformats.org/drawingml/2006/main" xmlns:r="http://schemas.openxmlformats.org/officeDocument/2006/relationships" xmlns:p="http://schemas.openxmlformats.org/presentationml/2006/main">
+  <p:cSld>
+    <p:spTree>
+      <p:nvGrpSpPr>
+        <p:cNvPr id="1" name=""/>
+        <p:cNvGrpSpPr/>
+        <p:nvPr/>
+      </p:nvGrpSpPr>
+      <p:grpSpPr>
+        <a:xfrm>
+          <a:off x="0" y="0"/>
+          <a:ext cx="0" cy="0"/>
+          <a:chOff x="0" y="0"/>
+          <a:chExt cx="0" cy="0"/>
+        </a:xfrm>
+      </p:grpSpPr>
+      <p:sp>
+        <p:nvSpPr>
+          <p:cNvPr id="3" name="Date Placeholder 2"/>
+          <p:cNvSpPr>
+            <a:spLocks noGrp="1"/>
+          </p:cNvSpPr>
+          <p:nvPr>
+            <p:ph type="dt" sz="half" idx="10"/>
+          </p:nvPr>
+        </p:nvSpPr>
+        <p:spPr/>
+        <p:txBody>
+          <a:bodyPr/>
+          <a:lstStyle/>
+          <a:p>
+            <a:r>
+              <a:rPr lang="de-DE" smtClean="0"/>
+              <a:t>21.12.2017</a:t>
+            </a:r>
+            <a:endParaRPr lang="de-DE"/>
+          </a:p>
+        </p:txBody>
+      </p:sp>
+      <p:sp>
+        <p:nvSpPr>
+          <p:cNvPr id="4" name="Footer Placeholder 3"/>
+          <p:cNvSpPr>
+            <a:spLocks noGrp="1"/>
+          </p:cNvSpPr>
+          <p:nvPr>
+            <p:ph type="ftr" sz="quarter" idx="11"/>
+          </p:nvPr>
+        </p:nvSpPr>
+        <p:spPr/>
+        <p:txBody>
+          <a:bodyPr/>
+          <a:lstStyle/>
+          <a:p>
+            <a:r>
+              <a:rPr lang="de-DE" smtClean="0"/>
+              <a:t>Samuel Maloney</a:t>
+            </a:r>
+            <a:endParaRPr lang="de-DE"/>
+          </a:p>
+        </p:txBody>
+      </p:sp>
+      <p:sp>
+        <p:nvSpPr>
+          <p:cNvPr id="5" name="Slide Number Placeholder 4"/>
+          <p:cNvSpPr>
+            <a:spLocks noGrp="1"/>
+          </p:cNvSpPr>
+          <p:nvPr>
+            <p:ph type="sldNum" sz="quarter" idx="12"/>
+          </p:nvPr>
+        </p:nvSpPr>
+        <p:spPr/>
+        <p:txBody>
+          <a:bodyPr/>
+          <a:lstStyle/>
+          <a:p>
+            <a:fld id="{6C6AE60A-B69C-4790-82F7-3882EDF23186}" type="slidenum">
+              <a:rPr lang="de-DE" smtClean="0"/>
+              <a:t>8</a:t>
+            </a:fld>
+            <a:endParaRPr lang="de-DE"/>
+          </a:p>
+        </p:txBody>
+      </p:sp>
+      <p:sp>
+        <p:nvSpPr>
+          <p:cNvPr id="11" name="Title 5"/>
+          <p:cNvSpPr>
+            <a:spLocks noGrp="1"/>
+          </p:cNvSpPr>
+          <p:nvPr>
+            <p:ph type="title"/>
+          </p:nvPr>
+        </p:nvSpPr>
+        <p:spPr>
+          <a:xfrm>
+            <a:off x="323850" y="620714"/>
+            <a:ext cx="8496300" cy="478324"/>
+          </a:xfrm>
+        </p:spPr>
+        <p:txBody>
+          <a:bodyPr/>
+          <a:lstStyle/>
+          <a:p>
+            <a:r>
+              <a:rPr lang="en-US" dirty="0" smtClean="0"/>
+              <a:t>TLES with Regularization</a:t>
+            </a:r>
+            <a:endParaRPr lang="de-CH" dirty="0"/>
+          </a:p>
+        </p:txBody>
+      </p:sp>
+      <mc:AlternateContent xmlns:mc="http://schemas.openxmlformats.org/markup-compatibility/2006">
+        <mc:Choice xmlns:a14="http://schemas.microsoft.com/office/drawing/2010/main" Requires="a14">
+          <p:sp>
+            <p:nvSpPr>
+              <p:cNvPr id="9" name="Title 5"/>
+              <p:cNvSpPr txBox="1">
+                <a:spLocks/>
+              </p:cNvSpPr>
+              <p:nvPr/>
+            </p:nvSpPr>
+            <p:spPr>
+              <a:xfrm>
+                <a:off x="323850" y="620714"/>
+                <a:ext cx="8496300" cy="812432"/>
+              </a:xfrm>
+              <a:prstGeom prst="rect">
+                <a:avLst/>
+              </a:prstGeom>
+              <a:solidFill>
+                <a:schemeClr val="bg1"/>
+              </a:solidFill>
+            </p:spPr>
+            <p:txBody>
+              <a:bodyPr vert="horz" lIns="140400" tIns="0" rIns="144000" bIns="0" rtlCol="0" anchor="b" anchorCtr="0">
+                <a:noAutofit/>
+              </a:bodyPr>
+              <a:lstStyle>
+                <a:lvl1pPr algn="l" defTabSz="914400" rtl="0" eaLnBrk="1" latinLnBrk="0" hangingPunct="1">
+                  <a:lnSpc>
+                    <a:spcPct val="100000"/>
+                  </a:lnSpc>
+                  <a:spcBef>
+                    <a:spcPct val="0"/>
+                  </a:spcBef>
+                  <a:buNone/>
+                  <a:defRPr sz="2800" b="1" kern="1200">
+                    <a:solidFill>
+                      <a:schemeClr val="tx1"/>
+                    </a:solidFill>
+                    <a:latin typeface="+mj-lt"/>
+                    <a:ea typeface="+mj-ea"/>
+                    <a:cs typeface="+mj-cs"/>
+                  </a:defRPr>
+                </a:lvl1pPr>
+              </a:lstStyle>
+              <a:p>
+                <a:pPr/>
+                <a:r>
+                  <a:rPr lang="en-US" dirty="0" smtClean="0"/>
+                  <a:t>Minimum </a:t>
+                </a:r>
+                <a14:m>
+                  <m:oMath xmlns:m="http://schemas.openxmlformats.org/officeDocument/2006/math">
+                    <m:r>
+                      <a:rPr lang="en-US" b="1" i="1" smtClean="0">
+                        <a:latin typeface="Cambria Math" panose="02040503050406030204" pitchFamily="18" charset="0"/>
+                      </a:rPr>
+                      <m:t>𝝌</m:t>
+                    </m:r>
+                  </m:oMath>
+                </a14:m>
+                <a:r>
+                  <a:rPr lang="en-US" dirty="0" smtClean="0"/>
+                  <a:t> Required for Stabilization</a:t>
+                </a:r>
+              </a:p>
+              <a:p>
+                <a:pPr/>
+                <a14:m>
+                  <m:oMathPara xmlns:m="http://schemas.openxmlformats.org/officeDocument/2006/math">
+                    <m:oMathParaPr>
+                      <m:jc m:val="left"/>
+                    </m:oMathParaPr>
+                    <m:oMath xmlns:m="http://schemas.openxmlformats.org/officeDocument/2006/math">
+                      <m:r>
+                        <a:rPr lang="en-US" sz="2000" smtClean="0">
+                          <a:latin typeface="Cambria Math" panose="02040503050406030204" pitchFamily="18" charset="0"/>
+                        </a:rPr>
+                        <m:t>𝚫</m:t>
+                      </m:r>
+                      <m:r>
+                        <a:rPr lang="en-US" sz="2000" smtClean="0">
+                          <a:latin typeface="Cambria Math" panose="02040503050406030204" pitchFamily="18" charset="0"/>
+                        </a:rPr>
+                        <m:t>𝐭</m:t>
+                      </m:r>
+                      <m:r>
+                        <a:rPr lang="en-US" sz="2000" smtClean="0">
+                          <a:latin typeface="Cambria Math" panose="02040503050406030204" pitchFamily="18" charset="0"/>
+                        </a:rPr>
+                        <m:t>=</m:t>
+                      </m:r>
+                      <m:r>
+                        <a:rPr lang="en-US" sz="2000" smtClean="0">
+                          <a:latin typeface="Cambria Math" panose="02040503050406030204" pitchFamily="18" charset="0"/>
+                        </a:rPr>
+                        <m:t>𝟏</m:t>
+                      </m:r>
+                      <m:sSup>
+                        <m:sSupPr>
+                          <m:ctrlPr>
+                            <a:rPr lang="en-US" sz="2000" smtClean="0">
+                              <a:latin typeface="Cambria Math" panose="02040503050406030204" pitchFamily="18" charset="0"/>
+                            </a:rPr>
+                          </m:ctrlPr>
+                        </m:sSupPr>
+                        <m:e>
+                          <m:r>
+                            <a:rPr lang="en-US" sz="2000" smtClean="0">
+                              <a:latin typeface="Cambria Math" panose="02040503050406030204" pitchFamily="18" charset="0"/>
+                            </a:rPr>
+                            <m:t>𝟎</m:t>
+                          </m:r>
+                        </m:e>
+                        <m:sup>
+                          <m:r>
+                            <a:rPr lang="en-US" sz="2000" smtClean="0">
+                              <a:latin typeface="Cambria Math" panose="02040503050406030204" pitchFamily="18" charset="0"/>
+                            </a:rPr>
+                            <m:t>−</m:t>
+                          </m:r>
+                          <m:r>
+                            <a:rPr lang="en-US" sz="2000" b="1" i="0" smtClean="0">
+                              <a:latin typeface="Cambria Math" panose="02040503050406030204" pitchFamily="18" charset="0"/>
+                            </a:rPr>
+                            <m:t>𝟓</m:t>
+                          </m:r>
+                        </m:sup>
+                      </m:sSup>
+                      <m:r>
+                        <a:rPr lang="en-US" sz="2000" smtClean="0">
+                          <a:latin typeface="Cambria Math" panose="02040503050406030204" pitchFamily="18" charset="0"/>
+                        </a:rPr>
+                        <m:t>,</m:t>
+                      </m:r>
+                      <m:r>
+                        <a:rPr lang="en-US" sz="2000" b="1" i="0" smtClean="0">
+                          <a:latin typeface="Cambria Math" panose="02040503050406030204" pitchFamily="18" charset="0"/>
+                        </a:rPr>
+                        <m:t> </m:t>
+                      </m:r>
+                      <m:acc>
+                        <m:accPr>
+                          <m:chr m:val="̃"/>
+                          <m:ctrlPr>
+                            <a:rPr lang="en-US" sz="2000" b="1" i="1" smtClean="0">
+                              <a:latin typeface="Cambria Math" panose="02040503050406030204" pitchFamily="18" charset="0"/>
+                            </a:rPr>
+                          </m:ctrlPr>
+                        </m:accPr>
+                        <m:e>
+                          <m:r>
+                            <a:rPr lang="en-US" sz="2000" b="1" i="1" smtClean="0">
+                              <a:latin typeface="Cambria Math" panose="02040503050406030204" pitchFamily="18" charset="0"/>
+                            </a:rPr>
+                            <m:t>𝒓</m:t>
+                          </m:r>
+                        </m:e>
+                      </m:acc>
+                      <m:r>
+                        <a:rPr lang="en-US" sz="2000" b="1" i="1" smtClean="0">
+                          <a:latin typeface="Cambria Math" panose="02040503050406030204" pitchFamily="18" charset="0"/>
+                        </a:rPr>
+                        <m:t>=</m:t>
+                      </m:r>
+                      <m:r>
+                        <a:rPr lang="en-US" sz="2000" b="1" i="1" smtClean="0">
+                          <a:latin typeface="Cambria Math" panose="02040503050406030204" pitchFamily="18" charset="0"/>
+                        </a:rPr>
+                        <m:t>𝟏𝟎</m:t>
+                      </m:r>
+                    </m:oMath>
+                  </m:oMathPara>
+                </a14:m>
+                <a:endParaRPr lang="de-CH" sz="2000" dirty="0"/>
+              </a:p>
+            </p:txBody>
+          </p:sp>
+        </mc:Choice>
+        <mc:Fallback>
+          <p:sp>
+            <p:nvSpPr>
+              <p:cNvPr id="9" name="Title 5"/>
+              <p:cNvSpPr txBox="1">
+                <a:spLocks noRot="1" noChangeAspect="1" noMove="1" noResize="1" noEditPoints="1" noAdjustHandles="1" noChangeArrowheads="1" noChangeShapeType="1" noTextEdit="1"/>
+              </p:cNvSpPr>
+              <p:nvPr/>
+            </p:nvSpPr>
+            <p:spPr>
+              <a:xfrm>
+                <a:off x="323850" y="620714"/>
+                <a:ext cx="8496300" cy="812432"/>
+              </a:xfrm>
+              <a:prstGeom prst="rect">
+                <a:avLst/>
+              </a:prstGeom>
+              <a:blipFill>
+                <a:blip r:embed="rId2"/>
+                <a:stretch>
+                  <a:fillRect l="-861" t="-5263" b="-3759"/>
+                </a:stretch>
+              </a:blipFill>
+            </p:spPr>
+            <p:txBody>
+              <a:bodyPr/>
+              <a:lstStyle/>
+              <a:p>
+                <a:r>
+                  <a:rPr lang="de-CH">
+                    <a:noFill/>
+                  </a:rPr>
+                  <a:t> </a:t>
+                </a:r>
+              </a:p>
+            </p:txBody>
+          </p:sp>
+        </mc:Fallback>
+      </mc:AlternateContent>
+      <p:pic>
+        <p:nvPicPr>
+          <p:cNvPr id="6" name="Content Placeholder 5" descr="Screen Clipping"/>
+          <p:cNvPicPr>
+            <a:picLocks noGrp="1" noChangeAspect="1"/>
+          </p:cNvPicPr>
+          <p:nvPr>
+            <p:ph idx="1"/>
+          </p:nvPr>
+        </p:nvPicPr>
+        <p:blipFill>
+          <a:blip r:embed="rId3">
+            <a:extLst>
+              <a:ext uri="{28A0092B-C50C-407E-A947-70E740481C1C}">
+                <a14:useLocalDpi xmlns:a14="http://schemas.microsoft.com/office/drawing/2010/main" val="0"/>
+              </a:ext>
+            </a:extLst>
+          </a:blip>
+          <a:stretch>
+            <a:fillRect/>
+          </a:stretch>
+        </p:blipFill>
+        <p:spPr>
+          <a:xfrm>
+            <a:off x="1584072" y="2024063"/>
+            <a:ext cx="5975855" cy="4210050"/>
+          </a:xfrm>
+        </p:spPr>
+      </p:pic>
+    </p:spTree>
+    <p:extLst>
+      <p:ext uri="{BB962C8B-B14F-4D97-AF65-F5344CB8AC3E}">
+        <p14:creationId xmlns:p14="http://schemas.microsoft.com/office/powerpoint/2010/main" val="3181181160"/>
+      </p:ext>
+    </p:extLst>
+  </p:cSld>
+  <p:clrMapOvr>
+    <a:masterClrMapping/>
+  </p:clrMapOvr>
+  <p:transition>
+    <p:fade/>
+  </p:transition>
+</p:sld>
+</file>
+
+<file path=ppt/slides/slide9.xml><?xml version="1.0" encoding="utf-8"?>
+<p:sld xmlns:a="http://schemas.openxmlformats.org/drawingml/2006/main" xmlns:r="http://schemas.openxmlformats.org/officeDocument/2006/relationships" xmlns:p="http://schemas.openxmlformats.org/presentationml/2006/main">
+  <p:cSld>
+    <p:spTree>
+      <p:nvGrpSpPr>
+        <p:cNvPr id="1" name=""/>
+        <p:cNvGrpSpPr/>
+        <p:nvPr/>
+      </p:nvGrpSpPr>
+      <p:grpSpPr>
+        <a:xfrm>
+          <a:off x="0" y="0"/>
+          <a:ext cx="0" cy="0"/>
+          <a:chOff x="0" y="0"/>
+          <a:chExt cx="0" cy="0"/>
+        </a:xfrm>
+      </p:grpSpPr>
+      <p:sp>
+        <p:nvSpPr>
+          <p:cNvPr id="3" name="Date Placeholder 2"/>
+          <p:cNvSpPr>
+            <a:spLocks noGrp="1"/>
+          </p:cNvSpPr>
+          <p:nvPr>
+            <p:ph type="dt" sz="half" idx="10"/>
+          </p:nvPr>
+        </p:nvSpPr>
+        <p:spPr/>
+        <p:txBody>
+          <a:bodyPr/>
+          <a:lstStyle/>
+          <a:p>
+            <a:r>
+              <a:rPr lang="de-DE" smtClean="0"/>
+              <a:t>21.12.2017</a:t>
+            </a:r>
+            <a:endParaRPr lang="de-DE"/>
+          </a:p>
+        </p:txBody>
+      </p:sp>
+      <p:sp>
+        <p:nvSpPr>
+          <p:cNvPr id="4" name="Footer Placeholder 3"/>
+          <p:cNvSpPr>
+            <a:spLocks noGrp="1"/>
+          </p:cNvSpPr>
+          <p:nvPr>
+            <p:ph type="ftr" sz="quarter" idx="11"/>
+          </p:nvPr>
+        </p:nvSpPr>
+        <p:spPr/>
+        <p:txBody>
+          <a:bodyPr/>
+          <a:lstStyle/>
+          <a:p>
+            <a:r>
+              <a:rPr lang="de-DE" smtClean="0"/>
+              <a:t>Samuel Maloney</a:t>
+            </a:r>
+            <a:endParaRPr lang="de-DE"/>
+          </a:p>
+        </p:txBody>
+      </p:sp>
+      <p:sp>
+        <p:nvSpPr>
+          <p:cNvPr id="5" name="Slide Number Placeholder 4"/>
+          <p:cNvSpPr>
+            <a:spLocks noGrp="1"/>
+          </p:cNvSpPr>
+          <p:nvPr>
+            <p:ph type="sldNum" sz="quarter" idx="12"/>
+          </p:nvPr>
+        </p:nvSpPr>
+        <p:spPr/>
+        <p:txBody>
+          <a:bodyPr/>
+          <a:lstStyle/>
+          <a:p>
+            <a:fld id="{6C6AE60A-B69C-4790-82F7-3882EDF23186}" type="slidenum">
+              <a:rPr lang="de-DE" smtClean="0"/>
+              <a:t>9</a:t>
+            </a:fld>
+            <a:endParaRPr lang="de-DE"/>
+          </a:p>
+        </p:txBody>
+      </p:sp>
+      <p:sp>
+        <p:nvSpPr>
+          <p:cNvPr id="11" name="Title 5"/>
+          <p:cNvSpPr>
+            <a:spLocks noGrp="1"/>
+          </p:cNvSpPr>
+          <p:nvPr>
+            <p:ph type="title"/>
+          </p:nvPr>
+        </p:nvSpPr>
+        <p:spPr>
+          <a:xfrm>
+            <a:off x="323850" y="620714"/>
+            <a:ext cx="8496300" cy="478324"/>
+          </a:xfrm>
+        </p:spPr>
+        <p:txBody>
+          <a:bodyPr/>
+          <a:lstStyle/>
+          <a:p>
+            <a:r>
+              <a:rPr lang="en-US" dirty="0" smtClean="0"/>
+              <a:t>TLES with Regularization</a:t>
+            </a:r>
+            <a:endParaRPr lang="de-CH" dirty="0"/>
+          </a:p>
+        </p:txBody>
+      </p:sp>
+      <mc:AlternateContent xmlns:mc="http://schemas.openxmlformats.org/markup-compatibility/2006">
+        <mc:Choice xmlns:a14="http://schemas.microsoft.com/office/drawing/2010/main" Requires="a14">
+          <p:sp>
+            <p:nvSpPr>
+              <p:cNvPr id="9" name="Title 5"/>
+              <p:cNvSpPr txBox="1">
+                <a:spLocks/>
+              </p:cNvSpPr>
+              <p:nvPr/>
+            </p:nvSpPr>
+            <p:spPr>
+              <a:xfrm>
+                <a:off x="323850" y="620714"/>
+                <a:ext cx="8496300" cy="812432"/>
+              </a:xfrm>
+              <a:prstGeom prst="rect">
+                <a:avLst/>
+              </a:prstGeom>
+              <a:solidFill>
+                <a:schemeClr val="bg1"/>
+              </a:solidFill>
+            </p:spPr>
+            <p:txBody>
+              <a:bodyPr vert="horz" lIns="140400" tIns="0" rIns="144000" bIns="0" rtlCol="0" anchor="b" anchorCtr="0">
+                <a:noAutofit/>
+              </a:bodyPr>
+              <a:lstStyle>
+                <a:lvl1pPr algn="l" defTabSz="914400" rtl="0" eaLnBrk="1" latinLnBrk="0" hangingPunct="1">
+                  <a:lnSpc>
+                    <a:spcPct val="100000"/>
+                  </a:lnSpc>
+                  <a:spcBef>
+                    <a:spcPct val="0"/>
+                  </a:spcBef>
+                  <a:buNone/>
+                  <a:defRPr sz="2800" b="1" kern="1200">
+                    <a:solidFill>
+                      <a:schemeClr val="tx1"/>
+                    </a:solidFill>
+                    <a:latin typeface="+mj-lt"/>
+                    <a:ea typeface="+mj-ea"/>
+                    <a:cs typeface="+mj-cs"/>
+                  </a:defRPr>
+                </a:lvl1pPr>
+              </a:lstStyle>
+              <a:p>
+                <a:pPr/>
+                <a:r>
+                  <a:rPr lang="en-US" dirty="0" smtClean="0"/>
+                  <a:t>Minimum </a:t>
+                </a:r>
+                <a14:m>
+                  <m:oMath xmlns:m="http://schemas.openxmlformats.org/officeDocument/2006/math">
+                    <m:r>
+                      <a:rPr lang="en-US" i="1">
+                        <a:latin typeface="Cambria Math" panose="02040503050406030204" pitchFamily="18" charset="0"/>
+                      </a:rPr>
+                      <m:t>𝝌</m:t>
+                    </m:r>
+                  </m:oMath>
+                </a14:m>
+                <a:r>
+                  <a:rPr lang="en-US" dirty="0" smtClean="0"/>
+                  <a:t> Required for Stabilization</a:t>
+                </a:r>
+              </a:p>
+              <a:p>
+                <a:pPr/>
+                <a14:m>
+                  <m:oMathPara xmlns:m="http://schemas.openxmlformats.org/officeDocument/2006/math">
+                    <m:oMathParaPr>
+                      <m:jc m:val="left"/>
+                    </m:oMathParaPr>
+                    <m:oMath xmlns:m="http://schemas.openxmlformats.org/officeDocument/2006/math">
+                      <m:r>
+                        <a:rPr lang="en-US" sz="2000" smtClean="0">
+                          <a:latin typeface="Cambria Math" panose="02040503050406030204" pitchFamily="18" charset="0"/>
+                        </a:rPr>
+                        <m:t>𝚫</m:t>
+                      </m:r>
+                      <m:r>
+                        <a:rPr lang="en-US" sz="2000" smtClean="0">
+                          <a:latin typeface="Cambria Math" panose="02040503050406030204" pitchFamily="18" charset="0"/>
+                        </a:rPr>
+                        <m:t>𝐭</m:t>
+                      </m:r>
+                      <m:r>
+                        <a:rPr lang="en-US" sz="2000" smtClean="0">
+                          <a:latin typeface="Cambria Math" panose="02040503050406030204" pitchFamily="18" charset="0"/>
+                        </a:rPr>
+                        <m:t>=</m:t>
+                      </m:r>
+                      <m:r>
+                        <a:rPr lang="en-US" sz="2000" smtClean="0">
+                          <a:latin typeface="Cambria Math" panose="02040503050406030204" pitchFamily="18" charset="0"/>
+                        </a:rPr>
+                        <m:t>𝟏</m:t>
+                      </m:r>
+                      <m:sSup>
+                        <m:sSupPr>
+                          <m:ctrlPr>
+                            <a:rPr lang="en-US" sz="2000" smtClean="0">
+                              <a:latin typeface="Cambria Math" panose="02040503050406030204" pitchFamily="18" charset="0"/>
+                            </a:rPr>
+                          </m:ctrlPr>
+                        </m:sSupPr>
+                        <m:e>
+                          <m:r>
+                            <a:rPr lang="en-US" sz="2000" smtClean="0">
+                              <a:latin typeface="Cambria Math" panose="02040503050406030204" pitchFamily="18" charset="0"/>
+                            </a:rPr>
+                            <m:t>𝟎</m:t>
+                          </m:r>
+                        </m:e>
+                        <m:sup>
+                          <m:r>
+                            <a:rPr lang="en-US" sz="2000" smtClean="0">
+                              <a:latin typeface="Cambria Math" panose="02040503050406030204" pitchFamily="18" charset="0"/>
+                            </a:rPr>
+                            <m:t>−</m:t>
+                          </m:r>
+                          <m:r>
+                            <a:rPr lang="en-US" sz="2000" b="1" i="0" smtClean="0">
+                              <a:latin typeface="Cambria Math" panose="02040503050406030204" pitchFamily="18" charset="0"/>
+                            </a:rPr>
+                            <m:t>𝟔</m:t>
+                          </m:r>
+                        </m:sup>
+                      </m:sSup>
+                      <m:r>
+                        <a:rPr lang="en-US" sz="2000" smtClean="0">
+                          <a:latin typeface="Cambria Math" panose="02040503050406030204" pitchFamily="18" charset="0"/>
+                        </a:rPr>
+                        <m:t>,</m:t>
+                      </m:r>
+                      <m:r>
+                        <a:rPr lang="en-US" sz="2000" b="1" i="0" smtClean="0">
+                          <a:latin typeface="Cambria Math" panose="02040503050406030204" pitchFamily="18" charset="0"/>
+                        </a:rPr>
+                        <m:t> </m:t>
+                      </m:r>
+                      <m:acc>
+                        <m:accPr>
+                          <m:chr m:val="̃"/>
+                          <m:ctrlPr>
+                            <a:rPr lang="en-US" sz="2000" b="1" i="1" smtClean="0">
+                              <a:latin typeface="Cambria Math" panose="02040503050406030204" pitchFamily="18" charset="0"/>
+                            </a:rPr>
+                          </m:ctrlPr>
+                        </m:accPr>
+                        <m:e>
+                          <m:r>
+                            <a:rPr lang="en-US" sz="2000" b="1" i="1" smtClean="0">
+                              <a:latin typeface="Cambria Math" panose="02040503050406030204" pitchFamily="18" charset="0"/>
+                            </a:rPr>
+                            <m:t>𝒓</m:t>
+                          </m:r>
+                        </m:e>
+                      </m:acc>
+                      <m:r>
+                        <a:rPr lang="en-US" sz="2000" b="1" i="1" smtClean="0">
+                          <a:latin typeface="Cambria Math" panose="02040503050406030204" pitchFamily="18" charset="0"/>
+                        </a:rPr>
+                        <m:t>=</m:t>
+                      </m:r>
+                      <m:r>
+                        <a:rPr lang="en-US" sz="2000" b="1" i="1" smtClean="0">
+                          <a:latin typeface="Cambria Math" panose="02040503050406030204" pitchFamily="18" charset="0"/>
+                        </a:rPr>
+                        <m:t>𝟏𝟎𝟎</m:t>
+                      </m:r>
+                    </m:oMath>
+                  </m:oMathPara>
+                </a14:m>
+                <a:endParaRPr lang="de-CH" sz="2000" dirty="0"/>
+              </a:p>
+            </p:txBody>
+          </p:sp>
+        </mc:Choice>
+        <mc:Fallback>
+          <p:sp>
+            <p:nvSpPr>
+              <p:cNvPr id="9" name="Title 5"/>
+              <p:cNvSpPr txBox="1">
+                <a:spLocks noRot="1" noChangeAspect="1" noMove="1" noResize="1" noEditPoints="1" noAdjustHandles="1" noChangeArrowheads="1" noChangeShapeType="1" noTextEdit="1"/>
+              </p:cNvSpPr>
+              <p:nvPr/>
+            </p:nvSpPr>
+            <p:spPr>
+              <a:xfrm>
+                <a:off x="323850" y="620714"/>
+                <a:ext cx="8496300" cy="812432"/>
+              </a:xfrm>
+              <a:prstGeom prst="rect">
+                <a:avLst/>
+              </a:prstGeom>
+              <a:blipFill>
+                <a:blip r:embed="rId2"/>
+                <a:stretch>
+                  <a:fillRect l="-861" t="-4511" b="-3759"/>
+                </a:stretch>
+              </a:blipFill>
+            </p:spPr>
+            <p:txBody>
+              <a:bodyPr/>
+              <a:lstStyle/>
+              <a:p>
+                <a:r>
+                  <a:rPr lang="de-CH">
+                    <a:noFill/>
+                  </a:rPr>
+                  <a:t> </a:t>
+                </a:r>
+              </a:p>
+            </p:txBody>
+          </p:sp>
+        </mc:Fallback>
+      </mc:AlternateContent>
+      <p:pic>
+        <p:nvPicPr>
+          <p:cNvPr id="7" name="Content Placeholder 6" descr="Screen Clipping"/>
+          <p:cNvPicPr>
+            <a:picLocks noGrp="1" noChangeAspect="1"/>
+          </p:cNvPicPr>
+          <p:nvPr>
+            <p:ph idx="1"/>
+          </p:nvPr>
+        </p:nvPicPr>
+        <p:blipFill>
+          <a:blip r:embed="rId3">
+            <a:extLst>
+              <a:ext uri="{28A0092B-C50C-407E-A947-70E740481C1C}">
+                <a14:useLocalDpi xmlns:a14="http://schemas.microsoft.com/office/drawing/2010/main" val="0"/>
+              </a:ext>
+            </a:extLst>
+          </a:blip>
+          <a:stretch>
+            <a:fillRect/>
+          </a:stretch>
+        </p:blipFill>
+        <p:spPr>
+          <a:xfrm>
+            <a:off x="1586986" y="2024063"/>
+            <a:ext cx="5970027" cy="4210050"/>
+          </a:xfrm>
+        </p:spPr>
+      </p:pic>
+    </p:spTree>
+    <p:extLst>
+      <p:ext uri="{BB962C8B-B14F-4D97-AF65-F5344CB8AC3E}">
+        <p14:creationId xmlns:p14="http://schemas.microsoft.com/office/powerpoint/2010/main" val="3375289407"/>
+      </p:ext>
+    </p:extLst>
+  </p:cSld>
+  <p:clrMapOvr>
+    <a:masterClrMapping/>
+  </p:clrMapOvr>
+  <p:transition>
+    <p:fade/>
+  </p:transition>
 </p:sld>
 </file>
 

</xml_diff>

<commit_message>
Added conclusion to presentaion, modified min_chi plots, and continued Results section
</commit_message>
<xml_diff>
--- a/Presentation/maloneys_HS2017.pptx
+++ b/Presentation/maloneys_HS2017.pptx
@@ -5,7 +5,7 @@
     <p:sldMasterId id="2147483648" r:id="rId1"/>
   </p:sldMasterIdLst>
   <p:notesMasterIdLst>
-    <p:notesMasterId r:id="rId24"/>
+    <p:notesMasterId r:id="rId25"/>
   </p:notesMasterIdLst>
   <p:sldIdLst>
     <p:sldId id="256" r:id="rId2"/>
@@ -28,8 +28,9 @@
     <p:sldId id="264" r:id="rId19"/>
     <p:sldId id="262" r:id="rId20"/>
     <p:sldId id="263" r:id="rId21"/>
-    <p:sldId id="269" r:id="rId22"/>
-    <p:sldId id="270" r:id="rId23"/>
+    <p:sldId id="279" r:id="rId22"/>
+    <p:sldId id="269" r:id="rId23"/>
+    <p:sldId id="270" r:id="rId24"/>
   </p:sldIdLst>
   <p:sldSz cx="9144000" cy="6858000" type="screen4x3"/>
   <p:notesSz cx="7099300" cy="10234613"/>
@@ -269,7 +270,7 @@
           <a:p>
             <a:fld id="{BCDB334D-D17F-49C4-91DD-37BB7E818209}" type="datetimeFigureOut">
               <a:rPr lang="de-CH" smtClean="0"/>
-              <a:t>18.12.2017</a:t>
+              <a:t>19.12.2017</a:t>
             </a:fld>
             <a:endParaRPr lang="de-CH"/>
           </a:p>
@@ -4359,7 +4360,6 @@
               <a:rPr lang="en-US" dirty="0" smtClean="0"/>
               <a:t> et al. [4]</a:t>
             </a:r>
-            <a:endParaRPr lang="en-US" dirty="0" smtClean="0"/>
           </a:p>
         </p:txBody>
       </p:sp>
@@ -4387,8 +4387,8 @@
           </a:prstGeom>
         </p:spPr>
       </p:pic>
-      <mc:AlternateContent xmlns:mc="http://schemas.openxmlformats.org/markup-compatibility/2006">
-        <mc:Choice xmlns:a14="http://schemas.microsoft.com/office/drawing/2010/main" Requires="a14">
+      <mc:AlternateContent xmlns:mc="http://schemas.openxmlformats.org/markup-compatibility/2006" xmlns:a14="http://schemas.microsoft.com/office/drawing/2010/main">
+        <mc:Choice Requires="a14">
           <p:sp>
             <p:nvSpPr>
               <p:cNvPr id="12" name="Content Placeholder 7"/>
@@ -4691,18 +4691,13 @@
                 </a14:m>
                 <a:r>
                   <a:rPr lang="en-US" dirty="0" smtClean="0"/>
-                  <a:t> is a free control parameter</a:t>
+                  <a:t> is a free control parameter </a:t>
                 </a:r>
-                <a:r>
-                  <a:rPr lang="en-US" dirty="0" smtClean="0"/>
-                  <a:t> </a:t>
-                </a:r>
-                <a:endParaRPr lang="en-US" dirty="0" smtClean="0"/>
               </a:p>
             </p:txBody>
           </p:sp>
         </mc:Choice>
-        <mc:Fallback>
+        <mc:Fallback xmlns="">
           <p:sp>
             <p:nvSpPr>
               <p:cNvPr id="12" name="Content Placeholder 7"/>
@@ -4878,8 +4873,8 @@
           </a:p>
         </p:txBody>
       </p:sp>
-      <mc:AlternateContent xmlns:mc="http://schemas.openxmlformats.org/markup-compatibility/2006">
-        <mc:Choice xmlns:a14="http://schemas.microsoft.com/office/drawing/2010/main" Requires="a14">
+      <mc:AlternateContent xmlns:mc="http://schemas.openxmlformats.org/markup-compatibility/2006" xmlns:a14="http://schemas.microsoft.com/office/drawing/2010/main">
+        <mc:Choice Requires="a14">
           <p:sp>
             <p:nvSpPr>
               <p:cNvPr id="11" name="Content Placeholder 7"/>
@@ -5150,7 +5145,7 @@
             </p:txBody>
           </p:sp>
         </mc:Choice>
-        <mc:Fallback>
+        <mc:Fallback xmlns="">
           <p:sp>
             <p:nvSpPr>
               <p:cNvPr id="11" name="Content Placeholder 7"/>
@@ -5570,8 +5565,8 @@
           </a:prstGeom>
         </p:spPr>
       </p:pic>
-      <mc:AlternateContent xmlns:mc="http://schemas.openxmlformats.org/markup-compatibility/2006">
-        <mc:Choice xmlns:a14="http://schemas.microsoft.com/office/drawing/2010/main" Requires="a14">
+      <mc:AlternateContent xmlns:mc="http://schemas.openxmlformats.org/markup-compatibility/2006" xmlns:a14="http://schemas.microsoft.com/office/drawing/2010/main">
+        <mc:Choice Requires="a14">
           <p:sp>
             <p:nvSpPr>
               <p:cNvPr id="10" name="Content Placeholder 7"/>
@@ -5806,7 +5801,7 @@
             </p:txBody>
           </p:sp>
         </mc:Choice>
-        <mc:Fallback>
+        <mc:Fallback xmlns="">
           <p:sp>
             <p:nvSpPr>
               <p:cNvPr id="10" name="Content Placeholder 7"/>
@@ -6231,8 +6226,8 @@
           </a:p>
         </p:txBody>
       </p:sp>
-      <mc:AlternateContent xmlns:mc="http://schemas.openxmlformats.org/markup-compatibility/2006">
-        <mc:Choice xmlns:a14="http://schemas.microsoft.com/office/drawing/2010/main" Requires="a14">
+      <mc:AlternateContent xmlns:mc="http://schemas.openxmlformats.org/markup-compatibility/2006" xmlns:a14="http://schemas.microsoft.com/office/drawing/2010/main">
+        <mc:Choice Requires="a14">
           <p:sp>
             <p:nvSpPr>
               <p:cNvPr id="11" name="Content Placeholder 7"/>
@@ -6503,7 +6498,7 @@
             </p:txBody>
           </p:sp>
         </mc:Choice>
-        <mc:Fallback>
+        <mc:Fallback xmlns="">
           <p:sp>
             <p:nvSpPr>
               <p:cNvPr id="11" name="Content Placeholder 7"/>
@@ -6542,8 +6537,8 @@
           </p:sp>
         </mc:Fallback>
       </mc:AlternateContent>
-      <mc:AlternateContent xmlns:mc="http://schemas.openxmlformats.org/markup-compatibility/2006">
-        <mc:Choice xmlns:a14="http://schemas.microsoft.com/office/drawing/2010/main" Requires="a14">
+      <mc:AlternateContent xmlns:mc="http://schemas.openxmlformats.org/markup-compatibility/2006" xmlns:a14="http://schemas.microsoft.com/office/drawing/2010/main">
+        <mc:Choice Requires="a14">
           <p:sp>
             <p:nvSpPr>
               <p:cNvPr id="12" name="TextBox 11"/>
@@ -6602,7 +6597,7 @@
             </p:txBody>
           </p:sp>
         </mc:Choice>
-        <mc:Fallback>
+        <mc:Fallback xmlns="">
           <p:sp>
             <p:nvSpPr>
               <p:cNvPr id="12" name="TextBox 11"/>
@@ -7577,8 +7572,8 @@
           </a:xfrm>
         </p:spPr>
       </p:pic>
-      <mc:AlternateContent xmlns:mc="http://schemas.openxmlformats.org/markup-compatibility/2006">
-        <mc:Choice xmlns:a14="http://schemas.microsoft.com/office/drawing/2010/main" Requires="a14">
+      <mc:AlternateContent xmlns:mc="http://schemas.openxmlformats.org/markup-compatibility/2006" xmlns:a14="http://schemas.microsoft.com/office/drawing/2010/main">
+        <mc:Choice Requires="a14">
           <p:sp>
             <p:nvSpPr>
               <p:cNvPr id="9" name="Title 5"/>
@@ -7850,7 +7845,7 @@
             </p:txBody>
           </p:sp>
         </mc:Choice>
-        <mc:Fallback>
+        <mc:Fallback xmlns="">
           <p:sp>
             <p:nvSpPr>
               <p:cNvPr id="9" name="Title 5"/>
@@ -8133,8 +8128,8 @@
           </p:sp>
         </mc:Fallback>
       </mc:AlternateContent>
-      <mc:AlternateContent xmlns:mc="http://schemas.openxmlformats.org/markup-compatibility/2006">
-        <mc:Choice xmlns:a14="http://schemas.microsoft.com/office/drawing/2010/main" Requires="a14">
+      <mc:AlternateContent xmlns:mc="http://schemas.openxmlformats.org/markup-compatibility/2006" xmlns:a14="http://schemas.microsoft.com/office/drawing/2010/main">
+        <mc:Choice Requires="a14">
           <p:sp>
             <p:nvSpPr>
               <p:cNvPr id="8" name="Content Placeholder 7"/>
@@ -8163,11 +8158,7 @@
               <a:p>
                 <a:r>
                   <a:rPr lang="en-US" dirty="0" smtClean="0"/>
-                  <a:t>Large </a:t>
-                </a:r>
-                <a:r>
-                  <a:rPr lang="en-US" dirty="0" smtClean="0"/>
-                  <a:t>enough </a:t>
+                  <a:t>Large enough </a:t>
                 </a:r>
                 <a14:m>
                   <m:oMath xmlns:m="http://schemas.openxmlformats.org/officeDocument/2006/math">
@@ -8306,7 +8297,7 @@
             </p:txBody>
           </p:sp>
         </mc:Choice>
-        <mc:Fallback>
+        <mc:Fallback xmlns="">
           <p:sp>
             <p:nvSpPr>
               <p:cNvPr id="8" name="Content Placeholder 7"/>
@@ -9257,8 +9248,8 @@
           </a:p>
         </p:txBody>
       </p:sp>
-      <mc:AlternateContent xmlns:mc="http://schemas.openxmlformats.org/markup-compatibility/2006">
-        <mc:Choice xmlns:a14="http://schemas.microsoft.com/office/drawing/2010/main" Requires="a14">
+      <mc:AlternateContent xmlns:mc="http://schemas.openxmlformats.org/markup-compatibility/2006" xmlns:a14="http://schemas.microsoft.com/office/drawing/2010/main">
+        <mc:Choice Requires="a14">
           <p:sp>
             <p:nvSpPr>
               <p:cNvPr id="11" name="Content Placeholder 7"/>
@@ -9519,7 +9510,6 @@
                   <a:rPr lang="en-US" dirty="0" smtClean="0"/>
                   <a:t>Effect of small features must be modelled → requires closure</a:t>
                 </a:r>
-                <a:endParaRPr lang="en-US" dirty="0" smtClean="0"/>
               </a:p>
               <a:p>
                 <a:r>
@@ -9554,7 +9544,7 @@
             </p:txBody>
           </p:sp>
         </mc:Choice>
-        <mc:Fallback>
+        <mc:Fallback xmlns="">
           <p:sp>
             <p:nvSpPr>
               <p:cNvPr id="11" name="Content Placeholder 7"/>
@@ -10021,6 +10011,285 @@
                 <p:ph idx="1"/>
               </p:nvPr>
             </p:nvSpPr>
+            <p:spPr/>
+            <p:txBody>
+              <a:bodyPr/>
+              <a:lstStyle/>
+              <a:p>
+                <a:r>
+                  <a:rPr lang="en-US" dirty="0" smtClean="0"/>
+                  <a:t>Divergence cleaning helps, but does not solve instability</a:t>
+                </a:r>
+              </a:p>
+              <a:p>
+                <a:pPr lvl="1"/>
+                <a:r>
+                  <a:rPr lang="en-US" dirty="0" smtClean="0"/>
+                  <a:t>Suggests non-zero </a:t>
+                </a:r>
+                <a:r>
+                  <a:rPr lang="en-US" dirty="0"/>
+                  <a:t>divergence is caused by, rather </a:t>
+                </a:r>
+                <a:r>
+                  <a:rPr lang="en-US" dirty="0" smtClean="0"/>
+                  <a:t>than </a:t>
+                </a:r>
+                <a:r>
+                  <a:rPr lang="en-US" dirty="0"/>
+                  <a:t>cause </a:t>
+                </a:r>
+                <a:r>
+                  <a:rPr lang="en-US" dirty="0" smtClean="0"/>
+                  <a:t>of</a:t>
+                </a:r>
+              </a:p>
+              <a:p>
+                <a:pPr lvl="1"/>
+                <a:endParaRPr lang="en-US" dirty="0"/>
+              </a:p>
+              <a:p>
+                <a:pPr lvl="1"/>
+                <a:endParaRPr lang="en-US" dirty="0"/>
+              </a:p>
+              <a:p>
+                <a:r>
+                  <a:rPr lang="en-US" dirty="0" smtClean="0"/>
+                  <a:t>Regularization is an effective stabilizer</a:t>
+                </a:r>
+              </a:p>
+              <a:p>
+                <a:pPr lvl="1"/>
+                <a:r>
+                  <a:rPr lang="en-US" dirty="0" smtClean="0"/>
+                  <a:t>Renders the system evolution very slow</a:t>
+                </a:r>
+              </a:p>
+              <a:p>
+                <a:pPr lvl="1"/>
+                <a:r>
+                  <a:rPr lang="en-US" dirty="0" smtClean="0"/>
+                  <a:t>Desire minimal (and possibly dynamic) </a:t>
+                </a:r>
+                <a14:m>
+                  <m:oMath xmlns:m="http://schemas.openxmlformats.org/officeDocument/2006/math">
+                    <m:r>
+                      <a:rPr lang="de-CH" b="0" i="1" smtClean="0">
+                        <a:latin typeface="Cambria Math" panose="02040503050406030204" pitchFamily="18" charset="0"/>
+                      </a:rPr>
+                      <m:t>𝜒</m:t>
+                    </m:r>
+                  </m:oMath>
+                </a14:m>
+                <a:endParaRPr lang="de-CH" b="0" dirty="0" smtClean="0"/>
+              </a:p>
+              <a:p>
+                <a:pPr lvl="1"/>
+                <a:r>
+                  <a:rPr lang="en-US" dirty="0" smtClean="0"/>
+                  <a:t>Investigate potential effects of DC on minimum </a:t>
+                </a:r>
+                <a14:m>
+                  <m:oMath xmlns:m="http://schemas.openxmlformats.org/officeDocument/2006/math">
+                    <m:r>
+                      <a:rPr lang="de-CH" i="1">
+                        <a:latin typeface="Cambria Math" panose="02040503050406030204" pitchFamily="18" charset="0"/>
+                      </a:rPr>
+                      <m:t>𝜒</m:t>
+                    </m:r>
+                  </m:oMath>
+                </a14:m>
+                <a:r>
+                  <a:rPr lang="en-US" dirty="0" smtClean="0"/>
+                  <a:t> relation</a:t>
+                </a:r>
+              </a:p>
+              <a:p>
+                <a:pPr lvl="1"/>
+                <a:endParaRPr lang="en-US" dirty="0"/>
+              </a:p>
+              <a:p>
+                <a:endParaRPr lang="en-US" dirty="0" smtClean="0"/>
+              </a:p>
+            </p:txBody>
+          </p:sp>
+        </mc:Choice>
+        <mc:Fallback>
+          <p:sp>
+            <p:nvSpPr>
+              <p:cNvPr id="2" name="Content Placeholder 1"/>
+              <p:cNvSpPr>
+                <a:spLocks noGrp="1" noRot="1" noChangeAspect="1" noMove="1" noResize="1" noEditPoints="1" noAdjustHandles="1" noChangeArrowheads="1" noChangeShapeType="1" noTextEdit="1"/>
+              </p:cNvSpPr>
+              <p:nvPr>
+                <p:ph idx="1"/>
+              </p:nvPr>
+            </p:nvSpPr>
+            <p:spPr>
+              <a:blipFill>
+                <a:blip r:embed="rId2"/>
+                <a:stretch>
+                  <a:fillRect l="-359" t="-2026"/>
+                </a:stretch>
+              </a:blipFill>
+            </p:spPr>
+            <p:txBody>
+              <a:bodyPr/>
+              <a:lstStyle/>
+              <a:p>
+                <a:r>
+                  <a:rPr lang="de-CH">
+                    <a:noFill/>
+                  </a:rPr>
+                  <a:t> </a:t>
+                </a:r>
+              </a:p>
+            </p:txBody>
+          </p:sp>
+        </mc:Fallback>
+      </mc:AlternateContent>
+      <p:sp>
+        <p:nvSpPr>
+          <p:cNvPr id="3" name="Date Placeholder 2"/>
+          <p:cNvSpPr>
+            <a:spLocks noGrp="1"/>
+          </p:cNvSpPr>
+          <p:nvPr>
+            <p:ph type="dt" sz="half" idx="10"/>
+          </p:nvPr>
+        </p:nvSpPr>
+        <p:spPr/>
+        <p:txBody>
+          <a:bodyPr/>
+          <a:lstStyle/>
+          <a:p>
+            <a:r>
+              <a:rPr lang="de-DE" smtClean="0"/>
+              <a:t>21.12.2017</a:t>
+            </a:r>
+            <a:endParaRPr lang="de-DE"/>
+          </a:p>
+        </p:txBody>
+      </p:sp>
+      <p:sp>
+        <p:nvSpPr>
+          <p:cNvPr id="4" name="Footer Placeholder 3"/>
+          <p:cNvSpPr>
+            <a:spLocks noGrp="1"/>
+          </p:cNvSpPr>
+          <p:nvPr>
+            <p:ph type="ftr" sz="quarter" idx="11"/>
+          </p:nvPr>
+        </p:nvSpPr>
+        <p:spPr/>
+        <p:txBody>
+          <a:bodyPr/>
+          <a:lstStyle/>
+          <a:p>
+            <a:r>
+              <a:rPr lang="de-DE" smtClean="0"/>
+              <a:t>Samuel Maloney</a:t>
+            </a:r>
+            <a:endParaRPr lang="de-DE"/>
+          </a:p>
+        </p:txBody>
+      </p:sp>
+      <p:sp>
+        <p:nvSpPr>
+          <p:cNvPr id="5" name="Slide Number Placeholder 4"/>
+          <p:cNvSpPr>
+            <a:spLocks noGrp="1"/>
+          </p:cNvSpPr>
+          <p:nvPr>
+            <p:ph type="sldNum" sz="quarter" idx="12"/>
+          </p:nvPr>
+        </p:nvSpPr>
+        <p:spPr/>
+        <p:txBody>
+          <a:bodyPr/>
+          <a:lstStyle/>
+          <a:p>
+            <a:fld id="{6C6AE60A-B69C-4790-82F7-3882EDF23186}" type="slidenum">
+              <a:rPr lang="de-DE" smtClean="0"/>
+              <a:t>21</a:t>
+            </a:fld>
+            <a:endParaRPr lang="de-DE"/>
+          </a:p>
+        </p:txBody>
+      </p:sp>
+      <p:sp>
+        <p:nvSpPr>
+          <p:cNvPr id="6" name="Title 5"/>
+          <p:cNvSpPr>
+            <a:spLocks noGrp="1"/>
+          </p:cNvSpPr>
+          <p:nvPr>
+            <p:ph type="title"/>
+          </p:nvPr>
+        </p:nvSpPr>
+        <p:spPr>
+          <a:xfrm>
+            <a:off x="323850" y="620714"/>
+            <a:ext cx="8496300" cy="491196"/>
+          </a:xfrm>
+        </p:spPr>
+        <p:txBody>
+          <a:bodyPr/>
+          <a:lstStyle/>
+          <a:p>
+            <a:r>
+              <a:rPr lang="en-US" dirty="0" smtClean="0"/>
+              <a:t>Final Thoughts</a:t>
+            </a:r>
+            <a:endParaRPr lang="en-US" dirty="0"/>
+          </a:p>
+        </p:txBody>
+      </p:sp>
+    </p:spTree>
+    <p:extLst>
+      <p:ext uri="{BB962C8B-B14F-4D97-AF65-F5344CB8AC3E}">
+        <p14:creationId xmlns:p14="http://schemas.microsoft.com/office/powerpoint/2010/main" val="3319328273"/>
+      </p:ext>
+    </p:extLst>
+  </p:cSld>
+  <p:clrMapOvr>
+    <a:masterClrMapping/>
+  </p:clrMapOvr>
+  <p:transition>
+    <p:fade/>
+  </p:transition>
+</p:sld>
+</file>
+
+<file path=ppt/slides/slide22.xml><?xml version="1.0" encoding="utf-8"?>
+<p:sld xmlns:a="http://schemas.openxmlformats.org/drawingml/2006/main" xmlns:r="http://schemas.openxmlformats.org/officeDocument/2006/relationships" xmlns:p="http://schemas.openxmlformats.org/presentationml/2006/main">
+  <p:cSld>
+    <p:spTree>
+      <p:nvGrpSpPr>
+        <p:cNvPr id="1" name=""/>
+        <p:cNvGrpSpPr/>
+        <p:nvPr/>
+      </p:nvGrpSpPr>
+      <p:grpSpPr>
+        <a:xfrm>
+          <a:off x="0" y="0"/>
+          <a:ext cx="0" cy="0"/>
+          <a:chOff x="0" y="0"/>
+          <a:chExt cx="0" cy="0"/>
+        </a:xfrm>
+      </p:grpSpPr>
+      <mc:AlternateContent xmlns:mc="http://schemas.openxmlformats.org/markup-compatibility/2006" xmlns:a14="http://schemas.microsoft.com/office/drawing/2010/main">
+        <mc:Choice Requires="a14">
+          <p:sp>
+            <p:nvSpPr>
+              <p:cNvPr id="2" name="Content Placeholder 1"/>
+              <p:cNvSpPr>
+                <a:spLocks noGrp="1"/>
+              </p:cNvSpPr>
+              <p:nvPr>
+                <p:ph idx="1"/>
+              </p:nvPr>
+            </p:nvSpPr>
             <p:spPr>
               <a:xfrm>
                 <a:off x="323850" y="1688122"/>
@@ -10246,7 +10515,7 @@
                       <a:rPr lang="en-US" sz="2000" b="0" i="0" smtClean="0">
                         <a:latin typeface="Cambria Math" panose="02040503050406030204" pitchFamily="18" charset="0"/>
                       </a:rPr>
-                      <m:t>∇</m:t>
+                      <m:t>𝛻</m:t>
                     </m:r>
                     <m:r>
                       <a:rPr lang="en-US" sz="2000" b="0" i="1" smtClean="0">
@@ -10267,14 +10536,7 @@
                         <a:latin typeface="Cambria Math" panose="02040503050406030204" pitchFamily="18" charset="0"/>
                         <a:ea typeface="Cambria Math" panose="02040503050406030204" pitchFamily="18" charset="0"/>
                       </a:rPr>
-                      <m:t>=</m:t>
-                    </m:r>
-                    <m:r>
-                      <a:rPr lang="en-US" sz="2000" b="0" i="1" smtClean="0">
-                        <a:latin typeface="Cambria Math" panose="02040503050406030204" pitchFamily="18" charset="0"/>
-                        <a:ea typeface="Cambria Math" panose="02040503050406030204" pitchFamily="18" charset="0"/>
-                      </a:rPr>
-                      <m:t>0</m:t>
+                      <m:t>=0</m:t>
                     </m:r>
                   </m:oMath>
                 </a14:m>
@@ -10315,7 +10577,7 @@
             </p:txBody>
           </p:sp>
         </mc:Choice>
-        <mc:Fallback>
+        <mc:Fallback xmlns="">
           <p:sp>
             <p:nvSpPr>
               <p:cNvPr id="2" name="Content Placeholder 1"/>
@@ -10416,7 +10678,7 @@
           <a:p>
             <a:fld id="{6C6AE60A-B69C-4790-82F7-3882EDF23186}" type="slidenum">
               <a:rPr lang="de-DE" smtClean="0"/>
-              <a:t>21</a:t>
+              <a:t>22</a:t>
             </a:fld>
             <a:endParaRPr lang="de-DE"/>
           </a:p>
@@ -10473,7 +10735,7 @@
 </p:sld>
 </file>
 
-<file path=ppt/slides/slide22.xml><?xml version="1.0" encoding="utf-8"?>
+<file path=ppt/slides/slide23.xml><?xml version="1.0" encoding="utf-8"?>
 <p:sld xmlns:a="http://schemas.openxmlformats.org/drawingml/2006/main" xmlns:r="http://schemas.openxmlformats.org/officeDocument/2006/relationships" xmlns:p="http://schemas.openxmlformats.org/presentationml/2006/main">
   <p:cSld>
     <p:spTree>
@@ -10927,7 +11189,6 @@
               <a:rPr lang="en-US" dirty="0"/>
               <a:t>to time-dependent point sources</a:t>
             </a:r>
-            <a:endParaRPr lang="en-US" dirty="0"/>
           </a:p>
         </p:txBody>
       </p:sp>
@@ -11261,7 +11522,6 @@
               <a:rPr lang="en-US" dirty="0" smtClean="0"/>
               <a:t>Require a causal filter</a:t>
             </a:r>
-            <a:endParaRPr lang="en-US" dirty="0" smtClean="0"/>
           </a:p>
         </p:txBody>
       </p:sp>
@@ -11458,7 +11718,6 @@
               <a:rPr lang="en-US" dirty="0" smtClean="0"/>
               <a:t>We use the exponential filter</a:t>
             </a:r>
-            <a:endParaRPr lang="en-US" dirty="0" smtClean="0"/>
           </a:p>
         </p:txBody>
       </p:sp>
@@ -11840,7 +12099,6 @@
               <a:rPr lang="en-US" dirty="0" smtClean="0"/>
               <a:t>Second-order, with the transfer function</a:t>
             </a:r>
-            <a:endParaRPr lang="en-US" dirty="0" smtClean="0"/>
           </a:p>
         </p:txBody>
       </p:sp>
@@ -12037,7 +12295,6 @@
               <a:rPr lang="en-US" dirty="0" smtClean="0"/>
               <a:t>Integral form needs storage of all previous values</a:t>
             </a:r>
-            <a:endParaRPr lang="en-US" dirty="0" smtClean="0"/>
           </a:p>
         </p:txBody>
       </p:sp>
@@ -12282,7 +12539,6 @@
               <a:rPr lang="en-US" dirty="0" smtClean="0"/>
               <a:t>Differential form only subject to time integration scheme</a:t>
             </a:r>
-            <a:endParaRPr lang="en-US" dirty="0" smtClean="0"/>
           </a:p>
         </p:txBody>
       </p:sp>
@@ -12624,7 +12880,6 @@
               <a:rPr lang="en-US" dirty="0" smtClean="0"/>
               <a:t>-Stokes equations gives</a:t>
             </a:r>
-            <a:endParaRPr lang="en-US" dirty="0" smtClean="0"/>
           </a:p>
         </p:txBody>
       </p:sp>
@@ -12676,8 +12931,8 @@
           </a:prstGeom>
         </p:spPr>
       </p:pic>
-      <mc:AlternateContent xmlns:mc="http://schemas.openxmlformats.org/markup-compatibility/2006">
-        <mc:Choice xmlns:a14="http://schemas.microsoft.com/office/drawing/2010/main" Requires="a14">
+      <mc:AlternateContent xmlns:mc="http://schemas.openxmlformats.org/markup-compatibility/2006" xmlns:a14="http://schemas.microsoft.com/office/drawing/2010/main">
+        <mc:Choice Requires="a14">
           <p:sp>
             <p:nvSpPr>
               <p:cNvPr id="15" name="Content Placeholder 7"/>
@@ -12913,7 +13168,7 @@
             </p:txBody>
           </p:sp>
         </mc:Choice>
-        <mc:Fallback>
+        <mc:Fallback xmlns="">
           <p:sp>
             <p:nvSpPr>
               <p:cNvPr id="15" name="Content Placeholder 7"/>
@@ -13301,18 +13556,12 @@
               <a:rPr lang="en-US" dirty="0" smtClean="0"/>
               <a:t>Extended to TLES by Pruett [1] as temporal ADM (TADM)</a:t>
             </a:r>
-            <a:endParaRPr lang="en-US" dirty="0" smtClean="0"/>
           </a:p>
           <a:p>
             <a:r>
               <a:rPr lang="en-US" dirty="0" smtClean="0"/>
-              <a:t>Prof. Jenny [3] proposed an exact deconvolution fo</a:t>
-            </a:r>
-            <a:r>
-              <a:rPr lang="en-US" dirty="0" smtClean="0"/>
-              <a:t>r the exponential filter (TEDM)</a:t>
-            </a:r>
-            <a:endParaRPr lang="en-US" dirty="0" smtClean="0"/>
+              <a:t>Prof. Jenny [3] proposed an exact deconvolution for the exponential filter (TEDM)</a:t>
+            </a:r>
           </a:p>
         </p:txBody>
       </p:sp>
@@ -13378,8 +13627,8 @@
             </a:prstGeom>
           </p:spPr>
         </p:pic>
-        <mc:AlternateContent xmlns:mc="http://schemas.openxmlformats.org/markup-compatibility/2006">
-          <mc:Choice xmlns:a14="http://schemas.microsoft.com/office/drawing/2010/main" Requires="a14">
+        <mc:AlternateContent xmlns:mc="http://schemas.openxmlformats.org/markup-compatibility/2006" xmlns:a14="http://schemas.microsoft.com/office/drawing/2010/main">
+          <mc:Choice Requires="a14">
             <p:sp>
               <p:nvSpPr>
                 <p:cNvPr id="8" name="TextBox 7"/>
@@ -13402,6 +13651,7 @@
                 </a:bodyPr>
                 <a:lstStyle/>
                 <a:p>
+                  <a:pPr/>
                   <a14:m>
                     <m:oMathPara xmlns:m="http://schemas.openxmlformats.org/officeDocument/2006/math">
                       <m:oMathParaPr>
@@ -13423,7 +13673,7 @@
               </p:txBody>
             </p:sp>
           </mc:Choice>
-          <mc:Fallback>
+          <mc:Fallback xmlns="">
             <p:sp>
               <p:nvSpPr>
                 <p:cNvPr id="8" name="TextBox 7"/>
@@ -13600,8 +13850,8 @@
           </a:p>
         </p:txBody>
       </p:sp>
-      <mc:AlternateContent xmlns:mc="http://schemas.openxmlformats.org/markup-compatibility/2006">
-        <mc:Choice xmlns:a14="http://schemas.microsoft.com/office/drawing/2010/main" Requires="a14">
+      <mc:AlternateContent xmlns:mc="http://schemas.openxmlformats.org/markup-compatibility/2006" xmlns:a14="http://schemas.microsoft.com/office/drawing/2010/main">
+        <mc:Choice Requires="a14">
           <p:sp>
             <p:nvSpPr>
               <p:cNvPr id="11" name="Content Placeholder 7"/>
@@ -13857,7 +14107,7 @@
             </p:txBody>
           </p:sp>
         </mc:Choice>
-        <mc:Fallback>
+        <mc:Fallback xmlns="">
           <p:sp>
             <p:nvSpPr>
               <p:cNvPr id="11" name="Content Placeholder 7"/>
@@ -14132,8 +14382,8 @@
           </a:p>
         </p:txBody>
       </p:sp>
-      <mc:AlternateContent xmlns:mc="http://schemas.openxmlformats.org/markup-compatibility/2006">
-        <mc:Choice xmlns:a14="http://schemas.microsoft.com/office/drawing/2010/main" Requires="a14">
+      <mc:AlternateContent xmlns:mc="http://schemas.openxmlformats.org/markup-compatibility/2006" xmlns:a14="http://schemas.microsoft.com/office/drawing/2010/main">
+        <mc:Choice Requires="a14">
           <p:sp>
             <p:nvSpPr>
               <p:cNvPr id="11" name="Content Placeholder 7"/>
@@ -14361,7 +14611,7 @@
             </p:txBody>
           </p:sp>
         </mc:Choice>
-        <mc:Fallback>
+        <mc:Fallback xmlns="">
           <p:sp>
             <p:nvSpPr>
               <p:cNvPr id="11" name="Content Placeholder 7"/>
@@ -14424,8 +14674,8 @@
           </a:prstGeom>
         </p:spPr>
       </p:pic>
-      <mc:AlternateContent xmlns:mc="http://schemas.openxmlformats.org/markup-compatibility/2006">
-        <mc:Choice xmlns:a14="http://schemas.microsoft.com/office/drawing/2010/main" Requires="a14">
+      <mc:AlternateContent xmlns:mc="http://schemas.openxmlformats.org/markup-compatibility/2006" xmlns:a14="http://schemas.microsoft.com/office/drawing/2010/main">
+        <mc:Choice Requires="a14">
           <p:sp>
             <p:nvSpPr>
               <p:cNvPr id="10" name="Content Placeholder 7"/>
@@ -14617,11 +14867,7 @@
               <a:p>
                 <a:r>
                   <a:rPr lang="en-US" dirty="0" smtClean="0"/>
-                  <a:t>Can be solved in alternation with the evolution equation fo</a:t>
-                </a:r>
-                <a:r>
-                  <a:rPr lang="en-US" dirty="0" smtClean="0"/>
-                  <a:t>r </a:t>
+                  <a:t>Can be solved in alternation with the evolution equation for </a:t>
                 </a:r>
                 <a14:m>
                   <m:oMath xmlns:m="http://schemas.openxmlformats.org/officeDocument/2006/math">
@@ -14653,7 +14899,7 @@
             </p:txBody>
           </p:sp>
         </mc:Choice>
-        <mc:Fallback>
+        <mc:Fallback xmlns="">
           <p:sp>
             <p:nvSpPr>
               <p:cNvPr id="10" name="Content Placeholder 7"/>

</xml_diff>

<commit_message>
Integrated feedback to presentation
</commit_message>
<xml_diff>
--- a/Presentation/maloneys_HS2017.pptx
+++ b/Presentation/maloneys_HS2017.pptx
@@ -270,7 +270,7 @@
           <a:p>
             <a:fld id="{BCDB334D-D17F-49C4-91DD-37BB7E818209}" type="datetimeFigureOut">
               <a:rPr lang="de-CH" smtClean="0"/>
-              <a:t>19.12.2017</a:t>
+              <a:t>20.12.2017</a:t>
             </a:fld>
             <a:endParaRPr lang="de-CH"/>
           </a:p>
@@ -4387,8 +4387,8 @@
           </a:prstGeom>
         </p:spPr>
       </p:pic>
-      <mc:AlternateContent xmlns:mc="http://schemas.openxmlformats.org/markup-compatibility/2006" xmlns:a14="http://schemas.microsoft.com/office/drawing/2010/main">
-        <mc:Choice Requires="a14">
+      <mc:AlternateContent xmlns:mc="http://schemas.openxmlformats.org/markup-compatibility/2006">
+        <mc:Choice xmlns:a14="http://schemas.microsoft.com/office/drawing/2010/main" Requires="a14">
           <p:sp>
             <p:nvSpPr>
               <p:cNvPr id="12" name="Content Placeholder 7"/>
@@ -4580,7 +4580,15 @@
               <a:p>
                 <a:r>
                   <a:rPr lang="en-US" dirty="0" smtClean="0"/>
-                  <a:t>Addition of linear forcing term to momentum equation</a:t>
+                  <a:t>Addition of linear </a:t>
+                </a:r>
+                <a:r>
+                  <a:rPr lang="en-US" dirty="0" smtClean="0"/>
+                  <a:t>feedback </a:t>
+                </a:r>
+                <a:r>
+                  <a:rPr lang="en-US" dirty="0" smtClean="0"/>
+                  <a:t>term to momentum equation</a:t>
                 </a:r>
               </a:p>
               <a:p>
@@ -4697,7 +4705,7 @@
             </p:txBody>
           </p:sp>
         </mc:Choice>
-        <mc:Fallback xmlns="">
+        <mc:Fallback>
           <p:sp>
             <p:nvSpPr>
               <p:cNvPr id="12" name="Content Placeholder 7"/>
@@ -6652,7 +6660,7 @@
         </p:blipFill>
         <p:spPr>
           <a:xfrm>
-            <a:off x="4326951" y="3380077"/>
+            <a:off x="2629829" y="3380077"/>
             <a:ext cx="1076325" cy="733425"/>
           </a:xfrm>
           <a:prstGeom prst="rect">
@@ -6676,7 +6684,7 @@
         </p:blipFill>
         <p:spPr>
           <a:xfrm>
-            <a:off x="6140858" y="3322499"/>
+            <a:off x="4063346" y="3322499"/>
             <a:ext cx="866775" cy="766763"/>
           </a:xfrm>
           <a:prstGeom prst="rect">
@@ -6692,8 +6700,8 @@
         </p:nvSpPr>
         <p:spPr>
           <a:xfrm>
-            <a:off x="1248511" y="3562123"/>
-            <a:ext cx="2646878" cy="369332"/>
+            <a:off x="553569" y="3562123"/>
+            <a:ext cx="1992853" cy="369332"/>
           </a:xfrm>
           <a:prstGeom prst="rect">
             <a:avLst/>
@@ -6707,13 +6715,595 @@
           <a:lstStyle/>
           <a:p>
             <a:r>
+              <a:rPr lang="en-US" dirty="0"/>
+              <a:t>F</a:t>
+            </a:r>
+            <a:r>
               <a:rPr lang="en-US" dirty="0" smtClean="0"/>
-              <a:t>Define filter width ratios:</a:t>
+              <a:t>ilter width ratios:</a:t>
             </a:r>
             <a:endParaRPr lang="de-CH" dirty="0"/>
           </a:p>
         </p:txBody>
       </p:sp>
+      <mc:AlternateContent xmlns:mc="http://schemas.openxmlformats.org/markup-compatibility/2006" xmlns:a14="http://schemas.microsoft.com/office/drawing/2010/main">
+        <mc:Choice Requires="a14">
+          <p:sp>
+            <p:nvSpPr>
+              <p:cNvPr id="7" name="TextBox 6"/>
+              <p:cNvSpPr txBox="1"/>
+              <p:nvPr/>
+            </p:nvSpPr>
+            <p:spPr>
+              <a:xfrm>
+                <a:off x="1601633" y="4830660"/>
+                <a:ext cx="1542410" cy="369332"/>
+              </a:xfrm>
+              <a:prstGeom prst="rect">
+                <a:avLst/>
+              </a:prstGeom>
+              <a:noFill/>
+            </p:spPr>
+            <p:txBody>
+              <a:bodyPr wrap="none" rtlCol="0">
+                <a:spAutoFit/>
+              </a:bodyPr>
+              <a:lstStyle/>
+              <a:p>
+                <a:pPr/>
+                <a14:m>
+                  <m:oMathPara xmlns:m="http://schemas.openxmlformats.org/officeDocument/2006/math">
+                    <m:oMathParaPr>
+                      <m:jc m:val="centerGroup"/>
+                    </m:oMathParaPr>
+                    <m:oMath xmlns:m="http://schemas.openxmlformats.org/officeDocument/2006/math">
+                      <m:r>
+                        <m:rPr>
+                          <m:sty m:val="p"/>
+                        </m:rPr>
+                        <a:rPr lang="de-CH" i="1">
+                          <a:solidFill>
+                            <a:schemeClr val="bg1"/>
+                          </a:solidFill>
+                          <a:latin typeface="Cambria Math" panose="02040503050406030204" pitchFamily="18" charset="0"/>
+                        </a:rPr>
+                        <m:t>L</m:t>
+                      </m:r>
+                      <m:r>
+                        <a:rPr lang="de-CH" b="0" i="1" smtClean="0">
+                          <a:solidFill>
+                            <a:schemeClr val="bg1"/>
+                          </a:solidFill>
+                          <a:latin typeface="Cambria Math" panose="02040503050406030204" pitchFamily="18" charset="0"/>
+                        </a:rPr>
+                        <m:t>=50.8 </m:t>
+                      </m:r>
+                      <m:r>
+                        <m:rPr>
+                          <m:sty m:val="p"/>
+                        </m:rPr>
+                        <a:rPr lang="de-CH" b="0" i="0" smtClean="0">
+                          <a:solidFill>
+                            <a:schemeClr val="bg1"/>
+                          </a:solidFill>
+                          <a:latin typeface="Cambria Math" panose="02040503050406030204" pitchFamily="18" charset="0"/>
+                        </a:rPr>
+                        <m:t>mm</m:t>
+                      </m:r>
+                    </m:oMath>
+                  </m:oMathPara>
+                </a14:m>
+                <a:endParaRPr lang="de-CH" dirty="0">
+                  <a:solidFill>
+                    <a:schemeClr val="bg1"/>
+                  </a:solidFill>
+                </a:endParaRPr>
+              </a:p>
+            </p:txBody>
+          </p:sp>
+        </mc:Choice>
+        <mc:Fallback xmlns="">
+          <p:sp>
+            <p:nvSpPr>
+              <p:cNvPr id="7" name="TextBox 6"/>
+              <p:cNvSpPr txBox="1">
+                <a:spLocks noRot="1" noChangeAspect="1" noMove="1" noResize="1" noEditPoints="1" noAdjustHandles="1" noChangeArrowheads="1" noChangeShapeType="1" noTextEdit="1"/>
+              </p:cNvSpPr>
+              <p:nvPr/>
+            </p:nvSpPr>
+            <p:spPr>
+              <a:xfrm>
+                <a:off x="1601633" y="4830660"/>
+                <a:ext cx="1542410" cy="369332"/>
+              </a:xfrm>
+              <a:prstGeom prst="rect">
+                <a:avLst/>
+              </a:prstGeom>
+              <a:blipFill>
+                <a:blip r:embed="rId7"/>
+                <a:stretch>
+                  <a:fillRect/>
+                </a:stretch>
+              </a:blipFill>
+            </p:spPr>
+            <p:txBody>
+              <a:bodyPr/>
+              <a:lstStyle/>
+              <a:p>
+                <a:r>
+                  <a:rPr lang="de-CH">
+                    <a:noFill/>
+                  </a:rPr>
+                  <a:t> </a:t>
+                </a:r>
+              </a:p>
+            </p:txBody>
+          </p:sp>
+        </mc:Fallback>
+      </mc:AlternateContent>
+      <mc:AlternateContent xmlns:mc="http://schemas.openxmlformats.org/markup-compatibility/2006" xmlns:a14="http://schemas.microsoft.com/office/drawing/2010/main">
+        <mc:Choice Requires="a14">
+          <p:sp>
+            <p:nvSpPr>
+              <p:cNvPr id="13" name="TextBox 12"/>
+              <p:cNvSpPr txBox="1"/>
+              <p:nvPr/>
+            </p:nvSpPr>
+            <p:spPr>
+              <a:xfrm>
+                <a:off x="291585" y="4400853"/>
+                <a:ext cx="1165704" cy="566630"/>
+              </a:xfrm>
+              <a:prstGeom prst="rect">
+                <a:avLst/>
+              </a:prstGeom>
+              <a:noFill/>
+            </p:spPr>
+            <p:txBody>
+              <a:bodyPr wrap="none" rtlCol="0">
+                <a:spAutoFit/>
+              </a:bodyPr>
+              <a:lstStyle/>
+              <a:p>
+                <a:pPr/>
+                <a14:m>
+                  <m:oMathPara xmlns:m="http://schemas.openxmlformats.org/officeDocument/2006/math">
+                    <m:oMathParaPr>
+                      <m:jc m:val="centerGroup"/>
+                    </m:oMathParaPr>
+                    <m:oMath xmlns:m="http://schemas.openxmlformats.org/officeDocument/2006/math">
+                      <m:r>
+                        <m:rPr>
+                          <m:sty m:val="p"/>
+                        </m:rPr>
+                        <a:rPr lang="de-CH" i="1" smtClean="0">
+                          <a:solidFill>
+                            <a:schemeClr val="bg1"/>
+                          </a:solidFill>
+                          <a:latin typeface="Cambria Math" panose="02040503050406030204" pitchFamily="18" charset="0"/>
+                        </a:rPr>
+                        <m:t>u</m:t>
+                      </m:r>
+                      <m:r>
+                        <a:rPr lang="de-CH" b="0" i="1" smtClean="0">
+                          <a:solidFill>
+                            <a:schemeClr val="bg1"/>
+                          </a:solidFill>
+                          <a:latin typeface="Cambria Math" panose="02040503050406030204" pitchFamily="18" charset="0"/>
+                        </a:rPr>
+                        <m:t>=10</m:t>
+                      </m:r>
+                      <m:f>
+                        <m:fPr>
+                          <m:ctrlPr>
+                            <a:rPr lang="de-CH" b="0" i="1" smtClean="0">
+                              <a:solidFill>
+                                <a:schemeClr val="bg1"/>
+                              </a:solidFill>
+                              <a:latin typeface="Cambria Math" panose="02040503050406030204" pitchFamily="18" charset="0"/>
+                            </a:rPr>
+                          </m:ctrlPr>
+                        </m:fPr>
+                        <m:num>
+                          <m:r>
+                            <m:rPr>
+                              <m:sty m:val="p"/>
+                            </m:rPr>
+                            <a:rPr lang="de-CH" b="0" i="0" smtClean="0">
+                              <a:solidFill>
+                                <a:schemeClr val="bg1"/>
+                              </a:solidFill>
+                              <a:latin typeface="Cambria Math" panose="02040503050406030204" pitchFamily="18" charset="0"/>
+                            </a:rPr>
+                            <m:t>m</m:t>
+                          </m:r>
+                        </m:num>
+                        <m:den>
+                          <m:r>
+                            <m:rPr>
+                              <m:sty m:val="p"/>
+                            </m:rPr>
+                            <a:rPr lang="de-CH" b="0" i="0" smtClean="0">
+                              <a:solidFill>
+                                <a:schemeClr val="bg1"/>
+                              </a:solidFill>
+                              <a:latin typeface="Cambria Math" panose="02040503050406030204" pitchFamily="18" charset="0"/>
+                            </a:rPr>
+                            <m:t>s</m:t>
+                          </m:r>
+                        </m:den>
+                      </m:f>
+                    </m:oMath>
+                  </m:oMathPara>
+                </a14:m>
+                <a:endParaRPr lang="de-CH" dirty="0">
+                  <a:solidFill>
+                    <a:schemeClr val="bg1"/>
+                  </a:solidFill>
+                </a:endParaRPr>
+              </a:p>
+            </p:txBody>
+          </p:sp>
+        </mc:Choice>
+        <mc:Fallback xmlns="">
+          <p:sp>
+            <p:nvSpPr>
+              <p:cNvPr id="13" name="TextBox 12"/>
+              <p:cNvSpPr txBox="1">
+                <a:spLocks noRot="1" noChangeAspect="1" noMove="1" noResize="1" noEditPoints="1" noAdjustHandles="1" noChangeArrowheads="1" noChangeShapeType="1" noTextEdit="1"/>
+              </p:cNvSpPr>
+              <p:nvPr/>
+            </p:nvSpPr>
+            <p:spPr>
+              <a:xfrm>
+                <a:off x="291585" y="4400853"/>
+                <a:ext cx="1165704" cy="566630"/>
+              </a:xfrm>
+              <a:prstGeom prst="rect">
+                <a:avLst/>
+              </a:prstGeom>
+              <a:blipFill>
+                <a:blip r:embed="rId8"/>
+                <a:stretch>
+                  <a:fillRect/>
+                </a:stretch>
+              </a:blipFill>
+            </p:spPr>
+            <p:txBody>
+              <a:bodyPr/>
+              <a:lstStyle/>
+              <a:p>
+                <a:r>
+                  <a:rPr lang="de-CH">
+                    <a:noFill/>
+                  </a:rPr>
+                  <a:t> </a:t>
+                </a:r>
+              </a:p>
+            </p:txBody>
+          </p:sp>
+        </mc:Fallback>
+      </mc:AlternateContent>
+      <mc:AlternateContent xmlns:mc="http://schemas.openxmlformats.org/markup-compatibility/2006" xmlns:a14="http://schemas.microsoft.com/office/drawing/2010/main">
+        <mc:Choice Requires="a14">
+          <p:sp>
+            <p:nvSpPr>
+              <p:cNvPr id="14" name="TextBox 13"/>
+              <p:cNvSpPr txBox="1"/>
+              <p:nvPr/>
+            </p:nvSpPr>
+            <p:spPr>
+              <a:xfrm>
+                <a:off x="4572000" y="4643420"/>
+                <a:ext cx="1497718" cy="648126"/>
+              </a:xfrm>
+              <a:prstGeom prst="rect">
+                <a:avLst/>
+              </a:prstGeom>
+              <a:noFill/>
+            </p:spPr>
+            <p:txBody>
+              <a:bodyPr wrap="none" rtlCol="0">
+                <a:spAutoFit/>
+              </a:bodyPr>
+              <a:lstStyle/>
+              <a:p>
+                <a:pPr/>
+                <a14:m>
+                  <m:oMathPara xmlns:m="http://schemas.openxmlformats.org/officeDocument/2006/math">
+                    <m:oMathParaPr>
+                      <m:jc m:val="centerGroup"/>
+                    </m:oMathParaPr>
+                    <m:oMath xmlns:m="http://schemas.openxmlformats.org/officeDocument/2006/math">
+                      <m:r>
+                        <a:rPr lang="de-CH" b="0" i="1" smtClean="0">
+                          <a:solidFill>
+                            <a:schemeClr val="bg1"/>
+                          </a:solidFill>
+                          <a:latin typeface="Cambria Math" panose="02040503050406030204" pitchFamily="18" charset="0"/>
+                        </a:rPr>
+                        <m:t>𝜈</m:t>
+                      </m:r>
+                      <m:r>
+                        <a:rPr lang="de-CH" b="0" i="1" smtClean="0">
+                          <a:solidFill>
+                            <a:schemeClr val="bg1"/>
+                          </a:solidFill>
+                          <a:latin typeface="Cambria Math" panose="02040503050406030204" pitchFamily="18" charset="0"/>
+                        </a:rPr>
+                        <m:t>=</m:t>
+                      </m:r>
+                      <m:sSup>
+                        <m:sSupPr>
+                          <m:ctrlPr>
+                            <a:rPr lang="de-CH" b="0" i="1" smtClean="0">
+                              <a:solidFill>
+                                <a:schemeClr val="bg1"/>
+                              </a:solidFill>
+                              <a:latin typeface="Cambria Math" panose="02040503050406030204" pitchFamily="18" charset="0"/>
+                            </a:rPr>
+                          </m:ctrlPr>
+                        </m:sSupPr>
+                        <m:e>
+                          <m:r>
+                            <a:rPr lang="de-CH" b="0" i="1" smtClean="0">
+                              <a:solidFill>
+                                <a:schemeClr val="bg1"/>
+                              </a:solidFill>
+                              <a:latin typeface="Cambria Math" panose="02040503050406030204" pitchFamily="18" charset="0"/>
+                            </a:rPr>
+                            <m:t>10</m:t>
+                          </m:r>
+                        </m:e>
+                        <m:sup>
+                          <m:r>
+                            <a:rPr lang="de-CH" b="0" i="1" smtClean="0">
+                              <a:solidFill>
+                                <a:schemeClr val="bg1"/>
+                              </a:solidFill>
+                              <a:latin typeface="Cambria Math" panose="02040503050406030204" pitchFamily="18" charset="0"/>
+                            </a:rPr>
+                            <m:t>−5</m:t>
+                          </m:r>
+                        </m:sup>
+                      </m:sSup>
+                      <m:f>
+                        <m:fPr>
+                          <m:ctrlPr>
+                            <a:rPr lang="de-CH" b="0" i="1" smtClean="0">
+                              <a:solidFill>
+                                <a:schemeClr val="bg1"/>
+                              </a:solidFill>
+                              <a:latin typeface="Cambria Math" panose="02040503050406030204" pitchFamily="18" charset="0"/>
+                            </a:rPr>
+                          </m:ctrlPr>
+                        </m:fPr>
+                        <m:num>
+                          <m:sSup>
+                            <m:sSupPr>
+                              <m:ctrlPr>
+                                <a:rPr lang="de-CH" b="0" i="1" smtClean="0">
+                                  <a:solidFill>
+                                    <a:schemeClr val="bg1"/>
+                                  </a:solidFill>
+                                  <a:latin typeface="Cambria Math" panose="02040503050406030204" pitchFamily="18" charset="0"/>
+                                </a:rPr>
+                              </m:ctrlPr>
+                            </m:sSupPr>
+                            <m:e>
+                              <m:r>
+                                <m:rPr>
+                                  <m:sty m:val="p"/>
+                                </m:rPr>
+                                <a:rPr lang="de-CH" b="0" i="0" smtClean="0">
+                                  <a:solidFill>
+                                    <a:schemeClr val="bg1"/>
+                                  </a:solidFill>
+                                  <a:latin typeface="Cambria Math" panose="02040503050406030204" pitchFamily="18" charset="0"/>
+                                </a:rPr>
+                                <m:t>m</m:t>
+                              </m:r>
+                            </m:e>
+                            <m:sup>
+                              <m:r>
+                                <a:rPr lang="de-CH" b="0" i="0" smtClean="0">
+                                  <a:solidFill>
+                                    <a:schemeClr val="bg1"/>
+                                  </a:solidFill>
+                                  <a:latin typeface="Cambria Math" panose="02040503050406030204" pitchFamily="18" charset="0"/>
+                                </a:rPr>
+                                <m:t>2</m:t>
+                              </m:r>
+                            </m:sup>
+                          </m:sSup>
+                        </m:num>
+                        <m:den>
+                          <m:r>
+                            <m:rPr>
+                              <m:sty m:val="p"/>
+                            </m:rPr>
+                            <a:rPr lang="de-CH" b="0" i="0" smtClean="0">
+                              <a:solidFill>
+                                <a:schemeClr val="bg1"/>
+                              </a:solidFill>
+                              <a:latin typeface="Cambria Math" panose="02040503050406030204" pitchFamily="18" charset="0"/>
+                            </a:rPr>
+                            <m:t>s</m:t>
+                          </m:r>
+                        </m:den>
+                      </m:f>
+                    </m:oMath>
+                  </m:oMathPara>
+                </a14:m>
+                <a:endParaRPr lang="de-CH" dirty="0">
+                  <a:solidFill>
+                    <a:schemeClr val="bg1"/>
+                  </a:solidFill>
+                </a:endParaRPr>
+              </a:p>
+            </p:txBody>
+          </p:sp>
+        </mc:Choice>
+        <mc:Fallback xmlns="">
+          <p:sp>
+            <p:nvSpPr>
+              <p:cNvPr id="14" name="TextBox 13"/>
+              <p:cNvSpPr txBox="1">
+                <a:spLocks noRot="1" noChangeAspect="1" noMove="1" noResize="1" noEditPoints="1" noAdjustHandles="1" noChangeArrowheads="1" noChangeShapeType="1" noTextEdit="1"/>
+              </p:cNvSpPr>
+              <p:nvPr/>
+            </p:nvSpPr>
+            <p:spPr>
+              <a:xfrm>
+                <a:off x="4572000" y="4643420"/>
+                <a:ext cx="1497718" cy="648126"/>
+              </a:xfrm>
+              <a:prstGeom prst="rect">
+                <a:avLst/>
+              </a:prstGeom>
+              <a:blipFill>
+                <a:blip r:embed="rId9"/>
+                <a:stretch>
+                  <a:fillRect/>
+                </a:stretch>
+              </a:blipFill>
+            </p:spPr>
+            <p:txBody>
+              <a:bodyPr/>
+              <a:lstStyle/>
+              <a:p>
+                <a:r>
+                  <a:rPr lang="de-CH">
+                    <a:noFill/>
+                  </a:rPr>
+                  <a:t> </a:t>
+                </a:r>
+              </a:p>
+            </p:txBody>
+          </p:sp>
+        </mc:Fallback>
+      </mc:AlternateContent>
+      <mc:AlternateContent xmlns:mc="http://schemas.openxmlformats.org/markup-compatibility/2006" xmlns:a14="http://schemas.microsoft.com/office/drawing/2010/main">
+        <mc:Choice Requires="a14">
+          <p:sp>
+            <p:nvSpPr>
+              <p:cNvPr id="15" name="TextBox 14"/>
+              <p:cNvSpPr txBox="1"/>
+              <p:nvPr/>
+            </p:nvSpPr>
+            <p:spPr>
+              <a:xfrm>
+                <a:off x="5944982" y="3487936"/>
+                <a:ext cx="1835631" cy="517706"/>
+              </a:xfrm>
+              <a:prstGeom prst="rect">
+                <a:avLst/>
+              </a:prstGeom>
+              <a:noFill/>
+            </p:spPr>
+            <p:txBody>
+              <a:bodyPr wrap="none" lIns="0" tIns="0" rIns="0" bIns="0" rtlCol="0">
+                <a:spAutoFit/>
+              </a:bodyPr>
+              <a:lstStyle/>
+              <a:p>
+                <a:pPr/>
+                <a14:m>
+                  <m:oMathPara xmlns:m="http://schemas.openxmlformats.org/officeDocument/2006/math">
+                    <m:oMathParaPr>
+                      <m:jc m:val="centerGroup"/>
+                    </m:oMathParaPr>
+                    <m:oMath xmlns:m="http://schemas.openxmlformats.org/officeDocument/2006/math">
+                      <m:r>
+                        <a:rPr lang="de-CH" b="0" i="1" smtClean="0">
+                          <a:latin typeface="Cambria Math" panose="02040503050406030204" pitchFamily="18" charset="0"/>
+                        </a:rPr>
+                        <m:t>𝑅𝑒</m:t>
+                      </m:r>
+                      <m:r>
+                        <a:rPr lang="de-CH" b="0" i="1" smtClean="0">
+                          <a:latin typeface="Cambria Math" panose="02040503050406030204" pitchFamily="18" charset="0"/>
+                        </a:rPr>
+                        <m:t>=</m:t>
+                      </m:r>
+                      <m:f>
+                        <m:fPr>
+                          <m:ctrlPr>
+                            <a:rPr lang="de-CH" b="0" i="1" smtClean="0">
+                              <a:latin typeface="Cambria Math" panose="02040503050406030204" pitchFamily="18" charset="0"/>
+                            </a:rPr>
+                          </m:ctrlPr>
+                        </m:fPr>
+                        <m:num>
+                          <m:r>
+                            <a:rPr lang="de-CH" b="0" i="1" smtClean="0">
+                              <a:latin typeface="Cambria Math" panose="02040503050406030204" pitchFamily="18" charset="0"/>
+                            </a:rPr>
+                            <m:t>𝑢𝐿</m:t>
+                          </m:r>
+                        </m:num>
+                        <m:den>
+                          <m:r>
+                            <a:rPr lang="de-CH" b="0" i="1" smtClean="0">
+                              <a:latin typeface="Cambria Math" panose="02040503050406030204" pitchFamily="18" charset="0"/>
+                            </a:rPr>
+                            <m:t>𝜈</m:t>
+                          </m:r>
+                        </m:den>
+                      </m:f>
+                      <m:r>
+                        <a:rPr lang="de-CH" b="0" i="1" smtClean="0">
+                          <a:latin typeface="Cambria Math" panose="02040503050406030204" pitchFamily="18" charset="0"/>
+                        </a:rPr>
+                        <m:t>=50800</m:t>
+                      </m:r>
+                    </m:oMath>
+                  </m:oMathPara>
+                </a14:m>
+                <a:endParaRPr lang="de-CH" dirty="0"/>
+              </a:p>
+            </p:txBody>
+          </p:sp>
+        </mc:Choice>
+        <mc:Fallback xmlns="">
+          <p:sp>
+            <p:nvSpPr>
+              <p:cNvPr id="15" name="TextBox 14"/>
+              <p:cNvSpPr txBox="1">
+                <a:spLocks noRot="1" noChangeAspect="1" noMove="1" noResize="1" noEditPoints="1" noAdjustHandles="1" noChangeArrowheads="1" noChangeShapeType="1" noTextEdit="1"/>
+              </p:cNvSpPr>
+              <p:nvPr/>
+            </p:nvSpPr>
+            <p:spPr>
+              <a:xfrm>
+                <a:off x="5944982" y="3487936"/>
+                <a:ext cx="1835631" cy="517706"/>
+              </a:xfrm>
+              <a:prstGeom prst="rect">
+                <a:avLst/>
+              </a:prstGeom>
+              <a:blipFill>
+                <a:blip r:embed="rId10"/>
+                <a:stretch>
+                  <a:fillRect/>
+                </a:stretch>
+              </a:blipFill>
+            </p:spPr>
+            <p:txBody>
+              <a:bodyPr/>
+              <a:lstStyle/>
+              <a:p>
+                <a:r>
+                  <a:rPr lang="de-CH">
+                    <a:noFill/>
+                  </a:rPr>
+                  <a:t> </a:t>
+                </a:r>
+              </a:p>
+            </p:txBody>
+          </p:sp>
+        </mc:Fallback>
+      </mc:AlternateContent>
     </p:spTree>
     <p:extLst>
       <p:ext uri="{BB962C8B-B14F-4D97-AF65-F5344CB8AC3E}">
@@ -7618,7 +8208,6 @@
                 </a:lvl1pPr>
               </a:lstStyle>
               <a:p>
-                <a:pPr/>
                 <a:r>
                   <a:rPr lang="en-US" dirty="0" smtClean="0"/>
                   <a:t>TLES with Regularization</a:t>
@@ -7631,214 +8220,247 @@
                   <a:rPr lang="en-US" dirty="0"/>
                 </a:br>
                 <a14:m>
-                  <m:oMathPara xmlns:m="http://schemas.openxmlformats.org/officeDocument/2006/math">
-                    <m:oMathParaPr>
-                      <m:jc m:val="left"/>
-                    </m:oMathParaPr>
-                    <m:oMath xmlns:m="http://schemas.openxmlformats.org/officeDocument/2006/math">
-                      <m:r>
-                        <a:rPr lang="en-US" sz="2000" smtClean="0">
-                          <a:latin typeface="Cambria Math" panose="02040503050406030204" pitchFamily="18" charset="0"/>
-                        </a:rPr>
-                        <m:t>𝚫</m:t>
-                      </m:r>
-                      <m:r>
-                        <a:rPr lang="en-US" sz="2000" smtClean="0">
-                          <a:latin typeface="Cambria Math" panose="02040503050406030204" pitchFamily="18" charset="0"/>
-                        </a:rPr>
-                        <m:t>𝐭</m:t>
-                      </m:r>
-                      <m:r>
-                        <a:rPr lang="en-US" sz="2000" smtClean="0">
-                          <a:latin typeface="Cambria Math" panose="02040503050406030204" pitchFamily="18" charset="0"/>
-                        </a:rPr>
-                        <m:t>=</m:t>
-                      </m:r>
-                      <m:r>
-                        <a:rPr lang="en-US" sz="2000" smtClean="0">
-                          <a:latin typeface="Cambria Math" panose="02040503050406030204" pitchFamily="18" charset="0"/>
-                        </a:rPr>
-                        <m:t>𝟏</m:t>
-                      </m:r>
-                      <m:sSup>
-                        <m:sSupPr>
-                          <m:ctrlPr>
-                            <a:rPr lang="en-US" sz="2000" i="1" smtClean="0">
-                              <a:latin typeface="Cambria Math" panose="02040503050406030204" pitchFamily="18" charset="0"/>
-                            </a:rPr>
-                          </m:ctrlPr>
-                        </m:sSupPr>
-                        <m:e>
-                          <m:r>
-                            <a:rPr lang="en-US" sz="2000" smtClean="0">
-                              <a:latin typeface="Cambria Math" panose="02040503050406030204" pitchFamily="18" charset="0"/>
-                            </a:rPr>
-                            <m:t>𝟎</m:t>
-                          </m:r>
-                        </m:e>
-                        <m:sup>
-                          <m:r>
-                            <a:rPr lang="en-US" sz="2000" smtClean="0">
-                              <a:latin typeface="Cambria Math" panose="02040503050406030204" pitchFamily="18" charset="0"/>
-                            </a:rPr>
-                            <m:t>−</m:t>
-                          </m:r>
-                          <m:r>
-                            <a:rPr lang="en-US" sz="2000" smtClean="0">
-                              <a:latin typeface="Cambria Math" panose="02040503050406030204" pitchFamily="18" charset="0"/>
-                            </a:rPr>
-                            <m:t>𝟔</m:t>
-                          </m:r>
-                        </m:sup>
-                      </m:sSup>
-                      <m:r>
-                        <a:rPr lang="en-US" sz="2000" smtClean="0">
-                          <a:latin typeface="Cambria Math" panose="02040503050406030204" pitchFamily="18" charset="0"/>
-                        </a:rPr>
-                        <m:t>,</m:t>
-                      </m:r>
-                      <m:sSub>
-                        <m:sSubPr>
-                          <m:ctrlPr>
-                            <a:rPr lang="en-US" sz="2000" i="1">
-                              <a:latin typeface="Cambria Math" panose="02040503050406030204" pitchFamily="18" charset="0"/>
-                            </a:rPr>
-                          </m:ctrlPr>
-                        </m:sSubPr>
-                        <m:e>
-                          <m:r>
-                            <a:rPr lang="en-US" sz="2000" i="1">
-                              <a:latin typeface="Cambria Math" panose="02040503050406030204" pitchFamily="18" charset="0"/>
-                            </a:rPr>
-                            <m:t>𝒕</m:t>
-                          </m:r>
-                        </m:e>
-                        <m:sub>
-                          <m:r>
-                            <a:rPr lang="en-US" sz="2000">
-                              <a:latin typeface="Cambria Math" panose="02040503050406030204" pitchFamily="18" charset="0"/>
-                            </a:rPr>
-                            <m:t>𝐟𝐢𝐧𝐚𝐥</m:t>
-                          </m:r>
-                          <m:r>
-                            <a:rPr lang="en-US" sz="2000" b="1" i="0" smtClean="0">
-                              <a:latin typeface="Cambria Math" panose="02040503050406030204" pitchFamily="18" charset="0"/>
-                            </a:rPr>
-                            <m:t>,</m:t>
-                          </m:r>
-                          <m:r>
-                            <a:rPr lang="en-US" sz="2000" b="1" i="0" smtClean="0">
-                              <a:latin typeface="Cambria Math" panose="02040503050406030204" pitchFamily="18" charset="0"/>
-                            </a:rPr>
-                            <m:t>𝐃𝐍𝐒</m:t>
-                          </m:r>
-                        </m:sub>
-                      </m:sSub>
-                      <m:r>
-                        <a:rPr lang="en-US" sz="2000" i="1">
-                          <a:latin typeface="Cambria Math" panose="02040503050406030204" pitchFamily="18" charset="0"/>
-                        </a:rPr>
-                        <m:t>=</m:t>
-                      </m:r>
-                      <m:r>
-                        <a:rPr lang="en-US" sz="2000" i="1">
-                          <a:latin typeface="Cambria Math" panose="02040503050406030204" pitchFamily="18" charset="0"/>
-                        </a:rPr>
-                        <m:t>𝟎</m:t>
-                      </m:r>
-                      <m:r>
-                        <a:rPr lang="en-US" sz="2000" i="1">
-                          <a:latin typeface="Cambria Math" panose="02040503050406030204" pitchFamily="18" charset="0"/>
-                        </a:rPr>
-                        <m:t>.</m:t>
-                      </m:r>
-                      <m:r>
-                        <a:rPr lang="en-US" sz="2000" i="1">
-                          <a:latin typeface="Cambria Math" panose="02040503050406030204" pitchFamily="18" charset="0"/>
-                        </a:rPr>
-                        <m:t>𝟏</m:t>
-                      </m:r>
-                      <m:r>
-                        <a:rPr lang="en-US" sz="2000" b="1" i="0" smtClean="0">
-                          <a:latin typeface="Cambria Math" panose="02040503050406030204" pitchFamily="18" charset="0"/>
-                        </a:rPr>
-                        <m:t>,</m:t>
-                      </m:r>
-                      <m:sSub>
-                        <m:sSubPr>
-                          <m:ctrlPr>
-                            <a:rPr lang="en-US" sz="2000" i="1">
-                              <a:latin typeface="Cambria Math" panose="02040503050406030204" pitchFamily="18" charset="0"/>
-                            </a:rPr>
-                          </m:ctrlPr>
-                        </m:sSubPr>
-                        <m:e>
-                          <m:r>
-                            <a:rPr lang="en-US" sz="2000" i="1">
-                              <a:latin typeface="Cambria Math" panose="02040503050406030204" pitchFamily="18" charset="0"/>
-                            </a:rPr>
-                            <m:t>𝒕</m:t>
-                          </m:r>
-                        </m:e>
-                        <m:sub>
-                          <m:r>
-                            <a:rPr lang="en-US" sz="2000">
-                              <a:latin typeface="Cambria Math" panose="02040503050406030204" pitchFamily="18" charset="0"/>
-                            </a:rPr>
-                            <m:t>𝐟𝐢𝐧𝐚𝐥</m:t>
-                          </m:r>
-                          <m:r>
-                            <a:rPr lang="en-US" sz="2000">
-                              <a:latin typeface="Cambria Math" panose="02040503050406030204" pitchFamily="18" charset="0"/>
-                            </a:rPr>
-                            <m:t>,</m:t>
-                          </m:r>
-                          <m:r>
-                            <a:rPr lang="en-US" sz="2000" b="1" i="0" smtClean="0">
-                              <a:latin typeface="Cambria Math" panose="02040503050406030204" pitchFamily="18" charset="0"/>
-                            </a:rPr>
-                            <m:t>𝐫</m:t>
-                          </m:r>
-                          <m:r>
-                            <a:rPr lang="en-US" sz="2000" b="1" i="0" smtClean="0">
-                              <a:latin typeface="Cambria Math" panose="02040503050406030204" pitchFamily="18" charset="0"/>
-                            </a:rPr>
-                            <m:t>=</m:t>
-                          </m:r>
-                          <m:r>
-                            <a:rPr lang="en-US" sz="2000" b="1" i="0" smtClean="0">
-                              <a:latin typeface="Cambria Math" panose="02040503050406030204" pitchFamily="18" charset="0"/>
-                            </a:rPr>
-                            <m:t>𝟑𝟎</m:t>
-                          </m:r>
-                        </m:sub>
-                      </m:sSub>
-                      <m:r>
-                        <a:rPr lang="en-US" sz="2000" i="1">
-                          <a:latin typeface="Cambria Math" panose="02040503050406030204" pitchFamily="18" charset="0"/>
-                        </a:rPr>
-                        <m:t>=</m:t>
-                      </m:r>
-                      <m:r>
-                        <a:rPr lang="en-US" sz="2000" b="1" i="1" smtClean="0">
-                          <a:latin typeface="Cambria Math" panose="02040503050406030204" pitchFamily="18" charset="0"/>
-                        </a:rPr>
-                        <m:t>𝟖</m:t>
-                      </m:r>
-                      <m:r>
-                        <a:rPr lang="en-US" sz="2000" b="1" i="1" smtClean="0">
-                          <a:latin typeface="Cambria Math" panose="02040503050406030204" pitchFamily="18" charset="0"/>
-                        </a:rPr>
-                        <m:t>.</m:t>
-                      </m:r>
-                      <m:r>
-                        <a:rPr lang="en-US" sz="2000" b="1" i="1" smtClean="0">
-                          <a:latin typeface="Cambria Math" panose="02040503050406030204" pitchFamily="18" charset="0"/>
-                        </a:rPr>
-                        <m:t>𝟒</m:t>
-                      </m:r>
-                    </m:oMath>
-                  </m:oMathPara>
+                  <m:oMath xmlns:m="http://schemas.openxmlformats.org/officeDocument/2006/math">
+                    <m:r>
+                      <a:rPr lang="en-US" sz="2000" smtClean="0">
+                        <a:latin typeface="Cambria Math" panose="02040503050406030204" pitchFamily="18" charset="0"/>
+                      </a:rPr>
+                      <m:t>𝚫</m:t>
+                    </m:r>
+                    <m:r>
+                      <a:rPr lang="en-US" sz="2000" smtClean="0">
+                        <a:latin typeface="Cambria Math" panose="02040503050406030204" pitchFamily="18" charset="0"/>
+                      </a:rPr>
+                      <m:t>𝐭</m:t>
+                    </m:r>
+                    <m:r>
+                      <a:rPr lang="en-US" sz="2000" smtClean="0">
+                        <a:latin typeface="Cambria Math" panose="02040503050406030204" pitchFamily="18" charset="0"/>
+                      </a:rPr>
+                      <m:t>=</m:t>
+                    </m:r>
+                    <m:r>
+                      <a:rPr lang="en-US" sz="2000" smtClean="0">
+                        <a:latin typeface="Cambria Math" panose="02040503050406030204" pitchFamily="18" charset="0"/>
+                      </a:rPr>
+                      <m:t>𝟏</m:t>
+                    </m:r>
+                    <m:sSup>
+                      <m:sSupPr>
+                        <m:ctrlPr>
+                          <a:rPr lang="en-US" sz="2000" i="1" smtClean="0">
+                            <a:latin typeface="Cambria Math" panose="02040503050406030204" pitchFamily="18" charset="0"/>
+                          </a:rPr>
+                        </m:ctrlPr>
+                      </m:sSupPr>
+                      <m:e>
+                        <m:r>
+                          <a:rPr lang="en-US" sz="2000" smtClean="0">
+                            <a:latin typeface="Cambria Math" panose="02040503050406030204" pitchFamily="18" charset="0"/>
+                          </a:rPr>
+                          <m:t>𝟎</m:t>
+                        </m:r>
+                      </m:e>
+                      <m:sup>
+                        <m:r>
+                          <a:rPr lang="en-US" sz="2000" smtClean="0">
+                            <a:latin typeface="Cambria Math" panose="02040503050406030204" pitchFamily="18" charset="0"/>
+                          </a:rPr>
+                          <m:t>−</m:t>
+                        </m:r>
+                        <m:r>
+                          <a:rPr lang="en-US" sz="2000" smtClean="0">
+                            <a:latin typeface="Cambria Math" panose="02040503050406030204" pitchFamily="18" charset="0"/>
+                          </a:rPr>
+                          <m:t>𝟔</m:t>
+                        </m:r>
+                      </m:sup>
+                    </m:sSup>
+                    <m:r>
+                      <a:rPr lang="en-US" sz="2000" smtClean="0">
+                        <a:latin typeface="Cambria Math" panose="02040503050406030204" pitchFamily="18" charset="0"/>
+                      </a:rPr>
+                      <m:t>,</m:t>
+                    </m:r>
+                    <m:acc>
+                      <m:accPr>
+                        <m:chr m:val="̃"/>
+                        <m:ctrlPr>
+                          <a:rPr lang="en-US" sz="2000" i="1" smtClean="0">
+                            <a:latin typeface="Cambria Math" panose="02040503050406030204" pitchFamily="18" charset="0"/>
+                          </a:rPr>
+                        </m:ctrlPr>
+                      </m:accPr>
+                      <m:e>
+                        <m:r>
+                          <a:rPr lang="de-CH" sz="2000" b="1" i="1" smtClean="0">
+                            <a:latin typeface="Cambria Math" panose="02040503050406030204" pitchFamily="18" charset="0"/>
+                          </a:rPr>
+                          <m:t>𝒓</m:t>
+                        </m:r>
+                      </m:e>
+                    </m:acc>
+                    <m:r>
+                      <a:rPr lang="de-CH" sz="2000" b="1" i="1" smtClean="0">
+                        <a:latin typeface="Cambria Math" panose="02040503050406030204" pitchFamily="18" charset="0"/>
+                      </a:rPr>
+                      <m:t>=</m:t>
+                    </m:r>
+                    <m:r>
+                      <a:rPr lang="de-CH" sz="2000" b="1" i="1" smtClean="0">
+                        <a:latin typeface="Cambria Math" panose="02040503050406030204" pitchFamily="18" charset="0"/>
+                      </a:rPr>
+                      <m:t>𝟏𝟎𝟎</m:t>
+                    </m:r>
+                  </m:oMath>
+                </a14:m>
+                <a:r>
+                  <a:rPr lang="de-CH" sz="2000" dirty="0" smtClean="0"/>
+                  <a:t>			 </a:t>
+                </a:r>
+                <a14:m>
+                  <m:oMath xmlns:m="http://schemas.openxmlformats.org/officeDocument/2006/math">
+                    <m:sSub>
+                      <m:sSubPr>
+                        <m:ctrlPr>
+                          <a:rPr lang="en-US" sz="2000" i="1">
+                            <a:latin typeface="Cambria Math" panose="02040503050406030204" pitchFamily="18" charset="0"/>
+                          </a:rPr>
+                        </m:ctrlPr>
+                      </m:sSubPr>
+                      <m:e>
+                        <m:r>
+                          <a:rPr lang="en-US" sz="2000" i="1">
+                            <a:latin typeface="Cambria Math" panose="02040503050406030204" pitchFamily="18" charset="0"/>
+                          </a:rPr>
+                          <m:t>𝒕</m:t>
+                        </m:r>
+                      </m:e>
+                      <m:sub>
+                        <m:r>
+                          <a:rPr lang="en-US" sz="2000">
+                            <a:latin typeface="Cambria Math" panose="02040503050406030204" pitchFamily="18" charset="0"/>
+                          </a:rPr>
+                          <m:t>𝐟𝐢𝐧𝐚𝐥</m:t>
+                        </m:r>
+                        <m:r>
+                          <a:rPr lang="en-US" sz="2000">
+                            <a:latin typeface="Cambria Math" panose="02040503050406030204" pitchFamily="18" charset="0"/>
+                          </a:rPr>
+                          <m:t>,</m:t>
+                        </m:r>
+                        <m:r>
+                          <a:rPr lang="en-US" sz="2000">
+                            <a:latin typeface="Cambria Math" panose="02040503050406030204" pitchFamily="18" charset="0"/>
+                          </a:rPr>
+                          <m:t>𝐃𝐍𝐒</m:t>
+                        </m:r>
+                      </m:sub>
+                    </m:sSub>
+                    <m:r>
+                      <a:rPr lang="en-US" sz="2000" i="1">
+                        <a:latin typeface="Cambria Math" panose="02040503050406030204" pitchFamily="18" charset="0"/>
+                      </a:rPr>
+                      <m:t>=</m:t>
+                    </m:r>
+                    <m:r>
+                      <a:rPr lang="en-US" sz="2000" i="1">
+                        <a:latin typeface="Cambria Math" panose="02040503050406030204" pitchFamily="18" charset="0"/>
+                      </a:rPr>
+                      <m:t>𝟎</m:t>
+                    </m:r>
+                    <m:r>
+                      <a:rPr lang="en-US" sz="2000" i="1">
+                        <a:latin typeface="Cambria Math" panose="02040503050406030204" pitchFamily="18" charset="0"/>
+                      </a:rPr>
+                      <m:t>.</m:t>
+                    </m:r>
+                    <m:r>
+                      <a:rPr lang="en-US" sz="2000" i="1">
+                        <a:latin typeface="Cambria Math" panose="02040503050406030204" pitchFamily="18" charset="0"/>
+                      </a:rPr>
+                      <m:t>𝟏</m:t>
+                    </m:r>
+                    <m:r>
+                      <a:rPr lang="en-US" sz="2000">
+                        <a:latin typeface="Cambria Math" panose="02040503050406030204" pitchFamily="18" charset="0"/>
+                      </a:rPr>
+                      <m:t>,</m:t>
+                    </m:r>
+                    <m:sSub>
+                      <m:sSubPr>
+                        <m:ctrlPr>
+                          <a:rPr lang="en-US" sz="2000" i="1">
+                            <a:latin typeface="Cambria Math" panose="02040503050406030204" pitchFamily="18" charset="0"/>
+                          </a:rPr>
+                        </m:ctrlPr>
+                      </m:sSubPr>
+                      <m:e>
+                        <m:r>
+                          <a:rPr lang="en-US" sz="2000" i="1">
+                            <a:latin typeface="Cambria Math" panose="02040503050406030204" pitchFamily="18" charset="0"/>
+                          </a:rPr>
+                          <m:t>𝒕</m:t>
+                        </m:r>
+                      </m:e>
+                      <m:sub>
+                        <m:r>
+                          <a:rPr lang="en-US" sz="2000">
+                            <a:latin typeface="Cambria Math" panose="02040503050406030204" pitchFamily="18" charset="0"/>
+                          </a:rPr>
+                          <m:t>𝐟𝐢𝐧𝐚𝐥</m:t>
+                        </m:r>
+                        <m:r>
+                          <a:rPr lang="en-US" sz="2000">
+                            <a:latin typeface="Cambria Math" panose="02040503050406030204" pitchFamily="18" charset="0"/>
+                          </a:rPr>
+                          <m:t>,</m:t>
+                        </m:r>
+                        <m:r>
+                          <a:rPr lang="en-US" sz="2000">
+                            <a:latin typeface="Cambria Math" panose="02040503050406030204" pitchFamily="18" charset="0"/>
+                          </a:rPr>
+                          <m:t>𝐫</m:t>
+                        </m:r>
+                        <m:r>
+                          <a:rPr lang="en-US" sz="2000">
+                            <a:latin typeface="Cambria Math" panose="02040503050406030204" pitchFamily="18" charset="0"/>
+                          </a:rPr>
+                          <m:t>=</m:t>
+                        </m:r>
+                        <m:r>
+                          <a:rPr lang="en-US" sz="2000">
+                            <a:latin typeface="Cambria Math" panose="02040503050406030204" pitchFamily="18" charset="0"/>
+                          </a:rPr>
+                          <m:t>𝟑𝟎</m:t>
+                        </m:r>
+                      </m:sub>
+                    </m:sSub>
+                    <m:r>
+                      <a:rPr lang="en-US" sz="2000" i="1">
+                        <a:latin typeface="Cambria Math" panose="02040503050406030204" pitchFamily="18" charset="0"/>
+                      </a:rPr>
+                      <m:t>=</m:t>
+                    </m:r>
+                    <m:r>
+                      <a:rPr lang="en-US" sz="2000" i="1">
+                        <a:latin typeface="Cambria Math" panose="02040503050406030204" pitchFamily="18" charset="0"/>
+                      </a:rPr>
+                      <m:t>𝟖</m:t>
+                    </m:r>
+                    <m:r>
+                      <a:rPr lang="en-US" sz="2000" i="1">
+                        <a:latin typeface="Cambria Math" panose="02040503050406030204" pitchFamily="18" charset="0"/>
+                      </a:rPr>
+                      <m:t>.</m:t>
+                    </m:r>
+                    <m:r>
+                      <a:rPr lang="en-US" sz="2000" i="1">
+                        <a:latin typeface="Cambria Math" panose="02040503050406030204" pitchFamily="18" charset="0"/>
+                      </a:rPr>
+                      <m:t>𝟒</m:t>
+                    </m:r>
+                  </m:oMath>
                 </a14:m>
                 <a:endParaRPr lang="de-CH" sz="2000" dirty="0"/>
               </a:p>
@@ -7865,7 +8487,7 @@
               <a:blipFill>
                 <a:blip r:embed="rId3"/>
                 <a:stretch>
-                  <a:fillRect l="-861" t="-3650" b="-6569"/>
+                  <a:fillRect l="-861" t="-2190" b="-6569"/>
                 </a:stretch>
               </a:blipFill>
             </p:spPr>
@@ -9248,8 +9870,8 @@
           </a:p>
         </p:txBody>
       </p:sp>
-      <mc:AlternateContent xmlns:mc="http://schemas.openxmlformats.org/markup-compatibility/2006" xmlns:a14="http://schemas.microsoft.com/office/drawing/2010/main">
-        <mc:Choice Requires="a14">
+      <mc:AlternateContent xmlns:mc="http://schemas.openxmlformats.org/markup-compatibility/2006">
+        <mc:Choice xmlns:a14="http://schemas.microsoft.com/office/drawing/2010/main" Requires="a14">
           <p:sp>
             <p:nvSpPr>
               <p:cNvPr id="11" name="Content Placeholder 7"/>
@@ -9260,7 +9882,7 @@
             </p:nvSpPr>
             <p:spPr>
               <a:xfrm>
-                <a:off x="323850" y="1807585"/>
+                <a:off x="323850" y="1734435"/>
                 <a:ext cx="8496300" cy="4501141"/>
               </a:xfrm>
               <a:prstGeom prst="rect">
@@ -9493,7 +10115,19 @@
               <a:p>
                 <a:r>
                   <a:rPr lang="en-US" dirty="0" smtClean="0"/>
-                  <a:t>LES is a commonly used class of methods</a:t>
+                  <a:t>LES </a:t>
+                </a:r>
+                <a:r>
+                  <a:rPr lang="en-US" dirty="0" smtClean="0"/>
+                  <a:t>is one promising</a:t>
+                </a:r>
+                <a:r>
+                  <a:rPr lang="en-US" dirty="0" smtClean="0"/>
+                  <a:t> </a:t>
+                </a:r>
+                <a:r>
+                  <a:rPr lang="en-US" dirty="0" smtClean="0"/>
+                  <a:t>class of methods</a:t>
                 </a:r>
                 <a:endParaRPr lang="en-US" dirty="0"/>
               </a:p>
@@ -9544,7 +10178,7 @@
             </p:txBody>
           </p:sp>
         </mc:Choice>
-        <mc:Fallback xmlns="">
+        <mc:Fallback>
           <p:sp>
             <p:nvSpPr>
               <p:cNvPr id="11" name="Content Placeholder 7"/>
@@ -9555,7 +10189,7 @@
             </p:nvSpPr>
             <p:spPr>
               <a:xfrm>
-                <a:off x="323850" y="1807585"/>
+                <a:off x="323850" y="1734435"/>
                 <a:ext cx="8496300" cy="4501141"/>
               </a:xfrm>
               <a:prstGeom prst="rect">
@@ -9999,8 +10633,8 @@
           <a:chExt cx="0" cy="0"/>
         </a:xfrm>
       </p:grpSpPr>
-      <mc:AlternateContent xmlns:mc="http://schemas.openxmlformats.org/markup-compatibility/2006">
-        <mc:Choice xmlns:a14="http://schemas.microsoft.com/office/drawing/2010/main" Requires="a14">
+      <mc:AlternateContent xmlns:mc="http://schemas.openxmlformats.org/markup-compatibility/2006" xmlns:a14="http://schemas.microsoft.com/office/drawing/2010/main">
+        <mc:Choice Requires="a14">
           <p:sp>
             <p:nvSpPr>
               <p:cNvPr id="2" name="Content Placeholder 1"/>
@@ -10011,10 +10645,25 @@
                 <p:ph idx="1"/>
               </p:nvPr>
             </p:nvSpPr>
-            <p:spPr/>
+            <p:spPr>
+              <a:xfrm>
+                <a:off x="323850" y="1819242"/>
+                <a:ext cx="8496300" cy="4210046"/>
+              </a:xfrm>
+            </p:spPr>
             <p:txBody>
               <a:bodyPr/>
               <a:lstStyle/>
+              <a:p>
+                <a:r>
+                  <a:rPr lang="en-US" dirty="0" smtClean="0"/>
+                  <a:t>Dependence on geometry and initial conditions</a:t>
+                </a:r>
+                <a:endParaRPr lang="en-US" dirty="0"/>
+              </a:p>
+              <a:p>
+                <a:endParaRPr lang="en-US" dirty="0" smtClean="0"/>
+              </a:p>
               <a:p>
                 <a:r>
                   <a:rPr lang="en-US" dirty="0" smtClean="0"/>
@@ -10114,7 +10763,7 @@
             </p:txBody>
           </p:sp>
         </mc:Choice>
-        <mc:Fallback>
+        <mc:Fallback xmlns="">
           <p:sp>
             <p:nvSpPr>
               <p:cNvPr id="2" name="Content Placeholder 1"/>
@@ -10126,6 +10775,10 @@
               </p:nvPr>
             </p:nvSpPr>
             <p:spPr>
+              <a:xfrm>
+                <a:off x="323850" y="1819242"/>
+                <a:ext cx="8496300" cy="4210046"/>
+              </a:xfrm>
               <a:blipFill>
                 <a:blip r:embed="rId2"/>
                 <a:stretch>

</xml_diff>